<commit_message>
presentation: complete {prob define, conclusion}
</commit_message>
<xml_diff>
--- a/presentation/face-attendance-2018.pptx
+++ b/presentation/face-attendance-2018.pptx
@@ -5,10 +5,10 @@
     <p:sldMasterId id="2147483648" r:id="rId4"/>
   </p:sldMasterIdLst>
   <p:notesMasterIdLst>
-    <p:notesMasterId r:id="rId16"/>
+    <p:notesMasterId r:id="rId24"/>
   </p:notesMasterIdLst>
   <p:handoutMasterIdLst>
-    <p:handoutMasterId r:id="rId17"/>
+    <p:handoutMasterId r:id="rId25"/>
   </p:handoutMasterIdLst>
   <p:sldIdLst>
     <p:sldId id="256" r:id="rId5"/>
@@ -19,9 +19,17 @@
     <p:sldId id="289" r:id="rId10"/>
     <p:sldId id="285" r:id="rId11"/>
     <p:sldId id="286" r:id="rId12"/>
-    <p:sldId id="287" r:id="rId13"/>
-    <p:sldId id="288" r:id="rId14"/>
-    <p:sldId id="290" r:id="rId15"/>
+    <p:sldId id="293" r:id="rId13"/>
+    <p:sldId id="297" r:id="rId14"/>
+    <p:sldId id="295" r:id="rId15"/>
+    <p:sldId id="299" r:id="rId16"/>
+    <p:sldId id="298" r:id="rId17"/>
+    <p:sldId id="300" r:id="rId18"/>
+    <p:sldId id="301" r:id="rId19"/>
+    <p:sldId id="287" r:id="rId20"/>
+    <p:sldId id="288" r:id="rId21"/>
+    <p:sldId id="290" r:id="rId22"/>
+    <p:sldId id="302" r:id="rId23"/>
   </p:sldIdLst>
   <p:sldSz cx="12192000" cy="6858000"/>
   <p:notesSz cx="6858000" cy="9144000"/>
@@ -149,6 +157,13 @@
         <p14:section name="Implementation (Thuy)" id="{20183C8B-9659-4E02-AC51-6ABB2F69A0D8}">
           <p14:sldIdLst>
             <p14:sldId id="286"/>
+            <p14:sldId id="293"/>
+            <p14:sldId id="297"/>
+            <p14:sldId id="295"/>
+            <p14:sldId id="299"/>
+            <p14:sldId id="298"/>
+            <p14:sldId id="300"/>
+            <p14:sldId id="301"/>
           </p14:sldIdLst>
         </p14:section>
         <p14:section name="Experimental results (Qui)" id="{2C448E6D-5C55-49BD-92C4-C81DCEC8B8D3}">
@@ -164,6 +179,7 @@
         <p14:section name="Conclusion (Thuy)" id="{988E7349-BCF6-48A9-9932-C5E5F1058821}">
           <p14:sldIdLst>
             <p14:sldId id="290"/>
+            <p14:sldId id="302"/>
           </p14:sldIdLst>
         </p14:section>
       </p14:sectionLst>
@@ -274,7 +290,7 @@
             <a:fld id="{CC1DA393-9828-451D-B59D-AF31BF583415}" type="datetime1">
               <a:rPr lang="vi-VN" smtClean="0"/>
               <a:pPr algn="r" rtl="0"/>
-              <a:t>24/10/2018</a:t>
+              <a:t>10/11/2018</a:t>
             </a:fld>
             <a:endParaRPr lang="vi-VN" dirty="0"/>
           </a:p>
@@ -444,7 +460,7 @@
             <a:fld id="{2C7CCB19-F7A0-4D49-8961-E0D415DEE599}" type="datetime1">
               <a:rPr lang="vi-VN" smtClean="0"/>
               <a:pPr/>
-              <a:t>24/10/2018</a:t>
+              <a:t>10/11/2018</a:t>
             </a:fld>
             <a:endParaRPr lang="vi-VN" dirty="0"/>
           </a:p>
@@ -934,7 +950,7 @@
     </p:spTree>
     <p:extLst>
       <p:ext uri="{BB962C8B-B14F-4D97-AF65-F5344CB8AC3E}">
-        <p14:creationId xmlns:p14="http://schemas.microsoft.com/office/powerpoint/2010/main" val="4269383944"/>
+        <p14:creationId xmlns:p14="http://schemas.microsoft.com/office/powerpoint/2010/main" val="2572576222"/>
       </p:ext>
     </p:extLst>
   </p:cSld>
@@ -1019,7 +1035,687 @@
     </p:spTree>
     <p:extLst>
       <p:ext uri="{BB962C8B-B14F-4D97-AF65-F5344CB8AC3E}">
+        <p14:creationId xmlns:p14="http://schemas.microsoft.com/office/powerpoint/2010/main" val="2092679439"/>
+      </p:ext>
+    </p:extLst>
+  </p:cSld>
+  <p:clrMapOvr>
+    <a:masterClrMapping/>
+  </p:clrMapOvr>
+</p:notes>
+</file>
+
+<file path=ppt/notesSlides/notesSlide12.xml><?xml version="1.0" encoding="utf-8"?>
+<p:notes xmlns:a="http://schemas.openxmlformats.org/drawingml/2006/main" xmlns:r="http://schemas.openxmlformats.org/officeDocument/2006/relationships" xmlns:p="http://schemas.openxmlformats.org/presentationml/2006/main">
+  <p:cSld>
+    <p:spTree>
+      <p:nvGrpSpPr>
+        <p:cNvPr id="1" name=""/>
+        <p:cNvGrpSpPr/>
+        <p:nvPr/>
+      </p:nvGrpSpPr>
+      <p:grpSpPr>
+        <a:xfrm>
+          <a:off x="0" y="0"/>
+          <a:ext cx="0" cy="0"/>
+          <a:chOff x="0" y="0"/>
+          <a:chExt cx="0" cy="0"/>
+        </a:xfrm>
+      </p:grpSpPr>
+      <p:sp>
+        <p:nvSpPr>
+          <p:cNvPr id="2" name="Chỗ dành sẵn cho Hình ảnh của Bản chiếu 1"/>
+          <p:cNvSpPr>
+            <a:spLocks noGrp="1" noRot="1" noChangeAspect="1"/>
+          </p:cNvSpPr>
+          <p:nvPr>
+            <p:ph type="sldImg"/>
+          </p:nvPr>
+        </p:nvSpPr>
+        <p:spPr/>
+      </p:sp>
+      <p:sp>
+        <p:nvSpPr>
+          <p:cNvPr id="3" name="Chỗ dành sẵn cho Ghi chú 2"/>
+          <p:cNvSpPr>
+            <a:spLocks noGrp="1"/>
+          </p:cNvSpPr>
+          <p:nvPr>
+            <p:ph type="body" idx="1"/>
+          </p:nvPr>
+        </p:nvSpPr>
+        <p:spPr/>
+        <p:txBody>
+          <a:bodyPr/>
+          <a:lstStyle/>
+          <a:p>
+            <a:endParaRPr lang="en-US"/>
+          </a:p>
+        </p:txBody>
+      </p:sp>
+      <p:sp>
+        <p:nvSpPr>
+          <p:cNvPr id="4" name="Chỗ dành sẵn cho Số hiệu Bản chiếu 3"/>
+          <p:cNvSpPr>
+            <a:spLocks noGrp="1"/>
+          </p:cNvSpPr>
+          <p:nvPr>
+            <p:ph type="sldNum" sz="quarter" idx="10"/>
+          </p:nvPr>
+        </p:nvSpPr>
+        <p:spPr/>
+        <p:txBody>
+          <a:bodyPr/>
+          <a:lstStyle/>
+          <a:p>
+            <a:fld id="{0A3C37BE-C303-496D-B5CD-85F2937540FC}" type="slidenum">
+              <a:rPr lang="vi-VN" smtClean="0"/>
+              <a:pPr/>
+              <a:t>12</a:t>
+            </a:fld>
+            <a:endParaRPr lang="vi-VN" dirty="0"/>
+          </a:p>
+        </p:txBody>
+      </p:sp>
+    </p:spTree>
+    <p:extLst>
+      <p:ext uri="{BB962C8B-B14F-4D97-AF65-F5344CB8AC3E}">
+        <p14:creationId xmlns:p14="http://schemas.microsoft.com/office/powerpoint/2010/main" val="3684477984"/>
+      </p:ext>
+    </p:extLst>
+  </p:cSld>
+  <p:clrMapOvr>
+    <a:masterClrMapping/>
+  </p:clrMapOvr>
+</p:notes>
+</file>
+
+<file path=ppt/notesSlides/notesSlide13.xml><?xml version="1.0" encoding="utf-8"?>
+<p:notes xmlns:a="http://schemas.openxmlformats.org/drawingml/2006/main" xmlns:r="http://schemas.openxmlformats.org/officeDocument/2006/relationships" xmlns:p="http://schemas.openxmlformats.org/presentationml/2006/main">
+  <p:cSld>
+    <p:spTree>
+      <p:nvGrpSpPr>
+        <p:cNvPr id="1" name=""/>
+        <p:cNvGrpSpPr/>
+        <p:nvPr/>
+      </p:nvGrpSpPr>
+      <p:grpSpPr>
+        <a:xfrm>
+          <a:off x="0" y="0"/>
+          <a:ext cx="0" cy="0"/>
+          <a:chOff x="0" y="0"/>
+          <a:chExt cx="0" cy="0"/>
+        </a:xfrm>
+      </p:grpSpPr>
+      <p:sp>
+        <p:nvSpPr>
+          <p:cNvPr id="2" name="Chỗ dành sẵn cho Hình ảnh của Bản chiếu 1"/>
+          <p:cNvSpPr>
+            <a:spLocks noGrp="1" noRot="1" noChangeAspect="1"/>
+          </p:cNvSpPr>
+          <p:nvPr>
+            <p:ph type="sldImg"/>
+          </p:nvPr>
+        </p:nvSpPr>
+        <p:spPr/>
+      </p:sp>
+      <p:sp>
+        <p:nvSpPr>
+          <p:cNvPr id="3" name="Chỗ dành sẵn cho Ghi chú 2"/>
+          <p:cNvSpPr>
+            <a:spLocks noGrp="1"/>
+          </p:cNvSpPr>
+          <p:nvPr>
+            <p:ph type="body" idx="1"/>
+          </p:nvPr>
+        </p:nvSpPr>
+        <p:spPr/>
+        <p:txBody>
+          <a:bodyPr/>
+          <a:lstStyle/>
+          <a:p>
+            <a:endParaRPr lang="en-US"/>
+          </a:p>
+        </p:txBody>
+      </p:sp>
+      <p:sp>
+        <p:nvSpPr>
+          <p:cNvPr id="4" name="Chỗ dành sẵn cho Số hiệu Bản chiếu 3"/>
+          <p:cNvSpPr>
+            <a:spLocks noGrp="1"/>
+          </p:cNvSpPr>
+          <p:nvPr>
+            <p:ph type="sldNum" sz="quarter" idx="10"/>
+          </p:nvPr>
+        </p:nvSpPr>
+        <p:spPr/>
+        <p:txBody>
+          <a:bodyPr/>
+          <a:lstStyle/>
+          <a:p>
+            <a:fld id="{0A3C37BE-C303-496D-B5CD-85F2937540FC}" type="slidenum">
+              <a:rPr lang="vi-VN" smtClean="0"/>
+              <a:pPr/>
+              <a:t>13</a:t>
+            </a:fld>
+            <a:endParaRPr lang="vi-VN" dirty="0"/>
+          </a:p>
+        </p:txBody>
+      </p:sp>
+    </p:spTree>
+    <p:extLst>
+      <p:ext uri="{BB962C8B-B14F-4D97-AF65-F5344CB8AC3E}">
+        <p14:creationId xmlns:p14="http://schemas.microsoft.com/office/powerpoint/2010/main" val="2292681600"/>
+      </p:ext>
+    </p:extLst>
+  </p:cSld>
+  <p:clrMapOvr>
+    <a:masterClrMapping/>
+  </p:clrMapOvr>
+</p:notes>
+</file>
+
+<file path=ppt/notesSlides/notesSlide14.xml><?xml version="1.0" encoding="utf-8"?>
+<p:notes xmlns:a="http://schemas.openxmlformats.org/drawingml/2006/main" xmlns:r="http://schemas.openxmlformats.org/officeDocument/2006/relationships" xmlns:p="http://schemas.openxmlformats.org/presentationml/2006/main">
+  <p:cSld>
+    <p:spTree>
+      <p:nvGrpSpPr>
+        <p:cNvPr id="1" name=""/>
+        <p:cNvGrpSpPr/>
+        <p:nvPr/>
+      </p:nvGrpSpPr>
+      <p:grpSpPr>
+        <a:xfrm>
+          <a:off x="0" y="0"/>
+          <a:ext cx="0" cy="0"/>
+          <a:chOff x="0" y="0"/>
+          <a:chExt cx="0" cy="0"/>
+        </a:xfrm>
+      </p:grpSpPr>
+      <p:sp>
+        <p:nvSpPr>
+          <p:cNvPr id="2" name="Chỗ dành sẵn cho Hình ảnh của Bản chiếu 1"/>
+          <p:cNvSpPr>
+            <a:spLocks noGrp="1" noRot="1" noChangeAspect="1"/>
+          </p:cNvSpPr>
+          <p:nvPr>
+            <p:ph type="sldImg"/>
+          </p:nvPr>
+        </p:nvSpPr>
+        <p:spPr/>
+      </p:sp>
+      <p:sp>
+        <p:nvSpPr>
+          <p:cNvPr id="3" name="Chỗ dành sẵn cho Ghi chú 2"/>
+          <p:cNvSpPr>
+            <a:spLocks noGrp="1"/>
+          </p:cNvSpPr>
+          <p:nvPr>
+            <p:ph type="body" idx="1"/>
+          </p:nvPr>
+        </p:nvSpPr>
+        <p:spPr/>
+        <p:txBody>
+          <a:bodyPr/>
+          <a:lstStyle/>
+          <a:p>
+            <a:endParaRPr lang="en-US"/>
+          </a:p>
+        </p:txBody>
+      </p:sp>
+      <p:sp>
+        <p:nvSpPr>
+          <p:cNvPr id="4" name="Chỗ dành sẵn cho Số hiệu Bản chiếu 3"/>
+          <p:cNvSpPr>
+            <a:spLocks noGrp="1"/>
+          </p:cNvSpPr>
+          <p:nvPr>
+            <p:ph type="sldNum" sz="quarter" idx="10"/>
+          </p:nvPr>
+        </p:nvSpPr>
+        <p:spPr/>
+        <p:txBody>
+          <a:bodyPr/>
+          <a:lstStyle/>
+          <a:p>
+            <a:fld id="{0A3C37BE-C303-496D-B5CD-85F2937540FC}" type="slidenum">
+              <a:rPr lang="vi-VN" smtClean="0"/>
+              <a:pPr/>
+              <a:t>14</a:t>
+            </a:fld>
+            <a:endParaRPr lang="vi-VN" dirty="0"/>
+          </a:p>
+        </p:txBody>
+      </p:sp>
+    </p:spTree>
+    <p:extLst>
+      <p:ext uri="{BB962C8B-B14F-4D97-AF65-F5344CB8AC3E}">
+        <p14:creationId xmlns:p14="http://schemas.microsoft.com/office/powerpoint/2010/main" val="1098162254"/>
+      </p:ext>
+    </p:extLst>
+  </p:cSld>
+  <p:clrMapOvr>
+    <a:masterClrMapping/>
+  </p:clrMapOvr>
+</p:notes>
+</file>
+
+<file path=ppt/notesSlides/notesSlide15.xml><?xml version="1.0" encoding="utf-8"?>
+<p:notes xmlns:a="http://schemas.openxmlformats.org/drawingml/2006/main" xmlns:r="http://schemas.openxmlformats.org/officeDocument/2006/relationships" xmlns:p="http://schemas.openxmlformats.org/presentationml/2006/main">
+  <p:cSld>
+    <p:spTree>
+      <p:nvGrpSpPr>
+        <p:cNvPr id="1" name=""/>
+        <p:cNvGrpSpPr/>
+        <p:nvPr/>
+      </p:nvGrpSpPr>
+      <p:grpSpPr>
+        <a:xfrm>
+          <a:off x="0" y="0"/>
+          <a:ext cx="0" cy="0"/>
+          <a:chOff x="0" y="0"/>
+          <a:chExt cx="0" cy="0"/>
+        </a:xfrm>
+      </p:grpSpPr>
+      <p:sp>
+        <p:nvSpPr>
+          <p:cNvPr id="2" name="Chỗ dành sẵn cho Hình ảnh của Bản chiếu 1"/>
+          <p:cNvSpPr>
+            <a:spLocks noGrp="1" noRot="1" noChangeAspect="1"/>
+          </p:cNvSpPr>
+          <p:nvPr>
+            <p:ph type="sldImg"/>
+          </p:nvPr>
+        </p:nvSpPr>
+        <p:spPr/>
+      </p:sp>
+      <p:sp>
+        <p:nvSpPr>
+          <p:cNvPr id="3" name="Chỗ dành sẵn cho Ghi chú 2"/>
+          <p:cNvSpPr>
+            <a:spLocks noGrp="1"/>
+          </p:cNvSpPr>
+          <p:nvPr>
+            <p:ph type="body" idx="1"/>
+          </p:nvPr>
+        </p:nvSpPr>
+        <p:spPr/>
+        <p:txBody>
+          <a:bodyPr/>
+          <a:lstStyle/>
+          <a:p>
+            <a:endParaRPr lang="en-US"/>
+          </a:p>
+        </p:txBody>
+      </p:sp>
+      <p:sp>
+        <p:nvSpPr>
+          <p:cNvPr id="4" name="Chỗ dành sẵn cho Số hiệu Bản chiếu 3"/>
+          <p:cNvSpPr>
+            <a:spLocks noGrp="1"/>
+          </p:cNvSpPr>
+          <p:nvPr>
+            <p:ph type="sldNum" sz="quarter" idx="10"/>
+          </p:nvPr>
+        </p:nvSpPr>
+        <p:spPr/>
+        <p:txBody>
+          <a:bodyPr/>
+          <a:lstStyle/>
+          <a:p>
+            <a:fld id="{0A3C37BE-C303-496D-B5CD-85F2937540FC}" type="slidenum">
+              <a:rPr lang="vi-VN" smtClean="0"/>
+              <a:pPr/>
+              <a:t>15</a:t>
+            </a:fld>
+            <a:endParaRPr lang="vi-VN" dirty="0"/>
+          </a:p>
+        </p:txBody>
+      </p:sp>
+    </p:spTree>
+    <p:extLst>
+      <p:ext uri="{BB962C8B-B14F-4D97-AF65-F5344CB8AC3E}">
+        <p14:creationId xmlns:p14="http://schemas.microsoft.com/office/powerpoint/2010/main" val="2019976881"/>
+      </p:ext>
+    </p:extLst>
+  </p:cSld>
+  <p:clrMapOvr>
+    <a:masterClrMapping/>
+  </p:clrMapOvr>
+</p:notes>
+</file>
+
+<file path=ppt/notesSlides/notesSlide16.xml><?xml version="1.0" encoding="utf-8"?>
+<p:notes xmlns:a="http://schemas.openxmlformats.org/drawingml/2006/main" xmlns:r="http://schemas.openxmlformats.org/officeDocument/2006/relationships" xmlns:p="http://schemas.openxmlformats.org/presentationml/2006/main">
+  <p:cSld>
+    <p:spTree>
+      <p:nvGrpSpPr>
+        <p:cNvPr id="1" name=""/>
+        <p:cNvGrpSpPr/>
+        <p:nvPr/>
+      </p:nvGrpSpPr>
+      <p:grpSpPr>
+        <a:xfrm>
+          <a:off x="0" y="0"/>
+          <a:ext cx="0" cy="0"/>
+          <a:chOff x="0" y="0"/>
+          <a:chExt cx="0" cy="0"/>
+        </a:xfrm>
+      </p:grpSpPr>
+      <p:sp>
+        <p:nvSpPr>
+          <p:cNvPr id="2" name="Chỗ dành sẵn cho Hình ảnh của Bản chiếu 1"/>
+          <p:cNvSpPr>
+            <a:spLocks noGrp="1" noRot="1" noChangeAspect="1"/>
+          </p:cNvSpPr>
+          <p:nvPr>
+            <p:ph type="sldImg"/>
+          </p:nvPr>
+        </p:nvSpPr>
+        <p:spPr/>
+      </p:sp>
+      <p:sp>
+        <p:nvSpPr>
+          <p:cNvPr id="3" name="Chỗ dành sẵn cho Ghi chú 2"/>
+          <p:cNvSpPr>
+            <a:spLocks noGrp="1"/>
+          </p:cNvSpPr>
+          <p:nvPr>
+            <p:ph type="body" idx="1"/>
+          </p:nvPr>
+        </p:nvSpPr>
+        <p:spPr/>
+        <p:txBody>
+          <a:bodyPr/>
+          <a:lstStyle/>
+          <a:p>
+            <a:endParaRPr lang="en-US"/>
+          </a:p>
+        </p:txBody>
+      </p:sp>
+      <p:sp>
+        <p:nvSpPr>
+          <p:cNvPr id="4" name="Chỗ dành sẵn cho Số hiệu Bản chiếu 3"/>
+          <p:cNvSpPr>
+            <a:spLocks noGrp="1"/>
+          </p:cNvSpPr>
+          <p:nvPr>
+            <p:ph type="sldNum" sz="quarter" idx="10"/>
+          </p:nvPr>
+        </p:nvSpPr>
+        <p:spPr/>
+        <p:txBody>
+          <a:bodyPr/>
+          <a:lstStyle/>
+          <a:p>
+            <a:fld id="{0A3C37BE-C303-496D-B5CD-85F2937540FC}" type="slidenum">
+              <a:rPr lang="vi-VN" smtClean="0"/>
+              <a:pPr/>
+              <a:t>16</a:t>
+            </a:fld>
+            <a:endParaRPr lang="vi-VN" dirty="0"/>
+          </a:p>
+        </p:txBody>
+      </p:sp>
+    </p:spTree>
+    <p:extLst>
+      <p:ext uri="{BB962C8B-B14F-4D97-AF65-F5344CB8AC3E}">
+        <p14:creationId xmlns:p14="http://schemas.microsoft.com/office/powerpoint/2010/main" val="1946839622"/>
+      </p:ext>
+    </p:extLst>
+  </p:cSld>
+  <p:clrMapOvr>
+    <a:masterClrMapping/>
+  </p:clrMapOvr>
+</p:notes>
+</file>
+
+<file path=ppt/notesSlides/notesSlide17.xml><?xml version="1.0" encoding="utf-8"?>
+<p:notes xmlns:a="http://schemas.openxmlformats.org/drawingml/2006/main" xmlns:r="http://schemas.openxmlformats.org/officeDocument/2006/relationships" xmlns:p="http://schemas.openxmlformats.org/presentationml/2006/main">
+  <p:cSld>
+    <p:spTree>
+      <p:nvGrpSpPr>
+        <p:cNvPr id="1" name=""/>
+        <p:cNvGrpSpPr/>
+        <p:nvPr/>
+      </p:nvGrpSpPr>
+      <p:grpSpPr>
+        <a:xfrm>
+          <a:off x="0" y="0"/>
+          <a:ext cx="0" cy="0"/>
+          <a:chOff x="0" y="0"/>
+          <a:chExt cx="0" cy="0"/>
+        </a:xfrm>
+      </p:grpSpPr>
+      <p:sp>
+        <p:nvSpPr>
+          <p:cNvPr id="2" name="Chỗ dành sẵn cho Hình ảnh của Bản chiếu 1"/>
+          <p:cNvSpPr>
+            <a:spLocks noGrp="1" noRot="1" noChangeAspect="1"/>
+          </p:cNvSpPr>
+          <p:nvPr>
+            <p:ph type="sldImg"/>
+          </p:nvPr>
+        </p:nvSpPr>
+        <p:spPr/>
+      </p:sp>
+      <p:sp>
+        <p:nvSpPr>
+          <p:cNvPr id="3" name="Chỗ dành sẵn cho Ghi chú 2"/>
+          <p:cNvSpPr>
+            <a:spLocks noGrp="1"/>
+          </p:cNvSpPr>
+          <p:nvPr>
+            <p:ph type="body" idx="1"/>
+          </p:nvPr>
+        </p:nvSpPr>
+        <p:spPr/>
+        <p:txBody>
+          <a:bodyPr/>
+          <a:lstStyle/>
+          <a:p>
+            <a:endParaRPr lang="en-US"/>
+          </a:p>
+        </p:txBody>
+      </p:sp>
+      <p:sp>
+        <p:nvSpPr>
+          <p:cNvPr id="4" name="Chỗ dành sẵn cho Số hiệu Bản chiếu 3"/>
+          <p:cNvSpPr>
+            <a:spLocks noGrp="1"/>
+          </p:cNvSpPr>
+          <p:nvPr>
+            <p:ph type="sldNum" sz="quarter" idx="10"/>
+          </p:nvPr>
+        </p:nvSpPr>
+        <p:spPr/>
+        <p:txBody>
+          <a:bodyPr/>
+          <a:lstStyle/>
+          <a:p>
+            <a:fld id="{0A3C37BE-C303-496D-B5CD-85F2937540FC}" type="slidenum">
+              <a:rPr lang="vi-VN" smtClean="0"/>
+              <a:pPr/>
+              <a:t>17</a:t>
+            </a:fld>
+            <a:endParaRPr lang="vi-VN" dirty="0"/>
+          </a:p>
+        </p:txBody>
+      </p:sp>
+    </p:spTree>
+    <p:extLst>
+      <p:ext uri="{BB962C8B-B14F-4D97-AF65-F5344CB8AC3E}">
+        <p14:creationId xmlns:p14="http://schemas.microsoft.com/office/powerpoint/2010/main" val="4269383944"/>
+      </p:ext>
+    </p:extLst>
+  </p:cSld>
+  <p:clrMapOvr>
+    <a:masterClrMapping/>
+  </p:clrMapOvr>
+</p:notes>
+</file>
+
+<file path=ppt/notesSlides/notesSlide18.xml><?xml version="1.0" encoding="utf-8"?>
+<p:notes xmlns:a="http://schemas.openxmlformats.org/drawingml/2006/main" xmlns:r="http://schemas.openxmlformats.org/officeDocument/2006/relationships" xmlns:p="http://schemas.openxmlformats.org/presentationml/2006/main">
+  <p:cSld>
+    <p:spTree>
+      <p:nvGrpSpPr>
+        <p:cNvPr id="1" name=""/>
+        <p:cNvGrpSpPr/>
+        <p:nvPr/>
+      </p:nvGrpSpPr>
+      <p:grpSpPr>
+        <a:xfrm>
+          <a:off x="0" y="0"/>
+          <a:ext cx="0" cy="0"/>
+          <a:chOff x="0" y="0"/>
+          <a:chExt cx="0" cy="0"/>
+        </a:xfrm>
+      </p:grpSpPr>
+      <p:sp>
+        <p:nvSpPr>
+          <p:cNvPr id="2" name="Chỗ dành sẵn cho Hình ảnh của Bản chiếu 1"/>
+          <p:cNvSpPr>
+            <a:spLocks noGrp="1" noRot="1" noChangeAspect="1"/>
+          </p:cNvSpPr>
+          <p:nvPr>
+            <p:ph type="sldImg"/>
+          </p:nvPr>
+        </p:nvSpPr>
+        <p:spPr/>
+      </p:sp>
+      <p:sp>
+        <p:nvSpPr>
+          <p:cNvPr id="3" name="Chỗ dành sẵn cho Ghi chú 2"/>
+          <p:cNvSpPr>
+            <a:spLocks noGrp="1"/>
+          </p:cNvSpPr>
+          <p:nvPr>
+            <p:ph type="body" idx="1"/>
+          </p:nvPr>
+        </p:nvSpPr>
+        <p:spPr/>
+        <p:txBody>
+          <a:bodyPr/>
+          <a:lstStyle/>
+          <a:p>
+            <a:endParaRPr lang="en-US"/>
+          </a:p>
+        </p:txBody>
+      </p:sp>
+      <p:sp>
+        <p:nvSpPr>
+          <p:cNvPr id="4" name="Chỗ dành sẵn cho Số hiệu Bản chiếu 3"/>
+          <p:cNvSpPr>
+            <a:spLocks noGrp="1"/>
+          </p:cNvSpPr>
+          <p:nvPr>
+            <p:ph type="sldNum" sz="quarter" idx="10"/>
+          </p:nvPr>
+        </p:nvSpPr>
+        <p:spPr/>
+        <p:txBody>
+          <a:bodyPr/>
+          <a:lstStyle/>
+          <a:p>
+            <a:fld id="{0A3C37BE-C303-496D-B5CD-85F2937540FC}" type="slidenum">
+              <a:rPr lang="vi-VN" smtClean="0"/>
+              <a:pPr/>
+              <a:t>18</a:t>
+            </a:fld>
+            <a:endParaRPr lang="vi-VN" dirty="0"/>
+          </a:p>
+        </p:txBody>
+      </p:sp>
+    </p:spTree>
+    <p:extLst>
+      <p:ext uri="{BB962C8B-B14F-4D97-AF65-F5344CB8AC3E}">
         <p14:creationId xmlns:p14="http://schemas.microsoft.com/office/powerpoint/2010/main" val="3649123845"/>
+      </p:ext>
+    </p:extLst>
+  </p:cSld>
+  <p:clrMapOvr>
+    <a:masterClrMapping/>
+  </p:clrMapOvr>
+</p:notes>
+</file>
+
+<file path=ppt/notesSlides/notesSlide19.xml><?xml version="1.0" encoding="utf-8"?>
+<p:notes xmlns:a="http://schemas.openxmlformats.org/drawingml/2006/main" xmlns:r="http://schemas.openxmlformats.org/officeDocument/2006/relationships" xmlns:p="http://schemas.openxmlformats.org/presentationml/2006/main">
+  <p:cSld>
+    <p:spTree>
+      <p:nvGrpSpPr>
+        <p:cNvPr id="1" name=""/>
+        <p:cNvGrpSpPr/>
+        <p:nvPr/>
+      </p:nvGrpSpPr>
+      <p:grpSpPr>
+        <a:xfrm>
+          <a:off x="0" y="0"/>
+          <a:ext cx="0" cy="0"/>
+          <a:chOff x="0" y="0"/>
+          <a:chExt cx="0" cy="0"/>
+        </a:xfrm>
+      </p:grpSpPr>
+      <p:sp>
+        <p:nvSpPr>
+          <p:cNvPr id="2" name="Chỗ dành sẵn cho Hình ảnh của Bản chiếu 1"/>
+          <p:cNvSpPr>
+            <a:spLocks noGrp="1" noRot="1" noChangeAspect="1"/>
+          </p:cNvSpPr>
+          <p:nvPr>
+            <p:ph type="sldImg"/>
+          </p:nvPr>
+        </p:nvSpPr>
+        <p:spPr/>
+      </p:sp>
+      <p:sp>
+        <p:nvSpPr>
+          <p:cNvPr id="3" name="Chỗ dành sẵn cho Ghi chú 2"/>
+          <p:cNvSpPr>
+            <a:spLocks noGrp="1"/>
+          </p:cNvSpPr>
+          <p:nvPr>
+            <p:ph type="body" idx="1"/>
+          </p:nvPr>
+        </p:nvSpPr>
+        <p:spPr/>
+        <p:txBody>
+          <a:bodyPr/>
+          <a:lstStyle/>
+          <a:p>
+            <a:endParaRPr lang="en-US"/>
+          </a:p>
+        </p:txBody>
+      </p:sp>
+      <p:sp>
+        <p:nvSpPr>
+          <p:cNvPr id="4" name="Chỗ dành sẵn cho Số hiệu Bản chiếu 3"/>
+          <p:cNvSpPr>
+            <a:spLocks noGrp="1"/>
+          </p:cNvSpPr>
+          <p:nvPr>
+            <p:ph type="sldNum" sz="quarter" idx="10"/>
+          </p:nvPr>
+        </p:nvSpPr>
+        <p:spPr/>
+        <p:txBody>
+          <a:bodyPr/>
+          <a:lstStyle/>
+          <a:p>
+            <a:fld id="{0A3C37BE-C303-496D-B5CD-85F2937540FC}" type="slidenum">
+              <a:rPr lang="vi-VN" smtClean="0"/>
+              <a:pPr/>
+              <a:t>19</a:t>
+            </a:fld>
+            <a:endParaRPr lang="vi-VN" dirty="0"/>
+          </a:p>
+        </p:txBody>
+      </p:sp>
+    </p:spTree>
+    <p:extLst>
+      <p:ext uri="{BB962C8B-B14F-4D97-AF65-F5344CB8AC3E}">
+        <p14:creationId xmlns:p14="http://schemas.microsoft.com/office/powerpoint/2010/main" val="1766807989"/>
       </p:ext>
     </p:extLst>
   </p:cSld>
@@ -1699,7 +2395,7 @@
     </p:spTree>
     <p:extLst>
       <p:ext uri="{BB962C8B-B14F-4D97-AF65-F5344CB8AC3E}">
-        <p14:creationId xmlns:p14="http://schemas.microsoft.com/office/powerpoint/2010/main" val="1946839622"/>
+        <p14:creationId xmlns:p14="http://schemas.microsoft.com/office/powerpoint/2010/main" val="2058148883"/>
       </p:ext>
     </p:extLst>
   </p:cSld>
@@ -1939,7 +2635,7 @@
           <a:p>
             <a:fld id="{060A8CA4-36E5-4CD4-A34F-F167FCBBC78C}" type="datetime1">
               <a:rPr lang="vi-VN" smtClean="0"/>
-              <a:t>24/10/2018</a:t>
+              <a:t>10/11/2018</a:t>
             </a:fld>
             <a:endParaRPr lang="vi-VN" dirty="0"/>
           </a:p>
@@ -2272,7 +2968,7 @@
           <a:p>
             <a:fld id="{8BB048DC-A00F-4E65-9A5D-82B972CAB3CE}" type="datetime1">
               <a:rPr lang="vi-VN" smtClean="0"/>
-              <a:t>24/10/2018</a:t>
+              <a:t>10/11/2018</a:t>
             </a:fld>
             <a:endParaRPr lang="vi-VN" dirty="0"/>
           </a:p>
@@ -2493,7 +3189,7 @@
           <a:p>
             <a:fld id="{7AB0F019-6EB6-48BF-9BCB-6162B0647208}" type="datetime1">
               <a:rPr lang="vi-VN" smtClean="0"/>
-              <a:t>24/10/2018</a:t>
+              <a:t>10/11/2018</a:t>
             </a:fld>
             <a:endParaRPr lang="vi-VN" dirty="0"/>
           </a:p>
@@ -2724,7 +3420,7 @@
           <a:p>
             <a:fld id="{AA72C79E-A752-41F4-A780-2D5C71CEDA56}" type="datetime1">
               <a:rPr lang="vi-VN" smtClean="0"/>
-              <a:t>24/10/2018</a:t>
+              <a:t>10/11/2018</a:t>
             </a:fld>
             <a:endParaRPr lang="vi-VN" dirty="0"/>
           </a:p>
@@ -3032,7 +3728,7 @@
           <a:p>
             <a:fld id="{E1977AAD-8913-4E47-8263-ED0930BDDBB2}" type="datetime1">
               <a:rPr lang="vi-VN" smtClean="0"/>
-              <a:t>24/10/2018</a:t>
+              <a:t>10/11/2018</a:t>
             </a:fld>
             <a:endParaRPr lang="vi-VN" dirty="0"/>
           </a:p>
@@ -4112,7 +4808,7 @@
           <a:p>
             <a:fld id="{B1CF4589-33A9-44F2-934C-40037835CE0B}" type="datetime1">
               <a:rPr lang="vi-VN" smtClean="0"/>
-              <a:t>24/10/2018</a:t>
+              <a:t>10/11/2018</a:t>
             </a:fld>
             <a:endParaRPr lang="vi-VN" dirty="0"/>
           </a:p>
@@ -4487,7 +5183,7 @@
           <a:p>
             <a:fld id="{EEA13401-1CA4-41A8-B145-43ED810E3FF3}" type="datetime1">
               <a:rPr lang="vi-VN" smtClean="0"/>
-              <a:t>24/10/2018</a:t>
+              <a:t>10/11/2018</a:t>
             </a:fld>
             <a:endParaRPr lang="vi-VN" dirty="0"/>
           </a:p>
@@ -4952,7 +5648,7 @@
           <a:p>
             <a:fld id="{B6B78E12-15D3-4830-B800-32A97159B7D3}" type="datetime1">
               <a:rPr lang="vi-VN" smtClean="0"/>
-              <a:t>24/10/2018</a:t>
+              <a:t>10/11/2018</a:t>
             </a:fld>
             <a:endParaRPr lang="vi-VN" dirty="0"/>
           </a:p>
@@ -5093,7 +5789,7 @@
           <a:p>
             <a:fld id="{52727B5C-D4FA-4672-9AB2-CAC3FB78006B}" type="datetime1">
               <a:rPr lang="vi-VN" smtClean="0"/>
-              <a:t>24/10/2018</a:t>
+              <a:t>10/11/2018</a:t>
             </a:fld>
             <a:endParaRPr lang="vi-VN" dirty="0"/>
           </a:p>
@@ -5206,7 +5902,7 @@
           <a:p>
             <a:fld id="{5C79D4B6-09EC-466E-A27D-61A0BEC60615}" type="datetime1">
               <a:rPr lang="vi-VN" smtClean="0"/>
-              <a:t>24/10/2018</a:t>
+              <a:t>10/11/2018</a:t>
             </a:fld>
             <a:endParaRPr lang="vi-VN" dirty="0"/>
           </a:p>
@@ -5537,7 +6233,7 @@
           <a:p>
             <a:fld id="{9EC3EF93-EEE8-4795-954B-C706892E4F66}" type="datetime1">
               <a:rPr lang="vi-VN" smtClean="0"/>
-              <a:t>24/10/2018</a:t>
+              <a:t>10/11/2018</a:t>
             </a:fld>
             <a:endParaRPr lang="vi-VN" dirty="0"/>
           </a:p>
@@ -5857,7 +6553,7 @@
           <a:p>
             <a:fld id="{62804CE6-96A6-4530-899E-8F97DCB7022F}" type="datetime1">
               <a:rPr lang="vi-VN" smtClean="0"/>
-              <a:t>24/10/2018</a:t>
+              <a:t>10/11/2018</a:t>
             </a:fld>
             <a:endParaRPr lang="vi-VN" dirty="0"/>
           </a:p>
@@ -6405,7 +7101,7 @@
         </p:nvSpPr>
         <p:spPr>
           <a:xfrm>
-            <a:off x="0" y="2277534"/>
+            <a:off x="0" y="2531534"/>
             <a:ext cx="7154333" cy="1288894"/>
           </a:xfrm>
         </p:spPr>
@@ -6421,13 +7117,20 @@
               </a:lnSpc>
             </a:pPr>
             <a:r>
-              <a:rPr lang="en-US" sz="2800" b="1" dirty="0" smtClean="0">
+              <a:rPr lang="en-US" sz="3500" b="1" dirty="0" smtClean="0">
                 <a:latin typeface="Arial" panose="020B0604020202020204" pitchFamily="34" charset="0"/>
                 <a:cs typeface="Arial" panose="020B0604020202020204" pitchFamily="34" charset="0"/>
               </a:rPr>
-              <a:t>Face Attendance Checking System</a:t>
-            </a:r>
-            <a:endParaRPr lang="en-US" sz="2800" b="1" dirty="0">
+              <a:t>Face Attendance </a:t>
+            </a:r>
+            <a:r>
+              <a:rPr lang="en-US" sz="3500" b="1" dirty="0" smtClean="0">
+                <a:latin typeface="Arial" panose="020B0604020202020204" pitchFamily="34" charset="0"/>
+                <a:cs typeface="Arial" panose="020B0604020202020204" pitchFamily="34" charset="0"/>
+              </a:rPr>
+              <a:t>Checking</a:t>
+            </a:r>
+            <a:endParaRPr lang="en-US" sz="3500" b="1" dirty="0">
               <a:latin typeface="Arial" panose="020B0604020202020204" pitchFamily="34" charset="0"/>
               <a:cs typeface="Arial" panose="020B0604020202020204" pitchFamily="34" charset="0"/>
             </a:endParaRPr>
@@ -6446,8 +7149,8 @@
         </p:nvSpPr>
         <p:spPr>
           <a:xfrm>
-            <a:off x="229787" y="3695888"/>
-            <a:ext cx="6572362" cy="1708699"/>
+            <a:off x="212854" y="3820428"/>
+            <a:ext cx="6572362" cy="1107517"/>
           </a:xfrm>
         </p:spPr>
         <p:txBody>
@@ -6458,39 +7161,44 @@
           <a:p>
             <a:pPr algn="ctr" rtl="0">
               <a:lnSpc>
-                <a:spcPct val="170000"/>
+                <a:spcPct val="150000"/>
               </a:lnSpc>
             </a:pPr>
             <a:r>
               <a:rPr lang="en-US" sz="2200" dirty="0" smtClean="0">
                 <a:latin typeface="Arial" panose="020B0604020202020204" pitchFamily="34" charset="0"/>
               </a:rPr>
-              <a:t>Course: Artificial Intelligence in Control Engineering</a:t>
-            </a:r>
-          </a:p>
-          <a:p>
-            <a:pPr algn="ctr" rtl="0">
-              <a:lnSpc>
-                <a:spcPct val="170000"/>
-              </a:lnSpc>
-            </a:pPr>
+              <a:t>Course: </a:t>
+            </a:r>
             <a:r>
               <a:rPr lang="en-US" sz="2200" dirty="0" smtClean="0">
                 <a:latin typeface="Arial" panose="020B0604020202020204" pitchFamily="34" charset="0"/>
               </a:rPr>
-              <a:t>Lecturer: </a:t>
-            </a:r>
-            <a:r>
-              <a:rPr lang="en-US" sz="2200" dirty="0" err="1" smtClean="0">
+              <a:t>EE3063</a:t>
+            </a:r>
+            <a:r>
+              <a:rPr lang="en-US" sz="2200" dirty="0">
                 <a:latin typeface="Arial" panose="020B0604020202020204" pitchFamily="34" charset="0"/>
               </a:rPr>
-              <a:t>Dr.Pham</a:t>
+              <a:t> </a:t>
             </a:r>
             <a:r>
               <a:rPr lang="en-US" sz="2200" dirty="0" smtClean="0">
                 <a:latin typeface="Arial" panose="020B0604020202020204" pitchFamily="34" charset="0"/>
               </a:rPr>
-              <a:t> Viet </a:t>
+              <a:t>- </a:t>
+            </a:r>
+            <a:r>
+              <a:rPr lang="en-US" sz="2200" dirty="0" smtClean="0">
+                <a:latin typeface="Arial" panose="020B0604020202020204" pitchFamily="34" charset="0"/>
+              </a:rPr>
+              <a:t>Dr. Pham </a:t>
+            </a:r>
+            <a:r>
+              <a:rPr lang="en-US" sz="2200" dirty="0" smtClean="0">
+                <a:latin typeface="Arial" panose="020B0604020202020204" pitchFamily="34" charset="0"/>
+              </a:rPr>
+              <a:t>Viet </a:t>
             </a:r>
             <a:r>
               <a:rPr lang="en-US" sz="2200" dirty="0" err="1" smtClean="0">
@@ -6505,14 +7213,14 @@
           <a:p>
             <a:pPr algn="ctr" rtl="0">
               <a:lnSpc>
-                <a:spcPct val="170000"/>
+                <a:spcPct val="150000"/>
               </a:lnSpc>
             </a:pPr>
             <a:r>
               <a:rPr lang="en-US" sz="2200" dirty="0" smtClean="0">
                 <a:latin typeface="Arial" panose="020B0604020202020204" pitchFamily="34" charset="0"/>
               </a:rPr>
-              <a:t>Group: 09</a:t>
+              <a:t>Conducted by Group 09</a:t>
             </a:r>
             <a:endParaRPr lang="en-US" sz="2200" dirty="0">
               <a:latin typeface="Arial" panose="020B0604020202020204" pitchFamily="34" charset="0"/>
@@ -6548,6 +7256,77 @@
             <a:off x="7154333" y="1310656"/>
             <a:ext cx="5037667" cy="4302744"/>
           </a:xfrm>
+        </p:spPr>
+      </p:pic>
+      <p:sp>
+        <p:nvSpPr>
+          <p:cNvPr id="2" name="TextBox 1"/>
+          <p:cNvSpPr txBox="1"/>
+          <p:nvPr/>
+        </p:nvSpPr>
+        <p:spPr>
+          <a:xfrm>
+            <a:off x="2931347" y="5290235"/>
+            <a:ext cx="1135375" cy="323165"/>
+          </a:xfrm>
+          <a:prstGeom prst="rect">
+            <a:avLst/>
+          </a:prstGeom>
+          <a:noFill/>
+        </p:spPr>
+        <p:txBody>
+          <a:bodyPr wrap="none" rtlCol="0">
+            <a:spAutoFit/>
+          </a:bodyPr>
+          <a:lstStyle/>
+          <a:p>
+            <a:r>
+              <a:rPr lang="en-US" sz="1500" dirty="0" smtClean="0"/>
+              <a:t>21/11/2018</a:t>
+            </a:r>
+            <a:endParaRPr lang="en-US" sz="1500" dirty="0"/>
+          </a:p>
+        </p:txBody>
+      </p:sp>
+      <p:pic>
+        <p:nvPicPr>
+          <p:cNvPr id="1030" name="Picture 6" descr="Image result for HCMUT logo"/>
+          <p:cNvPicPr>
+            <a:picLocks noChangeAspect="1" noChangeArrowheads="1"/>
+          </p:cNvPicPr>
+          <p:nvPr/>
+        </p:nvPicPr>
+        <p:blipFill>
+          <a:blip r:embed="rId4" cstate="print">
+            <a:extLst>
+              <a:ext uri="{28A0092B-C50C-407E-A947-70E740481C1C}">
+                <a14:useLocalDpi xmlns:a14="http://schemas.microsoft.com/office/drawing/2010/main" val="0"/>
+              </a:ext>
+            </a:extLst>
+          </a:blip>
+          <a:srcRect/>
+          <a:stretch>
+            <a:fillRect/>
+          </a:stretch>
+        </p:blipFill>
+        <p:spPr bwMode="auto">
+          <a:xfrm>
+            <a:off x="212854" y="1310656"/>
+            <a:ext cx="841818" cy="858588"/>
+          </a:xfrm>
+          <a:prstGeom prst="rect">
+            <a:avLst/>
+          </a:prstGeom>
+          <a:noFill/>
+          <a:extLst>
+            <a:ext uri="{909E8E84-426E-40DD-AFC4-6F175D3DCCD1}">
+              <a14:hiddenFill xmlns:a14="http://schemas.microsoft.com/office/drawing/2010/main">
+                <a:solidFill>
+                  <a:srgbClr val="FFFFFF"/>
+                </a:solidFill>
+              </a14:hiddenFill>
+            </a:ext>
+          </a:extLst>
         </p:spPr>
       </p:pic>
     </p:spTree>
@@ -6647,7 +7426,7 @@
                 <a:latin typeface="Arial" panose="020B0604020202020204" pitchFamily="34" charset="0"/>
                 <a:cs typeface="Arial" panose="020B0604020202020204" pitchFamily="34" charset="0"/>
               </a:rPr>
-              <a:t>Demo</a:t>
+              <a:t>Implementation</a:t>
             </a:r>
             <a:endParaRPr lang="vi-VN" sz="4000" dirty="0">
               <a:latin typeface="Arial" panose="020B0604020202020204" pitchFamily="34" charset="0"/>
@@ -6656,10 +7435,175 @@
           </a:p>
         </p:txBody>
       </p:sp>
+      <p:sp>
+        <p:nvSpPr>
+          <p:cNvPr id="5" name="TextBox 4"/>
+          <p:cNvSpPr txBox="1"/>
+          <p:nvPr/>
+        </p:nvSpPr>
+        <p:spPr>
+          <a:xfrm>
+            <a:off x="1104900" y="1438101"/>
+            <a:ext cx="6600998" cy="446276"/>
+          </a:xfrm>
+          <a:prstGeom prst="rect">
+            <a:avLst/>
+          </a:prstGeom>
+          <a:noFill/>
+        </p:spPr>
+        <p:txBody>
+          <a:bodyPr wrap="square" rtlCol="0">
+            <a:spAutoFit/>
+          </a:bodyPr>
+          <a:lstStyle/>
+          <a:p>
+            <a:r>
+              <a:rPr lang="en-US" sz="2300" dirty="0" smtClean="0">
+                <a:solidFill>
+                  <a:schemeClr val="tx2"/>
+                </a:solidFill>
+              </a:rPr>
+              <a:t>Face detection (based on Histogram Of Gradient)</a:t>
+            </a:r>
+            <a:endParaRPr lang="en-US" sz="2300" dirty="0">
+              <a:solidFill>
+                <a:schemeClr val="tx2"/>
+              </a:solidFill>
+            </a:endParaRPr>
+          </a:p>
+        </p:txBody>
+      </p:sp>
+      <p:pic>
+        <p:nvPicPr>
+          <p:cNvPr id="3074" name="Picture 2" descr="https://cdn-images-1.medium.com/max/1600/1*6xgev0r-qn4oR88FrW6fiA.png"/>
+          <p:cNvPicPr>
+            <a:picLocks noChangeAspect="1" noChangeArrowheads="1"/>
+          </p:cNvPicPr>
+          <p:nvPr/>
+        </p:nvPicPr>
+        <p:blipFill>
+          <a:blip r:embed="rId3" cstate="email">
+            <a:extLst>
+              <a:ext uri="{28A0092B-C50C-407E-A947-70E740481C1C}">
+                <a14:useLocalDpi xmlns:a14="http://schemas.microsoft.com/office/drawing/2010/main"/>
+              </a:ext>
+            </a:extLst>
+          </a:blip>
+          <a:srcRect/>
+          <a:stretch>
+            <a:fillRect/>
+          </a:stretch>
+        </p:blipFill>
+        <p:spPr bwMode="auto">
+          <a:xfrm>
+            <a:off x="5535353" y="2149316"/>
+            <a:ext cx="5550229" cy="3868921"/>
+          </a:xfrm>
+          <a:prstGeom prst="rect">
+            <a:avLst/>
+          </a:prstGeom>
+          <a:noFill/>
+          <a:extLst>
+            <a:ext uri="{909E8E84-426E-40DD-AFC4-6F175D3DCCD1}">
+              <a14:hiddenFill xmlns:a14="http://schemas.microsoft.com/office/drawing/2010/main">
+                <a:solidFill>
+                  <a:srgbClr val="FFFFFF"/>
+                </a:solidFill>
+              </a14:hiddenFill>
+            </a:ext>
+          </a:extLst>
+        </p:spPr>
+      </p:pic>
+      <p:grpSp>
+        <p:nvGrpSpPr>
+          <p:cNvPr id="8" name="Group 7"/>
+          <p:cNvGrpSpPr/>
+          <p:nvPr/>
+        </p:nvGrpSpPr>
+        <p:grpSpPr>
+          <a:xfrm>
+            <a:off x="1104900" y="3137341"/>
+            <a:ext cx="3749686" cy="1561732"/>
+            <a:chOff x="1104900" y="2149317"/>
+            <a:chExt cx="3749686" cy="1561732"/>
+          </a:xfrm>
+        </p:grpSpPr>
+        <p:pic>
+          <p:nvPicPr>
+            <p:cNvPr id="9" name="Picture 2" descr="https://cdn-images-1.medium.com/max/1600/1*WF54tQnH1Hgpoqk-Vtf9Lg.gif"/>
+            <p:cNvPicPr>
+              <a:picLocks noChangeAspect="1" noChangeArrowheads="1" noCrop="1"/>
+            </p:cNvPicPr>
+            <p:nvPr/>
+          </p:nvPicPr>
+          <p:blipFill>
+            <a:blip r:embed="rId4">
+              <a:extLst>
+                <a:ext uri="{28A0092B-C50C-407E-A947-70E740481C1C}">
+                  <a14:useLocalDpi xmlns:a14="http://schemas.microsoft.com/office/drawing/2010/main" val="0"/>
+                </a:ext>
+              </a:extLst>
+            </a:blip>
+            <a:srcRect/>
+            <a:stretch>
+              <a:fillRect/>
+            </a:stretch>
+          </p:blipFill>
+          <p:spPr bwMode="auto">
+            <a:xfrm>
+              <a:off x="1104900" y="2149317"/>
+              <a:ext cx="3749686" cy="1192400"/>
+            </a:xfrm>
+            <a:prstGeom prst="rect">
+              <a:avLst/>
+            </a:prstGeom>
+            <a:noFill/>
+            <a:extLst>
+              <a:ext uri="{909E8E84-426E-40DD-AFC4-6F175D3DCCD1}">
+                <a14:hiddenFill xmlns:a14="http://schemas.microsoft.com/office/drawing/2010/main">
+                  <a:solidFill>
+                    <a:srgbClr val="FFFFFF"/>
+                  </a:solidFill>
+                </a14:hiddenFill>
+              </a:ext>
+            </a:extLst>
+          </p:spPr>
+        </p:pic>
+        <p:sp>
+          <p:nvSpPr>
+            <p:cNvPr id="10" name="TextBox 9"/>
+            <p:cNvSpPr txBox="1"/>
+            <p:nvPr/>
+          </p:nvSpPr>
+          <p:spPr>
+            <a:xfrm>
+              <a:off x="2470629" y="3341717"/>
+              <a:ext cx="1018227" cy="369332"/>
+            </a:xfrm>
+            <a:prstGeom prst="rect">
+              <a:avLst/>
+            </a:prstGeom>
+            <a:noFill/>
+          </p:spPr>
+          <p:txBody>
+            <a:bodyPr wrap="square" rtlCol="0">
+              <a:spAutoFit/>
+            </a:bodyPr>
+            <a:lstStyle/>
+            <a:p>
+              <a:r>
+                <a:rPr lang="en-US" dirty="0" smtClean="0"/>
+                <a:t>gradient</a:t>
+              </a:r>
+              <a:endParaRPr lang="en-US" dirty="0"/>
+            </a:p>
+          </p:txBody>
+        </p:sp>
+      </p:grpSp>
     </p:spTree>
     <p:extLst>
       <p:ext uri="{BB962C8B-B14F-4D97-AF65-F5344CB8AC3E}">
-        <p14:creationId xmlns:p14="http://schemas.microsoft.com/office/powerpoint/2010/main" val="1115007891"/>
+        <p14:creationId xmlns:p14="http://schemas.microsoft.com/office/powerpoint/2010/main" val="1501795992"/>
       </p:ext>
     </p:extLst>
   </p:cSld>
@@ -6753,12 +7697,1766 @@
                 <a:latin typeface="Arial" panose="020B0604020202020204" pitchFamily="34" charset="0"/>
                 <a:cs typeface="Arial" panose="020B0604020202020204" pitchFamily="34" charset="0"/>
               </a:rPr>
-              <a:t>Conclusion</a:t>
+              <a:t>Implementation</a:t>
             </a:r>
             <a:endParaRPr lang="vi-VN" sz="4000" dirty="0">
               <a:latin typeface="Arial" panose="020B0604020202020204" pitchFamily="34" charset="0"/>
               <a:cs typeface="Arial" panose="020B0604020202020204" pitchFamily="34" charset="0"/>
             </a:endParaRPr>
+          </a:p>
+        </p:txBody>
+      </p:sp>
+      <p:pic>
+        <p:nvPicPr>
+          <p:cNvPr id="4098" name="Picture 2" descr="https://cdn-images-1.medium.com/max/1600/1*AbEg31EgkbXSQehuNJBlWg.png"/>
+          <p:cNvPicPr>
+            <a:picLocks noChangeAspect="1" noChangeArrowheads="1"/>
+          </p:cNvPicPr>
+          <p:nvPr/>
+        </p:nvPicPr>
+        <p:blipFill>
+          <a:blip r:embed="rId3">
+            <a:extLst>
+              <a:ext uri="{28A0092B-C50C-407E-A947-70E740481C1C}">
+                <a14:useLocalDpi xmlns:a14="http://schemas.microsoft.com/office/drawing/2010/main"/>
+              </a:ext>
+            </a:extLst>
+          </a:blip>
+          <a:srcRect/>
+          <a:stretch>
+            <a:fillRect/>
+          </a:stretch>
+        </p:blipFill>
+        <p:spPr bwMode="auto">
+          <a:xfrm>
+            <a:off x="1456326" y="2412032"/>
+            <a:ext cx="3943350" cy="3752851"/>
+          </a:xfrm>
+          <a:prstGeom prst="rect">
+            <a:avLst/>
+          </a:prstGeom>
+          <a:noFill/>
+          <a:extLst>
+            <a:ext uri="{909E8E84-426E-40DD-AFC4-6F175D3DCCD1}">
+              <a14:hiddenFill xmlns:a14="http://schemas.microsoft.com/office/drawing/2010/main">
+                <a:solidFill>
+                  <a:srgbClr val="FFFFFF"/>
+                </a:solidFill>
+              </a14:hiddenFill>
+            </a:ext>
+          </a:extLst>
+        </p:spPr>
+      </p:pic>
+      <p:sp>
+        <p:nvSpPr>
+          <p:cNvPr id="8" name="TextBox 7"/>
+          <p:cNvSpPr txBox="1"/>
+          <p:nvPr/>
+        </p:nvSpPr>
+        <p:spPr>
+          <a:xfrm>
+            <a:off x="1104900" y="1438101"/>
+            <a:ext cx="2835333" cy="446276"/>
+          </a:xfrm>
+          <a:prstGeom prst="rect">
+            <a:avLst/>
+          </a:prstGeom>
+          <a:noFill/>
+        </p:spPr>
+        <p:txBody>
+          <a:bodyPr wrap="square" rtlCol="0">
+            <a:spAutoFit/>
+          </a:bodyPr>
+          <a:lstStyle/>
+          <a:p>
+            <a:r>
+              <a:rPr lang="en-US" sz="2300" dirty="0" smtClean="0">
+                <a:solidFill>
+                  <a:schemeClr val="tx2"/>
+                </a:solidFill>
+              </a:rPr>
+              <a:t>Landmark detection</a:t>
+            </a:r>
+            <a:endParaRPr lang="en-US" sz="2300" dirty="0">
+              <a:solidFill>
+                <a:schemeClr val="tx2"/>
+              </a:solidFill>
+            </a:endParaRPr>
+          </a:p>
+        </p:txBody>
+      </p:sp>
+      <p:pic>
+        <p:nvPicPr>
+          <p:cNvPr id="4100" name="Picture 4" descr="https://cdn-images-1.medium.com/max/1600/1*xBJ4H2lbCMfzIfMrOm9BEQ.jpeg"/>
+          <p:cNvPicPr>
+            <a:picLocks noChangeAspect="1" noChangeArrowheads="1"/>
+          </p:cNvPicPr>
+          <p:nvPr/>
+        </p:nvPicPr>
+        <p:blipFill>
+          <a:blip r:embed="rId4" cstate="email">
+            <a:extLst>
+              <a:ext uri="{28A0092B-C50C-407E-A947-70E740481C1C}">
+                <a14:useLocalDpi xmlns:a14="http://schemas.microsoft.com/office/drawing/2010/main"/>
+              </a:ext>
+            </a:extLst>
+          </a:blip>
+          <a:srcRect/>
+          <a:stretch>
+            <a:fillRect/>
+          </a:stretch>
+        </p:blipFill>
+        <p:spPr bwMode="auto">
+          <a:xfrm>
+            <a:off x="6423371" y="2412032"/>
+            <a:ext cx="4307584" cy="3752851"/>
+          </a:xfrm>
+          <a:prstGeom prst="rect">
+            <a:avLst/>
+          </a:prstGeom>
+          <a:noFill/>
+          <a:extLst>
+            <a:ext uri="{909E8E84-426E-40DD-AFC4-6F175D3DCCD1}">
+              <a14:hiddenFill xmlns:a14="http://schemas.microsoft.com/office/drawing/2010/main">
+                <a:solidFill>
+                  <a:srgbClr val="FFFFFF"/>
+                </a:solidFill>
+              </a14:hiddenFill>
+            </a:ext>
+          </a:extLst>
+        </p:spPr>
+      </p:pic>
+    </p:spTree>
+    <p:extLst>
+      <p:ext uri="{BB962C8B-B14F-4D97-AF65-F5344CB8AC3E}">
+        <p14:creationId xmlns:p14="http://schemas.microsoft.com/office/powerpoint/2010/main" val="1290970356"/>
+      </p:ext>
+    </p:extLst>
+  </p:cSld>
+  <p:clrMapOvr>
+    <a:masterClrMapping/>
+  </p:clrMapOvr>
+  <mc:AlternateContent xmlns:mc="http://schemas.openxmlformats.org/markup-compatibility/2006" xmlns:p14="http://schemas.microsoft.com/office/powerpoint/2010/main">
+    <mc:Choice Requires="p14">
+      <p:transition p14:dur="0"/>
+    </mc:Choice>
+    <mc:Fallback xmlns="">
+      <p:transition/>
+    </mc:Fallback>
+  </mc:AlternateContent>
+  <p:timing>
+    <p:tnLst>
+      <p:par>
+        <p:cTn id="1" dur="indefinite" restart="never" nodeType="tmRoot"/>
+      </p:par>
+    </p:tnLst>
+  </p:timing>
+</p:sld>
+</file>
+
+<file path=ppt/slides/slide12.xml><?xml version="1.0" encoding="utf-8"?>
+<p:sld xmlns:a="http://schemas.openxmlformats.org/drawingml/2006/main" xmlns:r="http://schemas.openxmlformats.org/officeDocument/2006/relationships" xmlns:p="http://schemas.openxmlformats.org/presentationml/2006/main">
+  <p:cSld>
+    <p:spTree>
+      <p:nvGrpSpPr>
+        <p:cNvPr id="1" name=""/>
+        <p:cNvGrpSpPr/>
+        <p:nvPr/>
+      </p:nvGrpSpPr>
+      <p:grpSpPr>
+        <a:xfrm>
+          <a:off x="0" y="0"/>
+          <a:ext cx="0" cy="0"/>
+          <a:chOff x="0" y="0"/>
+          <a:chExt cx="0" cy="0"/>
+        </a:xfrm>
+      </p:grpSpPr>
+      <p:sp>
+        <p:nvSpPr>
+          <p:cNvPr id="7" name="Slide Number Placeholder 6"/>
+          <p:cNvSpPr>
+            <a:spLocks noGrp="1"/>
+          </p:cNvSpPr>
+          <p:nvPr>
+            <p:ph type="sldNum" sz="quarter" idx="12"/>
+          </p:nvPr>
+        </p:nvSpPr>
+        <p:spPr/>
+        <p:txBody>
+          <a:bodyPr/>
+          <a:lstStyle/>
+          <a:p>
+            <a:pPr rtl="0"/>
+            <a:fld id="{0FF54DE5-C571-48E8-A5BC-B369434E2F44}" type="slidenum">
+              <a:rPr lang="vi-VN" noProof="0" smtClean="0"/>
+              <a:t>12</a:t>
+            </a:fld>
+            <a:endParaRPr lang="vi-VN" noProof="0" dirty="0"/>
+          </a:p>
+        </p:txBody>
+      </p:sp>
+      <p:sp>
+        <p:nvSpPr>
+          <p:cNvPr id="16" name="Tiêu đề 1"/>
+          <p:cNvSpPr>
+            <a:spLocks noGrp="1"/>
+          </p:cNvSpPr>
+          <p:nvPr>
+            <p:ph type="title"/>
+          </p:nvPr>
+        </p:nvSpPr>
+        <p:spPr>
+          <a:xfrm>
+            <a:off x="1104900" y="76200"/>
+            <a:ext cx="9980682" cy="1096962"/>
+          </a:xfrm>
+        </p:spPr>
+        <p:txBody>
+          <a:bodyPr rtlCol="0">
+            <a:normAutofit/>
+          </a:bodyPr>
+          <a:lstStyle/>
+          <a:p>
+            <a:pPr rtl="0"/>
+            <a:r>
+              <a:rPr lang="en-US" sz="4000" dirty="0" smtClean="0">
+                <a:latin typeface="Arial" panose="020B0604020202020204" pitchFamily="34" charset="0"/>
+                <a:cs typeface="Arial" panose="020B0604020202020204" pitchFamily="34" charset="0"/>
+              </a:rPr>
+              <a:t>Implementation</a:t>
+            </a:r>
+            <a:endParaRPr lang="vi-VN" sz="4000" dirty="0">
+              <a:latin typeface="Arial" panose="020B0604020202020204" pitchFamily="34" charset="0"/>
+              <a:cs typeface="Arial" panose="020B0604020202020204" pitchFamily="34" charset="0"/>
+            </a:endParaRPr>
+          </a:p>
+        </p:txBody>
+      </p:sp>
+      <p:sp>
+        <p:nvSpPr>
+          <p:cNvPr id="8" name="TextBox 7"/>
+          <p:cNvSpPr txBox="1"/>
+          <p:nvPr/>
+        </p:nvSpPr>
+        <p:spPr>
+          <a:xfrm>
+            <a:off x="1104900" y="1438101"/>
+            <a:ext cx="2835333" cy="446276"/>
+          </a:xfrm>
+          <a:prstGeom prst="rect">
+            <a:avLst/>
+          </a:prstGeom>
+          <a:noFill/>
+        </p:spPr>
+        <p:txBody>
+          <a:bodyPr wrap="square" rtlCol="0">
+            <a:spAutoFit/>
+          </a:bodyPr>
+          <a:lstStyle/>
+          <a:p>
+            <a:r>
+              <a:rPr lang="en-US" sz="2300" dirty="0" smtClean="0">
+                <a:solidFill>
+                  <a:schemeClr val="tx2"/>
+                </a:solidFill>
+              </a:rPr>
+              <a:t>Landmark detection</a:t>
+            </a:r>
+            <a:endParaRPr lang="en-US" sz="2300" dirty="0">
+              <a:solidFill>
+                <a:schemeClr val="tx2"/>
+              </a:solidFill>
+            </a:endParaRPr>
+          </a:p>
+        </p:txBody>
+      </p:sp>
+    </p:spTree>
+    <p:extLst>
+      <p:ext uri="{BB962C8B-B14F-4D97-AF65-F5344CB8AC3E}">
+        <p14:creationId xmlns:p14="http://schemas.microsoft.com/office/powerpoint/2010/main" val="3895349767"/>
+      </p:ext>
+    </p:extLst>
+  </p:cSld>
+  <p:clrMapOvr>
+    <a:masterClrMapping/>
+  </p:clrMapOvr>
+  <mc:AlternateContent xmlns:mc="http://schemas.openxmlformats.org/markup-compatibility/2006" xmlns:p14="http://schemas.microsoft.com/office/powerpoint/2010/main">
+    <mc:Choice Requires="p14">
+      <p:transition p14:dur="0"/>
+    </mc:Choice>
+    <mc:Fallback xmlns="">
+      <p:transition/>
+    </mc:Fallback>
+  </mc:AlternateContent>
+  <p:timing>
+    <p:tnLst>
+      <p:par>
+        <p:cTn id="1" dur="indefinite" restart="never" nodeType="tmRoot"/>
+      </p:par>
+    </p:tnLst>
+  </p:timing>
+</p:sld>
+</file>
+
+<file path=ppt/slides/slide13.xml><?xml version="1.0" encoding="utf-8"?>
+<p:sld xmlns:a="http://schemas.openxmlformats.org/drawingml/2006/main" xmlns:r="http://schemas.openxmlformats.org/officeDocument/2006/relationships" xmlns:p="http://schemas.openxmlformats.org/presentationml/2006/main">
+  <p:cSld>
+    <p:spTree>
+      <p:nvGrpSpPr>
+        <p:cNvPr id="1" name=""/>
+        <p:cNvGrpSpPr/>
+        <p:nvPr/>
+      </p:nvGrpSpPr>
+      <p:grpSpPr>
+        <a:xfrm>
+          <a:off x="0" y="0"/>
+          <a:ext cx="0" cy="0"/>
+          <a:chOff x="0" y="0"/>
+          <a:chExt cx="0" cy="0"/>
+        </a:xfrm>
+      </p:grpSpPr>
+      <p:sp>
+        <p:nvSpPr>
+          <p:cNvPr id="7" name="Slide Number Placeholder 6"/>
+          <p:cNvSpPr>
+            <a:spLocks noGrp="1"/>
+          </p:cNvSpPr>
+          <p:nvPr>
+            <p:ph type="sldNum" sz="quarter" idx="12"/>
+          </p:nvPr>
+        </p:nvSpPr>
+        <p:spPr/>
+        <p:txBody>
+          <a:bodyPr/>
+          <a:lstStyle/>
+          <a:p>
+            <a:pPr rtl="0"/>
+            <a:fld id="{0FF54DE5-C571-48E8-A5BC-B369434E2F44}" type="slidenum">
+              <a:rPr lang="vi-VN" noProof="0" smtClean="0"/>
+              <a:t>13</a:t>
+            </a:fld>
+            <a:endParaRPr lang="vi-VN" noProof="0" dirty="0"/>
+          </a:p>
+        </p:txBody>
+      </p:sp>
+      <p:sp>
+        <p:nvSpPr>
+          <p:cNvPr id="16" name="Tiêu đề 1"/>
+          <p:cNvSpPr>
+            <a:spLocks noGrp="1"/>
+          </p:cNvSpPr>
+          <p:nvPr>
+            <p:ph type="title"/>
+          </p:nvPr>
+        </p:nvSpPr>
+        <p:spPr>
+          <a:xfrm>
+            <a:off x="1104900" y="76200"/>
+            <a:ext cx="9980682" cy="1096962"/>
+          </a:xfrm>
+        </p:spPr>
+        <p:txBody>
+          <a:bodyPr rtlCol="0">
+            <a:normAutofit/>
+          </a:bodyPr>
+          <a:lstStyle/>
+          <a:p>
+            <a:pPr rtl="0"/>
+            <a:r>
+              <a:rPr lang="en-US" sz="4000" dirty="0" smtClean="0">
+                <a:latin typeface="Arial" panose="020B0604020202020204" pitchFamily="34" charset="0"/>
+                <a:cs typeface="Arial" panose="020B0604020202020204" pitchFamily="34" charset="0"/>
+              </a:rPr>
+              <a:t>Implementation</a:t>
+            </a:r>
+            <a:endParaRPr lang="vi-VN" sz="4000" dirty="0">
+              <a:latin typeface="Arial" panose="020B0604020202020204" pitchFamily="34" charset="0"/>
+              <a:cs typeface="Arial" panose="020B0604020202020204" pitchFamily="34" charset="0"/>
+            </a:endParaRPr>
+          </a:p>
+        </p:txBody>
+      </p:sp>
+      <p:sp>
+        <p:nvSpPr>
+          <p:cNvPr id="8" name="TextBox 7"/>
+          <p:cNvSpPr txBox="1"/>
+          <p:nvPr/>
+        </p:nvSpPr>
+        <p:spPr>
+          <a:xfrm>
+            <a:off x="1104900" y="1438101"/>
+            <a:ext cx="2585951" cy="446276"/>
+          </a:xfrm>
+          <a:prstGeom prst="rect">
+            <a:avLst/>
+          </a:prstGeom>
+          <a:noFill/>
+        </p:spPr>
+        <p:txBody>
+          <a:bodyPr wrap="square" rtlCol="0">
+            <a:spAutoFit/>
+          </a:bodyPr>
+          <a:lstStyle/>
+          <a:p>
+            <a:r>
+              <a:rPr lang="en-US" sz="2300" dirty="0" smtClean="0">
+                <a:solidFill>
+                  <a:schemeClr val="tx2"/>
+                </a:solidFill>
+              </a:rPr>
+              <a:t>Face recognition</a:t>
+            </a:r>
+            <a:endParaRPr lang="en-US" sz="2300" dirty="0">
+              <a:solidFill>
+                <a:schemeClr val="tx2"/>
+              </a:solidFill>
+            </a:endParaRPr>
+          </a:p>
+        </p:txBody>
+      </p:sp>
+      <p:grpSp>
+        <p:nvGrpSpPr>
+          <p:cNvPr id="10" name="Group 9"/>
+          <p:cNvGrpSpPr/>
+          <p:nvPr/>
+        </p:nvGrpSpPr>
+        <p:grpSpPr>
+          <a:xfrm>
+            <a:off x="2229579" y="2183815"/>
+            <a:ext cx="8013956" cy="1830767"/>
+            <a:chOff x="2165539" y="2566201"/>
+            <a:chExt cx="8013956" cy="1830767"/>
+          </a:xfrm>
+        </p:grpSpPr>
+        <p:pic>
+          <p:nvPicPr>
+            <p:cNvPr id="2" name="Picture 1"/>
+            <p:cNvPicPr>
+              <a:picLocks noChangeAspect="1"/>
+            </p:cNvPicPr>
+            <p:nvPr/>
+          </p:nvPicPr>
+          <p:blipFill>
+            <a:blip r:embed="rId3" cstate="print">
+              <a:extLst>
+                <a:ext uri="{28A0092B-C50C-407E-A947-70E740481C1C}">
+                  <a14:useLocalDpi xmlns:a14="http://schemas.microsoft.com/office/drawing/2010/main" val="0"/>
+                </a:ext>
+              </a:extLst>
+            </a:blip>
+            <a:stretch>
+              <a:fillRect/>
+            </a:stretch>
+          </p:blipFill>
+          <p:spPr>
+            <a:xfrm>
+              <a:off x="2165539" y="2874216"/>
+              <a:ext cx="1229635" cy="1264614"/>
+            </a:xfrm>
+            <a:prstGeom prst="rect">
+              <a:avLst/>
+            </a:prstGeom>
+          </p:spPr>
+        </p:pic>
+        <p:pic>
+          <p:nvPicPr>
+            <p:cNvPr id="3" name="Picture 2"/>
+            <p:cNvPicPr>
+              <a:picLocks noChangeAspect="1"/>
+            </p:cNvPicPr>
+            <p:nvPr/>
+          </p:nvPicPr>
+          <p:blipFill>
+            <a:blip r:embed="rId4" cstate="print">
+              <a:extLst>
+                <a:ext uri="{28A0092B-C50C-407E-A947-70E740481C1C}">
+                  <a14:useLocalDpi xmlns:a14="http://schemas.microsoft.com/office/drawing/2010/main" val="0"/>
+                </a:ext>
+              </a:extLst>
+            </a:blip>
+            <a:stretch>
+              <a:fillRect/>
+            </a:stretch>
+          </p:blipFill>
+          <p:spPr>
+            <a:xfrm>
+              <a:off x="4232344" y="2566201"/>
+              <a:ext cx="5947151" cy="1830767"/>
+            </a:xfrm>
+            <a:prstGeom prst="rect">
+              <a:avLst/>
+            </a:prstGeom>
+          </p:spPr>
+        </p:pic>
+      </p:grpSp>
+      <p:cxnSp>
+        <p:nvCxnSpPr>
+          <p:cNvPr id="5" name="Straight Arrow Connector 4"/>
+          <p:cNvCxnSpPr>
+            <a:stCxn id="2" idx="3"/>
+            <a:endCxn id="3" idx="1"/>
+          </p:cNvCxnSpPr>
+          <p:nvPr/>
+        </p:nvCxnSpPr>
+        <p:spPr>
+          <a:xfrm flipV="1">
+            <a:off x="3459214" y="3099199"/>
+            <a:ext cx="837170" cy="24938"/>
+          </a:xfrm>
+          <a:prstGeom prst="straightConnector1">
+            <a:avLst/>
+          </a:prstGeom>
+          <a:ln>
+            <a:solidFill>
+              <a:schemeClr val="accent1"/>
+            </a:solidFill>
+            <a:tailEnd type="triangle"/>
+          </a:ln>
+        </p:spPr>
+        <p:style>
+          <a:lnRef idx="1">
+            <a:schemeClr val="accent1"/>
+          </a:lnRef>
+          <a:fillRef idx="0">
+            <a:schemeClr val="accent1"/>
+          </a:fillRef>
+          <a:effectRef idx="0">
+            <a:schemeClr val="accent1"/>
+          </a:effectRef>
+          <a:fontRef idx="minor">
+            <a:schemeClr val="tx1"/>
+          </a:fontRef>
+        </p:style>
+      </p:cxnSp>
+      <p:sp>
+        <p:nvSpPr>
+          <p:cNvPr id="11" name="TextBox 10"/>
+          <p:cNvSpPr txBox="1"/>
+          <p:nvPr/>
+        </p:nvSpPr>
+        <p:spPr>
+          <a:xfrm>
+            <a:off x="7037202" y="4587240"/>
+            <a:ext cx="2682145" cy="1619482"/>
+          </a:xfrm>
+          <a:prstGeom prst="rect">
+            <a:avLst/>
+          </a:prstGeom>
+          <a:noFill/>
+        </p:spPr>
+        <p:txBody>
+          <a:bodyPr wrap="none" rtlCol="0">
+            <a:spAutoFit/>
+          </a:bodyPr>
+          <a:lstStyle/>
+          <a:p>
+            <a:pPr>
+              <a:lnSpc>
+                <a:spcPct val="150000"/>
+              </a:lnSpc>
+            </a:pPr>
+            <a:r>
+              <a:rPr lang="en-US" sz="2300" b="1" dirty="0" smtClean="0"/>
+              <a:t>Feature vector:</a:t>
+            </a:r>
+          </a:p>
+          <a:p>
+            <a:pPr marL="285750" indent="-285750">
+              <a:lnSpc>
+                <a:spcPct val="150000"/>
+              </a:lnSpc>
+              <a:buFont typeface="Arial" panose="020B0604020202020204" pitchFamily="34" charset="0"/>
+              <a:buChar char="•"/>
+            </a:pPr>
+            <a:r>
+              <a:rPr lang="en-US" sz="2300" dirty="0" smtClean="0"/>
+              <a:t>Low-dimensional</a:t>
+            </a:r>
+          </a:p>
+          <a:p>
+            <a:pPr marL="285750" indent="-285750">
+              <a:lnSpc>
+                <a:spcPct val="150000"/>
+              </a:lnSpc>
+              <a:buFont typeface="Arial" panose="020B0604020202020204" pitchFamily="34" charset="0"/>
+              <a:buChar char="•"/>
+            </a:pPr>
+            <a:r>
+              <a:rPr lang="en-US" sz="2300" dirty="0" smtClean="0"/>
+              <a:t>Representative</a:t>
+            </a:r>
+            <a:endParaRPr lang="en-US" sz="2300" dirty="0"/>
+          </a:p>
+        </p:txBody>
+      </p:sp>
+      <p:cxnSp>
+        <p:nvCxnSpPr>
+          <p:cNvPr id="13" name="Curved Connector 12"/>
+          <p:cNvCxnSpPr/>
+          <p:nvPr/>
+        </p:nvCxnSpPr>
+        <p:spPr>
+          <a:xfrm rot="5400000">
+            <a:off x="9062198" y="3625673"/>
+            <a:ext cx="1335699" cy="906088"/>
+          </a:xfrm>
+          <a:prstGeom prst="curvedConnector3">
+            <a:avLst>
+              <a:gd name="adj1" fmla="val 50000"/>
+            </a:avLst>
+          </a:prstGeom>
+          <a:ln>
+            <a:solidFill>
+              <a:schemeClr val="accent1"/>
+            </a:solidFill>
+            <a:tailEnd type="triangle"/>
+          </a:ln>
+        </p:spPr>
+        <p:style>
+          <a:lnRef idx="1">
+            <a:schemeClr val="accent1"/>
+          </a:lnRef>
+          <a:fillRef idx="0">
+            <a:schemeClr val="accent1"/>
+          </a:fillRef>
+          <a:effectRef idx="0">
+            <a:schemeClr val="accent1"/>
+          </a:effectRef>
+          <a:fontRef idx="minor">
+            <a:schemeClr val="tx1"/>
+          </a:fontRef>
+        </p:style>
+      </p:cxnSp>
+      <p:sp>
+        <p:nvSpPr>
+          <p:cNvPr id="20" name="TextBox 19"/>
+          <p:cNvSpPr txBox="1"/>
+          <p:nvPr/>
+        </p:nvSpPr>
+        <p:spPr>
+          <a:xfrm>
+            <a:off x="1769704" y="4587240"/>
+            <a:ext cx="2829621" cy="1685077"/>
+          </a:xfrm>
+          <a:prstGeom prst="rect">
+            <a:avLst/>
+          </a:prstGeom>
+          <a:noFill/>
+        </p:spPr>
+        <p:txBody>
+          <a:bodyPr wrap="none" rtlCol="0">
+            <a:spAutoFit/>
+          </a:bodyPr>
+          <a:lstStyle/>
+          <a:p>
+            <a:pPr>
+              <a:lnSpc>
+                <a:spcPct val="150000"/>
+              </a:lnSpc>
+            </a:pPr>
+            <a:r>
+              <a:rPr lang="en-US" sz="2300" b="1" dirty="0" smtClean="0"/>
+              <a:t>Input image:</a:t>
+            </a:r>
+          </a:p>
+          <a:p>
+            <a:pPr marL="285750" indent="-285750">
+              <a:lnSpc>
+                <a:spcPct val="150000"/>
+              </a:lnSpc>
+              <a:buFont typeface="Arial" panose="020B0604020202020204" pitchFamily="34" charset="0"/>
+              <a:buChar char="•"/>
+            </a:pPr>
+            <a:r>
+              <a:rPr lang="en-US" sz="2300" dirty="0" smtClean="0"/>
+              <a:t>High-dimensional</a:t>
+            </a:r>
+          </a:p>
+          <a:p>
+            <a:pPr marL="285750" indent="-285750">
+              <a:lnSpc>
+                <a:spcPct val="150000"/>
+              </a:lnSpc>
+              <a:buFont typeface="Arial" panose="020B0604020202020204" pitchFamily="34" charset="0"/>
+              <a:buChar char="•"/>
+            </a:pPr>
+            <a:r>
+              <a:rPr lang="en-US" sz="2300" dirty="0" smtClean="0"/>
+              <a:t>Rich detail</a:t>
+            </a:r>
+            <a:endParaRPr lang="en-US" sz="2300" dirty="0"/>
+          </a:p>
+        </p:txBody>
+      </p:sp>
+      <p:cxnSp>
+        <p:nvCxnSpPr>
+          <p:cNvPr id="22" name="Straight Arrow Connector 21"/>
+          <p:cNvCxnSpPr>
+            <a:stCxn id="2" idx="2"/>
+          </p:cNvCxnSpPr>
+          <p:nvPr/>
+        </p:nvCxnSpPr>
+        <p:spPr>
+          <a:xfrm flipH="1">
+            <a:off x="2844396" y="3756444"/>
+            <a:ext cx="1" cy="990123"/>
+          </a:xfrm>
+          <a:prstGeom prst="straightConnector1">
+            <a:avLst/>
+          </a:prstGeom>
+          <a:ln>
+            <a:solidFill>
+              <a:schemeClr val="accent1"/>
+            </a:solidFill>
+            <a:tailEnd type="triangle"/>
+          </a:ln>
+        </p:spPr>
+        <p:style>
+          <a:lnRef idx="1">
+            <a:schemeClr val="accent1"/>
+          </a:lnRef>
+          <a:fillRef idx="0">
+            <a:schemeClr val="accent1"/>
+          </a:fillRef>
+          <a:effectRef idx="0">
+            <a:schemeClr val="accent1"/>
+          </a:effectRef>
+          <a:fontRef idx="minor">
+            <a:schemeClr val="tx1"/>
+          </a:fontRef>
+        </p:style>
+      </p:cxnSp>
+    </p:spTree>
+    <p:extLst>
+      <p:ext uri="{BB962C8B-B14F-4D97-AF65-F5344CB8AC3E}">
+        <p14:creationId xmlns:p14="http://schemas.microsoft.com/office/powerpoint/2010/main" val="1475510103"/>
+      </p:ext>
+    </p:extLst>
+  </p:cSld>
+  <p:clrMapOvr>
+    <a:masterClrMapping/>
+  </p:clrMapOvr>
+  <mc:AlternateContent xmlns:mc="http://schemas.openxmlformats.org/markup-compatibility/2006" xmlns:p14="http://schemas.microsoft.com/office/powerpoint/2010/main">
+    <mc:Choice Requires="p14">
+      <p:transition p14:dur="0"/>
+    </mc:Choice>
+    <mc:Fallback xmlns="">
+      <p:transition/>
+    </mc:Fallback>
+  </mc:AlternateContent>
+  <p:timing>
+    <p:tnLst>
+      <p:par>
+        <p:cTn id="1" dur="indefinite" restart="never" nodeType="tmRoot"/>
+      </p:par>
+    </p:tnLst>
+  </p:timing>
+</p:sld>
+</file>
+
+<file path=ppt/slides/slide14.xml><?xml version="1.0" encoding="utf-8"?>
+<p:sld xmlns:a="http://schemas.openxmlformats.org/drawingml/2006/main" xmlns:r="http://schemas.openxmlformats.org/officeDocument/2006/relationships" xmlns:p="http://schemas.openxmlformats.org/presentationml/2006/main">
+  <p:cSld>
+    <p:spTree>
+      <p:nvGrpSpPr>
+        <p:cNvPr id="1" name=""/>
+        <p:cNvGrpSpPr/>
+        <p:nvPr/>
+      </p:nvGrpSpPr>
+      <p:grpSpPr>
+        <a:xfrm>
+          <a:off x="0" y="0"/>
+          <a:ext cx="0" cy="0"/>
+          <a:chOff x="0" y="0"/>
+          <a:chExt cx="0" cy="0"/>
+        </a:xfrm>
+      </p:grpSpPr>
+      <p:sp>
+        <p:nvSpPr>
+          <p:cNvPr id="7" name="Slide Number Placeholder 6"/>
+          <p:cNvSpPr>
+            <a:spLocks noGrp="1"/>
+          </p:cNvSpPr>
+          <p:nvPr>
+            <p:ph type="sldNum" sz="quarter" idx="12"/>
+          </p:nvPr>
+        </p:nvSpPr>
+        <p:spPr/>
+        <p:txBody>
+          <a:bodyPr/>
+          <a:lstStyle/>
+          <a:p>
+            <a:pPr rtl="0"/>
+            <a:fld id="{0FF54DE5-C571-48E8-A5BC-B369434E2F44}" type="slidenum">
+              <a:rPr lang="vi-VN" noProof="0" smtClean="0"/>
+              <a:t>14</a:t>
+            </a:fld>
+            <a:endParaRPr lang="vi-VN" noProof="0" dirty="0"/>
+          </a:p>
+        </p:txBody>
+      </p:sp>
+      <p:sp>
+        <p:nvSpPr>
+          <p:cNvPr id="16" name="Tiêu đề 1"/>
+          <p:cNvSpPr>
+            <a:spLocks noGrp="1"/>
+          </p:cNvSpPr>
+          <p:nvPr>
+            <p:ph type="title"/>
+          </p:nvPr>
+        </p:nvSpPr>
+        <p:spPr>
+          <a:xfrm>
+            <a:off x="1104900" y="76200"/>
+            <a:ext cx="9980682" cy="1096962"/>
+          </a:xfrm>
+        </p:spPr>
+        <p:txBody>
+          <a:bodyPr rtlCol="0">
+            <a:normAutofit/>
+          </a:bodyPr>
+          <a:lstStyle/>
+          <a:p>
+            <a:pPr rtl="0"/>
+            <a:r>
+              <a:rPr lang="en-US" sz="4000" dirty="0" smtClean="0">
+                <a:latin typeface="Arial" panose="020B0604020202020204" pitchFamily="34" charset="0"/>
+                <a:cs typeface="Arial" panose="020B0604020202020204" pitchFamily="34" charset="0"/>
+              </a:rPr>
+              <a:t>Implementation</a:t>
+            </a:r>
+            <a:endParaRPr lang="vi-VN" sz="4000" dirty="0">
+              <a:latin typeface="Arial" panose="020B0604020202020204" pitchFamily="34" charset="0"/>
+              <a:cs typeface="Arial" panose="020B0604020202020204" pitchFamily="34" charset="0"/>
+            </a:endParaRPr>
+          </a:p>
+        </p:txBody>
+      </p:sp>
+      <p:sp>
+        <p:nvSpPr>
+          <p:cNvPr id="8" name="TextBox 7"/>
+          <p:cNvSpPr txBox="1"/>
+          <p:nvPr/>
+        </p:nvSpPr>
+        <p:spPr>
+          <a:xfrm>
+            <a:off x="1104900" y="1438101"/>
+            <a:ext cx="5171209" cy="446276"/>
+          </a:xfrm>
+          <a:prstGeom prst="rect">
+            <a:avLst/>
+          </a:prstGeom>
+          <a:noFill/>
+        </p:spPr>
+        <p:txBody>
+          <a:bodyPr wrap="square" rtlCol="0">
+            <a:spAutoFit/>
+          </a:bodyPr>
+          <a:lstStyle/>
+          <a:p>
+            <a:r>
+              <a:rPr lang="en-US" sz="2300" dirty="0" smtClean="0">
+                <a:solidFill>
+                  <a:schemeClr val="tx2"/>
+                </a:solidFill>
+              </a:rPr>
+              <a:t>Face </a:t>
+            </a:r>
+            <a:r>
+              <a:rPr lang="en-US" sz="2300" dirty="0">
+                <a:solidFill>
+                  <a:schemeClr val="tx2"/>
+                </a:solidFill>
+              </a:rPr>
+              <a:t>recognition </a:t>
+            </a:r>
+            <a:r>
+              <a:rPr lang="en-US" sz="2300" dirty="0" smtClean="0">
+                <a:solidFill>
+                  <a:schemeClr val="tx2"/>
+                </a:solidFill>
+              </a:rPr>
+              <a:t>(based on </a:t>
+            </a:r>
+            <a:r>
+              <a:rPr lang="en-US" sz="2300" dirty="0" err="1" smtClean="0">
+                <a:solidFill>
+                  <a:schemeClr val="tx2"/>
+                </a:solidFill>
+              </a:rPr>
+              <a:t>FaceNet</a:t>
+            </a:r>
+            <a:r>
+              <a:rPr lang="en-US" sz="2300" dirty="0" smtClean="0">
+                <a:solidFill>
+                  <a:schemeClr val="tx2"/>
+                </a:solidFill>
+              </a:rPr>
+              <a:t>)</a:t>
+            </a:r>
+            <a:endParaRPr lang="en-US" sz="2300" dirty="0">
+              <a:solidFill>
+                <a:schemeClr val="tx2"/>
+              </a:solidFill>
+            </a:endParaRPr>
+          </a:p>
+        </p:txBody>
+      </p:sp>
+      <p:pic>
+        <p:nvPicPr>
+          <p:cNvPr id="4" name="Picture 3"/>
+          <p:cNvPicPr>
+            <a:picLocks noChangeAspect="1"/>
+          </p:cNvPicPr>
+          <p:nvPr/>
+        </p:nvPicPr>
+        <p:blipFill>
+          <a:blip r:embed="rId3"/>
+          <a:stretch>
+            <a:fillRect/>
+          </a:stretch>
+        </p:blipFill>
+        <p:spPr>
+          <a:xfrm>
+            <a:off x="2955671" y="2294155"/>
+            <a:ext cx="6279139" cy="1313567"/>
+          </a:xfrm>
+          <a:prstGeom prst="rect">
+            <a:avLst/>
+          </a:prstGeom>
+        </p:spPr>
+      </p:pic>
+      <p:pic>
+        <p:nvPicPr>
+          <p:cNvPr id="6" name="Picture 5"/>
+          <p:cNvPicPr>
+            <a:picLocks noChangeAspect="1"/>
+          </p:cNvPicPr>
+          <p:nvPr/>
+        </p:nvPicPr>
+        <p:blipFill>
+          <a:blip r:embed="rId4"/>
+          <a:stretch>
+            <a:fillRect/>
+          </a:stretch>
+        </p:blipFill>
+        <p:spPr>
+          <a:xfrm>
+            <a:off x="2955671" y="4267908"/>
+            <a:ext cx="6279139" cy="1548947"/>
+          </a:xfrm>
+          <a:prstGeom prst="rect">
+            <a:avLst/>
+          </a:prstGeom>
+        </p:spPr>
+      </p:pic>
+    </p:spTree>
+    <p:extLst>
+      <p:ext uri="{BB962C8B-B14F-4D97-AF65-F5344CB8AC3E}">
+        <p14:creationId xmlns:p14="http://schemas.microsoft.com/office/powerpoint/2010/main" val="1974081905"/>
+      </p:ext>
+    </p:extLst>
+  </p:cSld>
+  <p:clrMapOvr>
+    <a:masterClrMapping/>
+  </p:clrMapOvr>
+  <mc:AlternateContent xmlns:mc="http://schemas.openxmlformats.org/markup-compatibility/2006" xmlns:p14="http://schemas.microsoft.com/office/powerpoint/2010/main">
+    <mc:Choice Requires="p14">
+      <p:transition p14:dur="0"/>
+    </mc:Choice>
+    <mc:Fallback xmlns="">
+      <p:transition/>
+    </mc:Fallback>
+  </mc:AlternateContent>
+  <p:timing>
+    <p:tnLst>
+      <p:par>
+        <p:cTn id="1" dur="indefinite" restart="never" nodeType="tmRoot"/>
+      </p:par>
+    </p:tnLst>
+  </p:timing>
+</p:sld>
+</file>
+
+<file path=ppt/slides/slide15.xml><?xml version="1.0" encoding="utf-8"?>
+<p:sld xmlns:a="http://schemas.openxmlformats.org/drawingml/2006/main" xmlns:r="http://schemas.openxmlformats.org/officeDocument/2006/relationships" xmlns:p="http://schemas.openxmlformats.org/presentationml/2006/main">
+  <p:cSld>
+    <p:spTree>
+      <p:nvGrpSpPr>
+        <p:cNvPr id="1" name=""/>
+        <p:cNvGrpSpPr/>
+        <p:nvPr/>
+      </p:nvGrpSpPr>
+      <p:grpSpPr>
+        <a:xfrm>
+          <a:off x="0" y="0"/>
+          <a:ext cx="0" cy="0"/>
+          <a:chOff x="0" y="0"/>
+          <a:chExt cx="0" cy="0"/>
+        </a:xfrm>
+      </p:grpSpPr>
+      <p:sp>
+        <p:nvSpPr>
+          <p:cNvPr id="7" name="Slide Number Placeholder 6"/>
+          <p:cNvSpPr>
+            <a:spLocks noGrp="1"/>
+          </p:cNvSpPr>
+          <p:nvPr>
+            <p:ph type="sldNum" sz="quarter" idx="12"/>
+          </p:nvPr>
+        </p:nvSpPr>
+        <p:spPr/>
+        <p:txBody>
+          <a:bodyPr/>
+          <a:lstStyle/>
+          <a:p>
+            <a:pPr rtl="0"/>
+            <a:fld id="{0FF54DE5-C571-48E8-A5BC-B369434E2F44}" type="slidenum">
+              <a:rPr lang="vi-VN" noProof="0" smtClean="0"/>
+              <a:t>15</a:t>
+            </a:fld>
+            <a:endParaRPr lang="vi-VN" noProof="0" dirty="0"/>
+          </a:p>
+        </p:txBody>
+      </p:sp>
+      <p:sp>
+        <p:nvSpPr>
+          <p:cNvPr id="16" name="Tiêu đề 1"/>
+          <p:cNvSpPr>
+            <a:spLocks noGrp="1"/>
+          </p:cNvSpPr>
+          <p:nvPr>
+            <p:ph type="title"/>
+          </p:nvPr>
+        </p:nvSpPr>
+        <p:spPr>
+          <a:xfrm>
+            <a:off x="1104900" y="76200"/>
+            <a:ext cx="9980682" cy="1096962"/>
+          </a:xfrm>
+        </p:spPr>
+        <p:txBody>
+          <a:bodyPr rtlCol="0">
+            <a:normAutofit/>
+          </a:bodyPr>
+          <a:lstStyle/>
+          <a:p>
+            <a:pPr rtl="0"/>
+            <a:r>
+              <a:rPr lang="en-US" sz="4000" dirty="0" smtClean="0">
+                <a:latin typeface="Arial" panose="020B0604020202020204" pitchFamily="34" charset="0"/>
+                <a:cs typeface="Arial" panose="020B0604020202020204" pitchFamily="34" charset="0"/>
+              </a:rPr>
+              <a:t>Implementation</a:t>
+            </a:r>
+            <a:endParaRPr lang="vi-VN" sz="4000" dirty="0">
+              <a:latin typeface="Arial" panose="020B0604020202020204" pitchFamily="34" charset="0"/>
+              <a:cs typeface="Arial" panose="020B0604020202020204" pitchFamily="34" charset="0"/>
+            </a:endParaRPr>
+          </a:p>
+        </p:txBody>
+      </p:sp>
+      <p:sp>
+        <p:nvSpPr>
+          <p:cNvPr id="8" name="TextBox 7"/>
+          <p:cNvSpPr txBox="1"/>
+          <p:nvPr/>
+        </p:nvSpPr>
+        <p:spPr>
+          <a:xfrm>
+            <a:off x="1104900" y="1438101"/>
+            <a:ext cx="5171209" cy="446276"/>
+          </a:xfrm>
+          <a:prstGeom prst="rect">
+            <a:avLst/>
+          </a:prstGeom>
+          <a:noFill/>
+        </p:spPr>
+        <p:txBody>
+          <a:bodyPr wrap="square" rtlCol="0">
+            <a:spAutoFit/>
+          </a:bodyPr>
+          <a:lstStyle/>
+          <a:p>
+            <a:r>
+              <a:rPr lang="en-US" sz="2300" dirty="0" smtClean="0">
+                <a:solidFill>
+                  <a:schemeClr val="tx2"/>
+                </a:solidFill>
+              </a:rPr>
+              <a:t>Face </a:t>
+            </a:r>
+            <a:r>
+              <a:rPr lang="en-US" sz="2300" dirty="0">
+                <a:solidFill>
+                  <a:schemeClr val="tx2"/>
+                </a:solidFill>
+              </a:rPr>
+              <a:t>recognition </a:t>
+            </a:r>
+            <a:r>
+              <a:rPr lang="en-US" sz="2300" dirty="0" smtClean="0">
+                <a:solidFill>
+                  <a:schemeClr val="tx2"/>
+                </a:solidFill>
+              </a:rPr>
+              <a:t>(based on </a:t>
+            </a:r>
+            <a:r>
+              <a:rPr lang="en-US" sz="2300" dirty="0" err="1" smtClean="0">
+                <a:solidFill>
+                  <a:schemeClr val="tx2"/>
+                </a:solidFill>
+              </a:rPr>
+              <a:t>FaceNet</a:t>
+            </a:r>
+            <a:r>
+              <a:rPr lang="en-US" sz="2300" dirty="0" smtClean="0">
+                <a:solidFill>
+                  <a:schemeClr val="tx2"/>
+                </a:solidFill>
+              </a:rPr>
+              <a:t>)</a:t>
+            </a:r>
+            <a:endParaRPr lang="en-US" sz="2300" dirty="0">
+              <a:solidFill>
+                <a:schemeClr val="tx2"/>
+              </a:solidFill>
+            </a:endParaRPr>
+          </a:p>
+        </p:txBody>
+      </p:sp>
+      <p:pic>
+        <p:nvPicPr>
+          <p:cNvPr id="2" name="Picture 1"/>
+          <p:cNvPicPr>
+            <a:picLocks noChangeAspect="1"/>
+          </p:cNvPicPr>
+          <p:nvPr/>
+        </p:nvPicPr>
+        <p:blipFill>
+          <a:blip r:embed="rId3">
+            <a:extLst>
+              <a:ext uri="{28A0092B-C50C-407E-A947-70E740481C1C}">
+                <a14:useLocalDpi xmlns:a14="http://schemas.microsoft.com/office/drawing/2010/main" val="0"/>
+              </a:ext>
+            </a:extLst>
+          </a:blip>
+          <a:stretch>
+            <a:fillRect/>
+          </a:stretch>
+        </p:blipFill>
+        <p:spPr>
+          <a:xfrm>
+            <a:off x="331816" y="2294906"/>
+            <a:ext cx="4213167" cy="3611286"/>
+          </a:xfrm>
+          <a:prstGeom prst="rect">
+            <a:avLst/>
+          </a:prstGeom>
+        </p:spPr>
+      </p:pic>
+      <p:grpSp>
+        <p:nvGrpSpPr>
+          <p:cNvPr id="9" name="Group 8"/>
+          <p:cNvGrpSpPr/>
+          <p:nvPr/>
+        </p:nvGrpSpPr>
+        <p:grpSpPr>
+          <a:xfrm>
+            <a:off x="5335819" y="3496928"/>
+            <a:ext cx="6385127" cy="1207241"/>
+            <a:chOff x="5335819" y="3496928"/>
+            <a:chExt cx="6385127" cy="1207241"/>
+          </a:xfrm>
+        </p:grpSpPr>
+        <p:pic>
+          <p:nvPicPr>
+            <p:cNvPr id="3" name="Picture 2"/>
+            <p:cNvPicPr>
+              <a:picLocks noChangeAspect="1"/>
+            </p:cNvPicPr>
+            <p:nvPr/>
+          </p:nvPicPr>
+          <p:blipFill rotWithShape="1">
+            <a:blip r:embed="rId4"/>
+            <a:srcRect r="14109"/>
+            <a:stretch/>
+          </p:blipFill>
+          <p:spPr>
+            <a:xfrm>
+              <a:off x="5335819" y="3496928"/>
+              <a:ext cx="5196407" cy="1207241"/>
+            </a:xfrm>
+            <a:prstGeom prst="rect">
+              <a:avLst/>
+            </a:prstGeom>
+          </p:spPr>
+        </p:pic>
+        <p:sp>
+          <p:nvSpPr>
+            <p:cNvPr id="5" name="Rectangle 4"/>
+            <p:cNvSpPr/>
+            <p:nvPr/>
+          </p:nvSpPr>
+          <p:spPr>
+            <a:xfrm>
+              <a:off x="10532226" y="3585160"/>
+              <a:ext cx="1188720" cy="897774"/>
+            </a:xfrm>
+            <a:prstGeom prst="rect">
+              <a:avLst/>
+            </a:prstGeom>
+          </p:spPr>
+          <p:style>
+            <a:lnRef idx="1">
+              <a:schemeClr val="accent2"/>
+            </a:lnRef>
+            <a:fillRef idx="2">
+              <a:schemeClr val="accent2"/>
+            </a:fillRef>
+            <a:effectRef idx="1">
+              <a:schemeClr val="accent2"/>
+            </a:effectRef>
+            <a:fontRef idx="minor">
+              <a:schemeClr val="dk1"/>
+            </a:fontRef>
+          </p:style>
+          <p:txBody>
+            <a:bodyPr rtlCol="0" anchor="ctr"/>
+            <a:lstStyle/>
+            <a:p>
+              <a:pPr algn="ctr"/>
+              <a:r>
+                <a:rPr lang="en-US" dirty="0" smtClean="0"/>
+                <a:t>SVM</a:t>
+              </a:r>
+            </a:p>
+            <a:p>
+              <a:pPr algn="ctr"/>
+              <a:r>
+                <a:rPr lang="en-US" dirty="0" smtClean="0"/>
+                <a:t>classifier</a:t>
+              </a:r>
+              <a:endParaRPr lang="en-US" dirty="0"/>
+            </a:p>
+          </p:txBody>
+        </p:sp>
+      </p:grpSp>
+    </p:spTree>
+    <p:extLst>
+      <p:ext uri="{BB962C8B-B14F-4D97-AF65-F5344CB8AC3E}">
+        <p14:creationId xmlns:p14="http://schemas.microsoft.com/office/powerpoint/2010/main" val="4137761181"/>
+      </p:ext>
+    </p:extLst>
+  </p:cSld>
+  <p:clrMapOvr>
+    <a:masterClrMapping/>
+  </p:clrMapOvr>
+  <mc:AlternateContent xmlns:mc="http://schemas.openxmlformats.org/markup-compatibility/2006" xmlns:p14="http://schemas.microsoft.com/office/powerpoint/2010/main">
+    <mc:Choice Requires="p14">
+      <p:transition p14:dur="0"/>
+    </mc:Choice>
+    <mc:Fallback xmlns="">
+      <p:transition/>
+    </mc:Fallback>
+  </mc:AlternateContent>
+  <p:timing>
+    <p:tnLst>
+      <p:par>
+        <p:cTn id="1" dur="indefinite" restart="never" nodeType="tmRoot"/>
+      </p:par>
+    </p:tnLst>
+  </p:timing>
+</p:sld>
+</file>
+
+<file path=ppt/slides/slide16.xml><?xml version="1.0" encoding="utf-8"?>
+<p:sld xmlns:a="http://schemas.openxmlformats.org/drawingml/2006/main" xmlns:r="http://schemas.openxmlformats.org/officeDocument/2006/relationships" xmlns:p="http://schemas.openxmlformats.org/presentationml/2006/main">
+  <p:cSld>
+    <p:spTree>
+      <p:nvGrpSpPr>
+        <p:cNvPr id="1" name=""/>
+        <p:cNvGrpSpPr/>
+        <p:nvPr/>
+      </p:nvGrpSpPr>
+      <p:grpSpPr>
+        <a:xfrm>
+          <a:off x="0" y="0"/>
+          <a:ext cx="0" cy="0"/>
+          <a:chOff x="0" y="0"/>
+          <a:chExt cx="0" cy="0"/>
+        </a:xfrm>
+      </p:grpSpPr>
+      <p:sp>
+        <p:nvSpPr>
+          <p:cNvPr id="7" name="Slide Number Placeholder 6"/>
+          <p:cNvSpPr>
+            <a:spLocks noGrp="1"/>
+          </p:cNvSpPr>
+          <p:nvPr>
+            <p:ph type="sldNum" sz="quarter" idx="12"/>
+          </p:nvPr>
+        </p:nvSpPr>
+        <p:spPr/>
+        <p:txBody>
+          <a:bodyPr/>
+          <a:lstStyle/>
+          <a:p>
+            <a:pPr rtl="0"/>
+            <a:fld id="{0FF54DE5-C571-48E8-A5BC-B369434E2F44}" type="slidenum">
+              <a:rPr lang="vi-VN" noProof="0" smtClean="0"/>
+              <a:t>16</a:t>
+            </a:fld>
+            <a:endParaRPr lang="vi-VN" noProof="0" dirty="0"/>
+          </a:p>
+        </p:txBody>
+      </p:sp>
+      <p:sp>
+        <p:nvSpPr>
+          <p:cNvPr id="16" name="Tiêu đề 1"/>
+          <p:cNvSpPr>
+            <a:spLocks noGrp="1"/>
+          </p:cNvSpPr>
+          <p:nvPr>
+            <p:ph type="title"/>
+          </p:nvPr>
+        </p:nvSpPr>
+        <p:spPr>
+          <a:xfrm>
+            <a:off x="1104900" y="76200"/>
+            <a:ext cx="9980682" cy="1096962"/>
+          </a:xfrm>
+        </p:spPr>
+        <p:txBody>
+          <a:bodyPr rtlCol="0">
+            <a:normAutofit/>
+          </a:bodyPr>
+          <a:lstStyle/>
+          <a:p>
+            <a:pPr rtl="0"/>
+            <a:r>
+              <a:rPr lang="en-US" sz="4000" dirty="0" smtClean="0">
+                <a:latin typeface="Arial" panose="020B0604020202020204" pitchFamily="34" charset="0"/>
+                <a:cs typeface="Arial" panose="020B0604020202020204" pitchFamily="34" charset="0"/>
+              </a:rPr>
+              <a:t>Experimental results</a:t>
+            </a:r>
+            <a:endParaRPr lang="vi-VN" sz="4000" dirty="0">
+              <a:latin typeface="Arial" panose="020B0604020202020204" pitchFamily="34" charset="0"/>
+              <a:cs typeface="Arial" panose="020B0604020202020204" pitchFamily="34" charset="0"/>
+            </a:endParaRPr>
+          </a:p>
+        </p:txBody>
+      </p:sp>
+    </p:spTree>
+    <p:extLst>
+      <p:ext uri="{BB962C8B-B14F-4D97-AF65-F5344CB8AC3E}">
+        <p14:creationId xmlns:p14="http://schemas.microsoft.com/office/powerpoint/2010/main" val="3760579364"/>
+      </p:ext>
+    </p:extLst>
+  </p:cSld>
+  <p:clrMapOvr>
+    <a:masterClrMapping/>
+  </p:clrMapOvr>
+  <mc:AlternateContent xmlns:mc="http://schemas.openxmlformats.org/markup-compatibility/2006" xmlns:p14="http://schemas.microsoft.com/office/powerpoint/2010/main">
+    <mc:Choice Requires="p14">
+      <p:transition p14:dur="0"/>
+    </mc:Choice>
+    <mc:Fallback xmlns="">
+      <p:transition/>
+    </mc:Fallback>
+  </mc:AlternateContent>
+  <p:timing>
+    <p:tnLst>
+      <p:par>
+        <p:cTn id="1" dur="indefinite" restart="never" nodeType="tmRoot"/>
+      </p:par>
+    </p:tnLst>
+  </p:timing>
+</p:sld>
+</file>
+
+<file path=ppt/slides/slide17.xml><?xml version="1.0" encoding="utf-8"?>
+<p:sld xmlns:a="http://schemas.openxmlformats.org/drawingml/2006/main" xmlns:r="http://schemas.openxmlformats.org/officeDocument/2006/relationships" xmlns:p="http://schemas.openxmlformats.org/presentationml/2006/main">
+  <p:cSld>
+    <p:spTree>
+      <p:nvGrpSpPr>
+        <p:cNvPr id="1" name=""/>
+        <p:cNvGrpSpPr/>
+        <p:nvPr/>
+      </p:nvGrpSpPr>
+      <p:grpSpPr>
+        <a:xfrm>
+          <a:off x="0" y="0"/>
+          <a:ext cx="0" cy="0"/>
+          <a:chOff x="0" y="0"/>
+          <a:chExt cx="0" cy="0"/>
+        </a:xfrm>
+      </p:grpSpPr>
+      <p:sp>
+        <p:nvSpPr>
+          <p:cNvPr id="7" name="Slide Number Placeholder 6"/>
+          <p:cNvSpPr>
+            <a:spLocks noGrp="1"/>
+          </p:cNvSpPr>
+          <p:nvPr>
+            <p:ph type="sldNum" sz="quarter" idx="12"/>
+          </p:nvPr>
+        </p:nvSpPr>
+        <p:spPr/>
+        <p:txBody>
+          <a:bodyPr/>
+          <a:lstStyle/>
+          <a:p>
+            <a:pPr rtl="0"/>
+            <a:fld id="{0FF54DE5-C571-48E8-A5BC-B369434E2F44}" type="slidenum">
+              <a:rPr lang="vi-VN" noProof="0" smtClean="0"/>
+              <a:t>17</a:t>
+            </a:fld>
+            <a:endParaRPr lang="vi-VN" noProof="0" dirty="0"/>
+          </a:p>
+        </p:txBody>
+      </p:sp>
+      <p:sp>
+        <p:nvSpPr>
+          <p:cNvPr id="16" name="Tiêu đề 1"/>
+          <p:cNvSpPr>
+            <a:spLocks noGrp="1"/>
+          </p:cNvSpPr>
+          <p:nvPr>
+            <p:ph type="title"/>
+          </p:nvPr>
+        </p:nvSpPr>
+        <p:spPr>
+          <a:xfrm>
+            <a:off x="1104900" y="76200"/>
+            <a:ext cx="9980682" cy="1096962"/>
+          </a:xfrm>
+        </p:spPr>
+        <p:txBody>
+          <a:bodyPr rtlCol="0">
+            <a:normAutofit/>
+          </a:bodyPr>
+          <a:lstStyle/>
+          <a:p>
+            <a:pPr rtl="0"/>
+            <a:r>
+              <a:rPr lang="en-US" sz="4000" dirty="0" smtClean="0">
+                <a:latin typeface="Arial" panose="020B0604020202020204" pitchFamily="34" charset="0"/>
+                <a:cs typeface="Arial" panose="020B0604020202020204" pitchFamily="34" charset="0"/>
+              </a:rPr>
+              <a:t>Demo</a:t>
+            </a:r>
+            <a:endParaRPr lang="vi-VN" sz="4000" dirty="0">
+              <a:latin typeface="Arial" panose="020B0604020202020204" pitchFamily="34" charset="0"/>
+              <a:cs typeface="Arial" panose="020B0604020202020204" pitchFamily="34" charset="0"/>
+            </a:endParaRPr>
+          </a:p>
+        </p:txBody>
+      </p:sp>
+    </p:spTree>
+    <p:extLst>
+      <p:ext uri="{BB962C8B-B14F-4D97-AF65-F5344CB8AC3E}">
+        <p14:creationId xmlns:p14="http://schemas.microsoft.com/office/powerpoint/2010/main" val="1115007891"/>
+      </p:ext>
+    </p:extLst>
+  </p:cSld>
+  <p:clrMapOvr>
+    <a:masterClrMapping/>
+  </p:clrMapOvr>
+  <mc:AlternateContent xmlns:mc="http://schemas.openxmlformats.org/markup-compatibility/2006" xmlns:p14="http://schemas.microsoft.com/office/powerpoint/2010/main">
+    <mc:Choice Requires="p14">
+      <p:transition p14:dur="0"/>
+    </mc:Choice>
+    <mc:Fallback xmlns="">
+      <p:transition/>
+    </mc:Fallback>
+  </mc:AlternateContent>
+  <p:timing>
+    <p:tnLst>
+      <p:par>
+        <p:cTn id="1" dur="indefinite" restart="never" nodeType="tmRoot"/>
+      </p:par>
+    </p:tnLst>
+  </p:timing>
+</p:sld>
+</file>
+
+<file path=ppt/slides/slide18.xml><?xml version="1.0" encoding="utf-8"?>
+<p:sld xmlns:a="http://schemas.openxmlformats.org/drawingml/2006/main" xmlns:r="http://schemas.openxmlformats.org/officeDocument/2006/relationships" xmlns:p="http://schemas.openxmlformats.org/presentationml/2006/main">
+  <p:cSld>
+    <p:spTree>
+      <p:nvGrpSpPr>
+        <p:cNvPr id="1" name=""/>
+        <p:cNvGrpSpPr/>
+        <p:nvPr/>
+      </p:nvGrpSpPr>
+      <p:grpSpPr>
+        <a:xfrm>
+          <a:off x="0" y="0"/>
+          <a:ext cx="0" cy="0"/>
+          <a:chOff x="0" y="0"/>
+          <a:chExt cx="0" cy="0"/>
+        </a:xfrm>
+      </p:grpSpPr>
+      <p:sp>
+        <p:nvSpPr>
+          <p:cNvPr id="7" name="Slide Number Placeholder 6"/>
+          <p:cNvSpPr>
+            <a:spLocks noGrp="1"/>
+          </p:cNvSpPr>
+          <p:nvPr>
+            <p:ph type="sldNum" sz="quarter" idx="12"/>
+          </p:nvPr>
+        </p:nvSpPr>
+        <p:spPr/>
+        <p:txBody>
+          <a:bodyPr/>
+          <a:lstStyle/>
+          <a:p>
+            <a:pPr rtl="0"/>
+            <a:fld id="{0FF54DE5-C571-48E8-A5BC-B369434E2F44}" type="slidenum">
+              <a:rPr lang="vi-VN" noProof="0" smtClean="0"/>
+              <a:t>18</a:t>
+            </a:fld>
+            <a:endParaRPr lang="vi-VN" noProof="0" dirty="0"/>
+          </a:p>
+        </p:txBody>
+      </p:sp>
+      <p:sp>
+        <p:nvSpPr>
+          <p:cNvPr id="16" name="Tiêu đề 1"/>
+          <p:cNvSpPr>
+            <a:spLocks noGrp="1"/>
+          </p:cNvSpPr>
+          <p:nvPr>
+            <p:ph type="title"/>
+          </p:nvPr>
+        </p:nvSpPr>
+        <p:spPr>
+          <a:xfrm>
+            <a:off x="1104900" y="76200"/>
+            <a:ext cx="9980682" cy="1096962"/>
+          </a:xfrm>
+        </p:spPr>
+        <p:txBody>
+          <a:bodyPr rtlCol="0">
+            <a:normAutofit/>
+          </a:bodyPr>
+          <a:lstStyle/>
+          <a:p>
+            <a:pPr rtl="0"/>
+            <a:r>
+              <a:rPr lang="en-US" sz="4000" dirty="0" smtClean="0">
+                <a:latin typeface="Arial" panose="020B0604020202020204" pitchFamily="34" charset="0"/>
+                <a:cs typeface="Arial" panose="020B0604020202020204" pitchFamily="34" charset="0"/>
+              </a:rPr>
+              <a:t>Conclusion</a:t>
+            </a:r>
+            <a:endParaRPr lang="vi-VN" sz="4000" dirty="0">
+              <a:latin typeface="Arial" panose="020B0604020202020204" pitchFamily="34" charset="0"/>
+              <a:cs typeface="Arial" panose="020B0604020202020204" pitchFamily="34" charset="0"/>
+            </a:endParaRPr>
+          </a:p>
+        </p:txBody>
+      </p:sp>
+      <p:sp>
+        <p:nvSpPr>
+          <p:cNvPr id="3" name="TextBox 2"/>
+          <p:cNvSpPr txBox="1"/>
+          <p:nvPr/>
+        </p:nvSpPr>
+        <p:spPr>
+          <a:xfrm>
+            <a:off x="1104900" y="1619072"/>
+            <a:ext cx="4414751" cy="4401205"/>
+          </a:xfrm>
+          <a:prstGeom prst="rect">
+            <a:avLst/>
+          </a:prstGeom>
+          <a:noFill/>
+        </p:spPr>
+        <p:txBody>
+          <a:bodyPr wrap="square" rtlCol="0">
+            <a:spAutoFit/>
+          </a:bodyPr>
+          <a:lstStyle/>
+          <a:p>
+            <a:pPr>
+              <a:lnSpc>
+                <a:spcPct val="200000"/>
+              </a:lnSpc>
+            </a:pPr>
+            <a:r>
+              <a:rPr lang="en-US" sz="2500" b="1" u="sng" dirty="0" smtClean="0"/>
+              <a:t>Hard:</a:t>
+            </a:r>
+          </a:p>
+          <a:p>
+            <a:pPr marL="342900" indent="-342900">
+              <a:lnSpc>
+                <a:spcPct val="200000"/>
+              </a:lnSpc>
+              <a:buFont typeface="Arial" panose="020B0604020202020204" pitchFamily="34" charset="0"/>
+              <a:buChar char="•"/>
+            </a:pPr>
+            <a:r>
+              <a:rPr lang="en-US" sz="2300" dirty="0" smtClean="0"/>
+              <a:t>Face Attendance Checking</a:t>
+            </a:r>
+          </a:p>
+          <a:p>
+            <a:pPr marL="342900" indent="-342900">
+              <a:lnSpc>
+                <a:spcPct val="200000"/>
+              </a:lnSpc>
+              <a:buFont typeface="Arial" panose="020B0604020202020204" pitchFamily="34" charset="0"/>
+              <a:buChar char="•"/>
+            </a:pPr>
+            <a:r>
+              <a:rPr lang="en-US" sz="2300" dirty="0" smtClean="0"/>
+              <a:t>Deep-learning based</a:t>
+            </a:r>
+          </a:p>
+          <a:p>
+            <a:pPr marL="342900" indent="-342900">
+              <a:lnSpc>
+                <a:spcPct val="200000"/>
+              </a:lnSpc>
+              <a:buFont typeface="Arial" panose="020B0604020202020204" pitchFamily="34" charset="0"/>
+              <a:buChar char="•"/>
+            </a:pPr>
+            <a:r>
+              <a:rPr lang="en-US" sz="2300" dirty="0" smtClean="0"/>
+              <a:t>Standard hardware</a:t>
+            </a:r>
+          </a:p>
+          <a:p>
+            <a:pPr marL="342900" indent="-342900">
+              <a:lnSpc>
+                <a:spcPct val="200000"/>
+              </a:lnSpc>
+              <a:buFont typeface="Arial" panose="020B0604020202020204" pitchFamily="34" charset="0"/>
+              <a:buChar char="•"/>
+            </a:pPr>
+            <a:r>
+              <a:rPr lang="en-US" sz="2300" dirty="0" smtClean="0"/>
+              <a:t>High accuracy</a:t>
+            </a:r>
+          </a:p>
+          <a:p>
+            <a:pPr marL="342900" indent="-342900">
+              <a:lnSpc>
+                <a:spcPct val="200000"/>
+              </a:lnSpc>
+              <a:buFont typeface="Arial" panose="020B0604020202020204" pitchFamily="34" charset="0"/>
+              <a:buChar char="•"/>
+            </a:pPr>
+            <a:r>
+              <a:rPr lang="en-US" sz="2300" dirty="0" smtClean="0"/>
+              <a:t>Easy-use GUI</a:t>
+            </a:r>
+            <a:endParaRPr lang="en-US" sz="2300" dirty="0"/>
+          </a:p>
+        </p:txBody>
+      </p:sp>
+      <p:sp>
+        <p:nvSpPr>
+          <p:cNvPr id="6" name="TextBox 5"/>
+          <p:cNvSpPr txBox="1"/>
+          <p:nvPr/>
+        </p:nvSpPr>
+        <p:spPr>
+          <a:xfrm>
+            <a:off x="6325985" y="1619072"/>
+            <a:ext cx="4759597" cy="4401205"/>
+          </a:xfrm>
+          <a:prstGeom prst="rect">
+            <a:avLst/>
+          </a:prstGeom>
+          <a:noFill/>
+        </p:spPr>
+        <p:txBody>
+          <a:bodyPr wrap="square" rtlCol="0">
+            <a:spAutoFit/>
+          </a:bodyPr>
+          <a:lstStyle/>
+          <a:p>
+            <a:pPr>
+              <a:lnSpc>
+                <a:spcPct val="200000"/>
+              </a:lnSpc>
+            </a:pPr>
+            <a:r>
+              <a:rPr lang="en-US" sz="2500" b="1" u="sng" dirty="0" smtClean="0"/>
+              <a:t>Soft:</a:t>
+            </a:r>
+          </a:p>
+          <a:p>
+            <a:pPr marL="342900" indent="-342900">
+              <a:lnSpc>
+                <a:spcPct val="200000"/>
+              </a:lnSpc>
+              <a:buFont typeface="Arial" panose="020B0604020202020204" pitchFamily="34" charset="0"/>
+              <a:buChar char="•"/>
+            </a:pPr>
+            <a:r>
+              <a:rPr lang="en-US" sz="2300" dirty="0" smtClean="0"/>
+              <a:t>Specialized-task assignment</a:t>
+            </a:r>
+          </a:p>
+          <a:p>
+            <a:pPr marL="342900" indent="-342900">
+              <a:lnSpc>
+                <a:spcPct val="200000"/>
+              </a:lnSpc>
+              <a:buFont typeface="Arial" panose="020B0604020202020204" pitchFamily="34" charset="0"/>
+              <a:buChar char="•"/>
+            </a:pPr>
+            <a:r>
+              <a:rPr lang="en-US" sz="2300" dirty="0" smtClean="0"/>
+              <a:t>GitHub: store, collaborate, refer</a:t>
+            </a:r>
+          </a:p>
+          <a:p>
+            <a:pPr marL="342900" indent="-342900">
+              <a:lnSpc>
+                <a:spcPct val="200000"/>
+              </a:lnSpc>
+              <a:buFont typeface="Arial" panose="020B0604020202020204" pitchFamily="34" charset="0"/>
+              <a:buChar char="•"/>
+            </a:pPr>
+            <a:r>
+              <a:rPr lang="en-US" sz="2300" dirty="0" smtClean="0"/>
+              <a:t>Open-source: MIT license</a:t>
+            </a:r>
+          </a:p>
+          <a:p>
+            <a:pPr marL="342900" indent="-342900">
+              <a:lnSpc>
+                <a:spcPct val="200000"/>
+              </a:lnSpc>
+              <a:buFont typeface="Arial" panose="020B0604020202020204" pitchFamily="34" charset="0"/>
+              <a:buChar char="•"/>
+            </a:pPr>
+            <a:r>
+              <a:rPr lang="en-US" sz="2300" dirty="0" smtClean="0"/>
+              <a:t>Scientific-form paper report</a:t>
+            </a:r>
+          </a:p>
+          <a:p>
+            <a:pPr marL="342900" indent="-342900">
+              <a:lnSpc>
+                <a:spcPct val="200000"/>
+              </a:lnSpc>
+              <a:buFont typeface="Arial" panose="020B0604020202020204" pitchFamily="34" charset="0"/>
+              <a:buChar char="•"/>
+            </a:pPr>
+            <a:r>
+              <a:rPr lang="en-US" sz="2300" dirty="0" smtClean="0"/>
+              <a:t>Unity</a:t>
+            </a:r>
           </a:p>
         </p:txBody>
       </p:sp>
@@ -6775,6 +9473,170 @@
   <mc:AlternateContent xmlns:mc="http://schemas.openxmlformats.org/markup-compatibility/2006" xmlns:p14="http://schemas.microsoft.com/office/powerpoint/2010/main">
     <mc:Choice Requires="p14">
       <p:transition p14:dur="0"/>
+    </mc:Choice>
+    <mc:Fallback xmlns="">
+      <p:transition/>
+    </mc:Fallback>
+  </mc:AlternateContent>
+  <p:timing>
+    <p:tnLst>
+      <p:par>
+        <p:cTn id="1" dur="indefinite" restart="never" nodeType="tmRoot"/>
+      </p:par>
+    </p:tnLst>
+  </p:timing>
+</p:sld>
+</file>
+
+<file path=ppt/slides/slide19.xml><?xml version="1.0" encoding="utf-8"?>
+<p:sld xmlns:a="http://schemas.openxmlformats.org/drawingml/2006/main" xmlns:r="http://schemas.openxmlformats.org/officeDocument/2006/relationships" xmlns:p="http://schemas.openxmlformats.org/presentationml/2006/main">
+  <p:cSld>
+    <p:spTree>
+      <p:nvGrpSpPr>
+        <p:cNvPr id="1" name=""/>
+        <p:cNvGrpSpPr/>
+        <p:nvPr/>
+      </p:nvGrpSpPr>
+      <p:grpSpPr>
+        <a:xfrm>
+          <a:off x="0" y="0"/>
+          <a:ext cx="0" cy="0"/>
+          <a:chOff x="0" y="0"/>
+          <a:chExt cx="0" cy="0"/>
+        </a:xfrm>
+      </p:grpSpPr>
+      <p:sp>
+        <p:nvSpPr>
+          <p:cNvPr id="7" name="Slide Number Placeholder 6"/>
+          <p:cNvSpPr>
+            <a:spLocks noGrp="1"/>
+          </p:cNvSpPr>
+          <p:nvPr>
+            <p:ph type="sldNum" sz="quarter" idx="12"/>
+          </p:nvPr>
+        </p:nvSpPr>
+        <p:spPr/>
+        <p:txBody>
+          <a:bodyPr/>
+          <a:lstStyle/>
+          <a:p>
+            <a:pPr rtl="0"/>
+            <a:fld id="{0FF54DE5-C571-48E8-A5BC-B369434E2F44}" type="slidenum">
+              <a:rPr lang="vi-VN" noProof="0" smtClean="0"/>
+              <a:t>19</a:t>
+            </a:fld>
+            <a:endParaRPr lang="vi-VN" noProof="0" dirty="0"/>
+          </a:p>
+        </p:txBody>
+      </p:sp>
+      <p:sp>
+        <p:nvSpPr>
+          <p:cNvPr id="16" name="Tiêu đề 1"/>
+          <p:cNvSpPr>
+            <a:spLocks noGrp="1"/>
+          </p:cNvSpPr>
+          <p:nvPr>
+            <p:ph type="title"/>
+          </p:nvPr>
+        </p:nvSpPr>
+        <p:spPr>
+          <a:xfrm>
+            <a:off x="1104900" y="76200"/>
+            <a:ext cx="9980682" cy="1096962"/>
+          </a:xfrm>
+        </p:spPr>
+        <p:txBody>
+          <a:bodyPr rtlCol="0">
+            <a:normAutofit/>
+          </a:bodyPr>
+          <a:lstStyle/>
+          <a:p>
+            <a:pPr rtl="0"/>
+            <a:r>
+              <a:rPr lang="en-US" sz="4000" dirty="0" smtClean="0">
+                <a:latin typeface="Arial" panose="020B0604020202020204" pitchFamily="34" charset="0"/>
+                <a:cs typeface="Arial" panose="020B0604020202020204" pitchFamily="34" charset="0"/>
+              </a:rPr>
+              <a:t>Acknowledge</a:t>
+            </a:r>
+            <a:endParaRPr lang="vi-VN" sz="4000" dirty="0">
+              <a:latin typeface="Arial" panose="020B0604020202020204" pitchFamily="34" charset="0"/>
+              <a:cs typeface="Arial" panose="020B0604020202020204" pitchFamily="34" charset="0"/>
+            </a:endParaRPr>
+          </a:p>
+        </p:txBody>
+      </p:sp>
+      <p:sp>
+        <p:nvSpPr>
+          <p:cNvPr id="2" name="TextBox 1"/>
+          <p:cNvSpPr txBox="1"/>
+          <p:nvPr/>
+        </p:nvSpPr>
+        <p:spPr>
+          <a:xfrm>
+            <a:off x="1546167" y="1825764"/>
+            <a:ext cx="8146473" cy="1938992"/>
+          </a:xfrm>
+          <a:prstGeom prst="rect">
+            <a:avLst/>
+          </a:prstGeom>
+          <a:noFill/>
+        </p:spPr>
+        <p:txBody>
+          <a:bodyPr wrap="square" rtlCol="0">
+            <a:spAutoFit/>
+          </a:bodyPr>
+          <a:lstStyle/>
+          <a:p>
+            <a:pPr marL="285750" indent="-285750">
+              <a:lnSpc>
+                <a:spcPct val="200000"/>
+              </a:lnSpc>
+              <a:buFont typeface="Arial" panose="020B0604020202020204" pitchFamily="34" charset="0"/>
+              <a:buChar char="•"/>
+            </a:pPr>
+            <a:r>
+              <a:rPr lang="en-US" sz="3000" dirty="0" smtClean="0"/>
+              <a:t>Dr. Pham Viet </a:t>
+            </a:r>
+            <a:r>
+              <a:rPr lang="en-US" sz="3000" dirty="0" err="1" smtClean="0"/>
+              <a:t>Cuong</a:t>
+            </a:r>
+            <a:r>
+              <a:rPr lang="en-US" sz="3000" dirty="0" smtClean="0"/>
+              <a:t>: promote a chance.</a:t>
+            </a:r>
+          </a:p>
+          <a:p>
+            <a:pPr marL="285750" indent="-285750">
+              <a:lnSpc>
+                <a:spcPct val="200000"/>
+              </a:lnSpc>
+              <a:buFont typeface="Arial" panose="020B0604020202020204" pitchFamily="34" charset="0"/>
+              <a:buChar char="•"/>
+            </a:pPr>
+            <a:r>
+              <a:rPr lang="en-US" sz="3000" dirty="0" smtClean="0"/>
+              <a:t>Course-EE3063 students: donate data.</a:t>
+            </a:r>
+            <a:endParaRPr lang="en-US" sz="3000" dirty="0"/>
+          </a:p>
+        </p:txBody>
+      </p:sp>
+    </p:spTree>
+    <p:extLst>
+      <p:ext uri="{BB962C8B-B14F-4D97-AF65-F5344CB8AC3E}">
+        <p14:creationId xmlns:p14="http://schemas.microsoft.com/office/powerpoint/2010/main" val="204413065"/>
+      </p:ext>
+    </p:extLst>
+  </p:cSld>
+  <p:clrMapOvr>
+    <a:masterClrMapping/>
+  </p:clrMapOvr>
+  <mc:AlternateContent xmlns:mc="http://schemas.openxmlformats.org/markup-compatibility/2006" xmlns:p14="http://schemas.microsoft.com/office/powerpoint/2010/main">
+    <mc:Choice Requires="p14">
+      <p:transition p14:dur="10"/>
     </mc:Choice>
     <mc:Fallback xmlns="">
       <p:transition/>
@@ -8253,6 +11115,82 @@
           </a:p>
         </p:txBody>
       </p:sp>
+      <p:grpSp>
+        <p:nvGrpSpPr>
+          <p:cNvPr id="4" name="Group 3"/>
+          <p:cNvGrpSpPr/>
+          <p:nvPr/>
+        </p:nvGrpSpPr>
+        <p:grpSpPr>
+          <a:xfrm>
+            <a:off x="2155008" y="1721668"/>
+            <a:ext cx="7880465" cy="3801131"/>
+            <a:chOff x="2155008" y="1455661"/>
+            <a:chExt cx="7880465" cy="3801131"/>
+          </a:xfrm>
+        </p:grpSpPr>
+        <p:pic>
+          <p:nvPicPr>
+            <p:cNvPr id="2" name="Picture 1"/>
+            <p:cNvPicPr>
+              <a:picLocks noChangeAspect="1"/>
+            </p:cNvPicPr>
+            <p:nvPr/>
+          </p:nvPicPr>
+          <p:blipFill>
+            <a:blip r:embed="rId3" cstate="print">
+              <a:extLst>
+                <a:ext uri="{28A0092B-C50C-407E-A947-70E740481C1C}">
+                  <a14:useLocalDpi xmlns:a14="http://schemas.microsoft.com/office/drawing/2010/main" val="0"/>
+                </a:ext>
+              </a:extLst>
+            </a:blip>
+            <a:stretch>
+              <a:fillRect/>
+            </a:stretch>
+          </p:blipFill>
+          <p:spPr>
+            <a:xfrm>
+              <a:off x="2155008" y="1455661"/>
+              <a:ext cx="7880465" cy="3354855"/>
+            </a:xfrm>
+            <a:prstGeom prst="rect">
+              <a:avLst/>
+            </a:prstGeom>
+          </p:spPr>
+        </p:pic>
+        <p:sp>
+          <p:nvSpPr>
+            <p:cNvPr id="3" name="TextBox 2"/>
+            <p:cNvSpPr txBox="1"/>
+            <p:nvPr/>
+          </p:nvSpPr>
+          <p:spPr>
+            <a:xfrm>
+              <a:off x="4952240" y="4810516"/>
+              <a:ext cx="2286000" cy="446276"/>
+            </a:xfrm>
+            <a:prstGeom prst="rect">
+              <a:avLst/>
+            </a:prstGeom>
+            <a:noFill/>
+          </p:spPr>
+          <p:txBody>
+            <a:bodyPr wrap="square" rtlCol="0">
+              <a:spAutoFit/>
+            </a:bodyPr>
+            <a:lstStyle/>
+            <a:p>
+              <a:pPr algn="ctr"/>
+              <a:r>
+                <a:rPr lang="en-US" sz="2300" dirty="0" smtClean="0"/>
+                <a:t>System pipeline</a:t>
+              </a:r>
+              <a:endParaRPr lang="en-US" sz="2300" dirty="0"/>
+            </a:p>
+          </p:txBody>
+        </p:sp>
+      </p:grpSp>
     </p:spTree>
     <p:extLst>
       <p:ext uri="{BB962C8B-B14F-4D97-AF65-F5344CB8AC3E}">
@@ -8350,7 +11288,7 @@
                 <a:latin typeface="Arial" panose="020B0604020202020204" pitchFamily="34" charset="0"/>
                 <a:cs typeface="Arial" panose="020B0604020202020204" pitchFamily="34" charset="0"/>
               </a:rPr>
-              <a:t>Experimental results</a:t>
+              <a:t>Implementation</a:t>
             </a:r>
             <a:endParaRPr lang="vi-VN" sz="4000" dirty="0">
               <a:latin typeface="Arial" panose="020B0604020202020204" pitchFamily="34" charset="0"/>
@@ -8359,10 +11297,215 @@
           </a:p>
         </p:txBody>
       </p:sp>
+      <p:sp>
+        <p:nvSpPr>
+          <p:cNvPr id="5" name="TextBox 4"/>
+          <p:cNvSpPr txBox="1"/>
+          <p:nvPr/>
+        </p:nvSpPr>
+        <p:spPr>
+          <a:xfrm>
+            <a:off x="1462348" y="1537854"/>
+            <a:ext cx="1970809" cy="446276"/>
+          </a:xfrm>
+          <a:prstGeom prst="rect">
+            <a:avLst/>
+          </a:prstGeom>
+          <a:noFill/>
+        </p:spPr>
+        <p:txBody>
+          <a:bodyPr wrap="square" rtlCol="0">
+            <a:spAutoFit/>
+          </a:bodyPr>
+          <a:lstStyle/>
+          <a:p>
+            <a:r>
+              <a:rPr lang="en-US" sz="2300" dirty="0" smtClean="0">
+                <a:solidFill>
+                  <a:schemeClr val="tx2"/>
+                </a:solidFill>
+              </a:rPr>
+              <a:t>Blur detection</a:t>
+            </a:r>
+            <a:endParaRPr lang="en-US" sz="2300" dirty="0">
+              <a:solidFill>
+                <a:schemeClr val="tx2"/>
+              </a:solidFill>
+            </a:endParaRPr>
+          </a:p>
+        </p:txBody>
+      </p:sp>
+      <p:grpSp>
+        <p:nvGrpSpPr>
+          <p:cNvPr id="18" name="Group 17"/>
+          <p:cNvGrpSpPr/>
+          <p:nvPr/>
+        </p:nvGrpSpPr>
+        <p:grpSpPr>
+          <a:xfrm>
+            <a:off x="1963469" y="2481826"/>
+            <a:ext cx="8263543" cy="2815259"/>
+            <a:chOff x="1853047" y="2481826"/>
+            <a:chExt cx="8263543" cy="2815259"/>
+          </a:xfrm>
+        </p:grpSpPr>
+        <p:pic>
+          <p:nvPicPr>
+            <p:cNvPr id="1026" name="Picture 2" descr="Image result for motion blur"/>
+            <p:cNvPicPr>
+              <a:picLocks noChangeAspect="1" noChangeArrowheads="1"/>
+            </p:cNvPicPr>
+            <p:nvPr/>
+          </p:nvPicPr>
+          <p:blipFill>
+            <a:blip r:embed="rId3">
+              <a:extLst>
+                <a:ext uri="{28A0092B-C50C-407E-A947-70E740481C1C}">
+                  <a14:useLocalDpi xmlns:a14="http://schemas.microsoft.com/office/drawing/2010/main" val="0"/>
+                </a:ext>
+              </a:extLst>
+            </a:blip>
+            <a:srcRect/>
+            <a:stretch>
+              <a:fillRect/>
+            </a:stretch>
+          </p:blipFill>
+          <p:spPr bwMode="auto">
+            <a:xfrm>
+              <a:off x="1853047" y="2481826"/>
+              <a:ext cx="3924299" cy="2815259"/>
+            </a:xfrm>
+            <a:prstGeom prst="rect">
+              <a:avLst/>
+            </a:prstGeom>
+            <a:noFill/>
+            <a:extLst>
+              <a:ext uri="{909E8E84-426E-40DD-AFC4-6F175D3DCCD1}">
+                <a14:hiddenFill xmlns:a14="http://schemas.microsoft.com/office/drawing/2010/main">
+                  <a:solidFill>
+                    <a:srgbClr val="FFFFFF"/>
+                  </a:solidFill>
+                </a14:hiddenFill>
+              </a:ext>
+            </a:extLst>
+          </p:spPr>
+        </p:pic>
+        <p:pic>
+          <p:nvPicPr>
+            <p:cNvPr id="1028" name="Picture 4" descr="Image result for FFT of image"/>
+            <p:cNvPicPr>
+              <a:picLocks noChangeAspect="1" noChangeArrowheads="1"/>
+            </p:cNvPicPr>
+            <p:nvPr/>
+          </p:nvPicPr>
+          <p:blipFill>
+            <a:blip r:embed="rId4">
+              <a:extLst>
+                <a:ext uri="{28A0092B-C50C-407E-A947-70E740481C1C}">
+                  <a14:useLocalDpi xmlns:a14="http://schemas.microsoft.com/office/drawing/2010/main" val="0"/>
+                </a:ext>
+              </a:extLst>
+            </a:blip>
+            <a:srcRect/>
+            <a:stretch>
+              <a:fillRect/>
+            </a:stretch>
+          </p:blipFill>
+          <p:spPr bwMode="auto">
+            <a:xfrm>
+              <a:off x="7304522" y="2481827"/>
+              <a:ext cx="2812068" cy="2812068"/>
+            </a:xfrm>
+            <a:prstGeom prst="rect">
+              <a:avLst/>
+            </a:prstGeom>
+            <a:noFill/>
+            <a:extLst>
+              <a:ext uri="{909E8E84-426E-40DD-AFC4-6F175D3DCCD1}">
+                <a14:hiddenFill xmlns:a14="http://schemas.microsoft.com/office/drawing/2010/main">
+                  <a:solidFill>
+                    <a:srgbClr val="FFFFFF"/>
+                  </a:solidFill>
+                </a14:hiddenFill>
+              </a:ext>
+            </a:extLst>
+          </p:spPr>
+        </p:pic>
+        <p:cxnSp>
+          <p:nvCxnSpPr>
+            <p:cNvPr id="8" name="Straight Arrow Connector 7"/>
+            <p:cNvCxnSpPr>
+              <a:stCxn id="1026" idx="3"/>
+              <a:endCxn id="1028" idx="1"/>
+            </p:cNvCxnSpPr>
+            <p:nvPr/>
+          </p:nvCxnSpPr>
+          <p:spPr>
+            <a:xfrm flipV="1">
+              <a:off x="5777346" y="3887861"/>
+              <a:ext cx="1527176" cy="1595"/>
+            </a:xfrm>
+            <a:prstGeom prst="straightConnector1">
+              <a:avLst/>
+            </a:prstGeom>
+            <a:ln>
+              <a:solidFill>
+                <a:schemeClr val="accent1"/>
+              </a:solidFill>
+              <a:tailEnd type="triangle"/>
+            </a:ln>
+          </p:spPr>
+          <p:style>
+            <a:lnRef idx="1">
+              <a:schemeClr val="accent1"/>
+            </a:lnRef>
+            <a:fillRef idx="0">
+              <a:schemeClr val="accent1"/>
+            </a:fillRef>
+            <a:effectRef idx="0">
+              <a:schemeClr val="accent1"/>
+            </a:effectRef>
+            <a:fontRef idx="minor">
+              <a:schemeClr val="tx1"/>
+            </a:fontRef>
+          </p:style>
+        </p:cxnSp>
+        <p:sp>
+          <p:nvSpPr>
+            <p:cNvPr id="9" name="TextBox 8"/>
+            <p:cNvSpPr txBox="1"/>
+            <p:nvPr/>
+          </p:nvSpPr>
+          <p:spPr>
+            <a:xfrm>
+              <a:off x="6052841" y="3580090"/>
+              <a:ext cx="976185" cy="369332"/>
+            </a:xfrm>
+            <a:prstGeom prst="rect">
+              <a:avLst/>
+            </a:prstGeom>
+            <a:noFill/>
+          </p:spPr>
+          <p:txBody>
+            <a:bodyPr wrap="square" rtlCol="0">
+              <a:spAutoFit/>
+            </a:bodyPr>
+            <a:lstStyle/>
+            <a:p>
+              <a:pPr algn="ctr"/>
+              <a:r>
+                <a:rPr lang="en-US" dirty="0" smtClean="0"/>
+                <a:t>FFT-2D</a:t>
+              </a:r>
+              <a:endParaRPr lang="en-US" dirty="0"/>
+            </a:p>
+          </p:txBody>
+        </p:sp>
+      </p:grpSp>
     </p:spTree>
     <p:extLst>
       <p:ext uri="{BB962C8B-B14F-4D97-AF65-F5344CB8AC3E}">
-        <p14:creationId xmlns:p14="http://schemas.microsoft.com/office/powerpoint/2010/main" val="3760579364"/>
+        <p14:creationId xmlns:p14="http://schemas.microsoft.com/office/powerpoint/2010/main" val="1595097760"/>
       </p:ext>
     </p:extLst>
   </p:cSld>
@@ -9144,132 +12287,6 @@
 </file>
 
 <file path=customXml/item2.xml><?xml version="1.0" encoding="utf-8"?>
-<p:properties xmlns:p="http://schemas.microsoft.com/office/2006/metadata/properties" xmlns:xsi="http://www.w3.org/2001/XMLSchema-instance" xmlns:pc="http://schemas.microsoft.com/office/infopath/2007/PartnerControls">
-  <documentManagement>
-    <APDescription xmlns="4873beb7-5857-4685-be1f-d57550cc96cc" xsi:nil="true"/>
-    <AssetExpire xmlns="4873beb7-5857-4685-be1f-d57550cc96cc">2029-01-01T08:00:00+00:00</AssetExpire>
-    <CampaignTagsTaxHTField0 xmlns="4873beb7-5857-4685-be1f-d57550cc96cc">
-      <Terms xmlns="http://schemas.microsoft.com/office/infopath/2007/PartnerControls"/>
-    </CampaignTagsTaxHTField0>
-    <IntlLangReviewDate xmlns="4873beb7-5857-4685-be1f-d57550cc96cc" xsi:nil="true"/>
-    <TPFriendlyName xmlns="4873beb7-5857-4685-be1f-d57550cc96cc" xsi:nil="true"/>
-    <IntlLangReview xmlns="4873beb7-5857-4685-be1f-d57550cc96cc">false</IntlLangReview>
-    <LocLastLocAttemptVersionLookup xmlns="4873beb7-5857-4685-be1f-d57550cc96cc">855024</LocLastLocAttemptVersionLookup>
-    <PolicheckWords xmlns="4873beb7-5857-4685-be1f-d57550cc96cc" xsi:nil="true"/>
-    <SubmitterId xmlns="4873beb7-5857-4685-be1f-d57550cc96cc" xsi:nil="true"/>
-    <AcquiredFrom xmlns="4873beb7-5857-4685-be1f-d57550cc96cc">Internal MS</AcquiredFrom>
-    <EditorialStatus xmlns="4873beb7-5857-4685-be1f-d57550cc96cc">Complete</EditorialStatus>
-    <Markets xmlns="4873beb7-5857-4685-be1f-d57550cc96cc"/>
-    <OriginAsset xmlns="4873beb7-5857-4685-be1f-d57550cc96cc" xsi:nil="true"/>
-    <AssetStart xmlns="4873beb7-5857-4685-be1f-d57550cc96cc">2012-08-31T08:50:00+00:00</AssetStart>
-    <FriendlyTitle xmlns="4873beb7-5857-4685-be1f-d57550cc96cc" xsi:nil="true"/>
-    <MarketSpecific xmlns="4873beb7-5857-4685-be1f-d57550cc96cc">false</MarketSpecific>
-    <TPNamespace xmlns="4873beb7-5857-4685-be1f-d57550cc96cc" xsi:nil="true"/>
-    <PublishStatusLookup xmlns="4873beb7-5857-4685-be1f-d57550cc96cc">
-      <Value>1616423</Value>
-    </PublishStatusLookup>
-    <APAuthor xmlns="4873beb7-5857-4685-be1f-d57550cc96cc">
-      <UserInfo>
-        <DisplayName>REDMOND\kristaa</DisplayName>
-        <AccountId>136</AccountId>
-        <AccountType/>
-      </UserInfo>
-    </APAuthor>
-    <TPCommandLine xmlns="4873beb7-5857-4685-be1f-d57550cc96cc" xsi:nil="true"/>
-    <IntlLangReviewer xmlns="4873beb7-5857-4685-be1f-d57550cc96cc" xsi:nil="true"/>
-    <OpenTemplate xmlns="4873beb7-5857-4685-be1f-d57550cc96cc">true</OpenTemplate>
-    <CSXSubmissionDate xmlns="4873beb7-5857-4685-be1f-d57550cc96cc" xsi:nil="true"/>
-    <TaxCatchAll xmlns="4873beb7-5857-4685-be1f-d57550cc96cc"/>
-    <Manager xmlns="4873beb7-5857-4685-be1f-d57550cc96cc" xsi:nil="true"/>
-    <NumericId xmlns="4873beb7-5857-4685-be1f-d57550cc96cc" xsi:nil="true"/>
-    <ParentAssetId xmlns="4873beb7-5857-4685-be1f-d57550cc96cc" xsi:nil="true"/>
-    <OriginalSourceMarket xmlns="4873beb7-5857-4685-be1f-d57550cc96cc" xsi:nil="true"/>
-    <ApprovalStatus xmlns="4873beb7-5857-4685-be1f-d57550cc96cc">InProgress</ApprovalStatus>
-    <TPComponent xmlns="4873beb7-5857-4685-be1f-d57550cc96cc" xsi:nil="true"/>
-    <EditorialTags xmlns="4873beb7-5857-4685-be1f-d57550cc96cc" xsi:nil="true"/>
-    <TPExecutable xmlns="4873beb7-5857-4685-be1f-d57550cc96cc" xsi:nil="true"/>
-    <TPLaunchHelpLink xmlns="4873beb7-5857-4685-be1f-d57550cc96cc" xsi:nil="true"/>
-    <LocComments xmlns="4873beb7-5857-4685-be1f-d57550cc96cc" xsi:nil="true"/>
-    <LocRecommendedHandoff xmlns="4873beb7-5857-4685-be1f-d57550cc96cc" xsi:nil="true"/>
-    <SourceTitle xmlns="4873beb7-5857-4685-be1f-d57550cc96cc" xsi:nil="true"/>
-    <CSXUpdate xmlns="4873beb7-5857-4685-be1f-d57550cc96cc">false</CSXUpdate>
-    <IntlLocPriority xmlns="4873beb7-5857-4685-be1f-d57550cc96cc" xsi:nil="true"/>
-    <UAProjectedTotalWords xmlns="4873beb7-5857-4685-be1f-d57550cc96cc" xsi:nil="true"/>
-    <AssetType xmlns="4873beb7-5857-4685-be1f-d57550cc96cc">TP</AssetType>
-    <MachineTranslated xmlns="4873beb7-5857-4685-be1f-d57550cc96cc">false</MachineTranslated>
-    <OutputCachingOn xmlns="4873beb7-5857-4685-be1f-d57550cc96cc">false</OutputCachingOn>
-    <TemplateStatus xmlns="4873beb7-5857-4685-be1f-d57550cc96cc">Complete</TemplateStatus>
-    <IsSearchable xmlns="4873beb7-5857-4685-be1f-d57550cc96cc">true</IsSearchable>
-    <ContentItem xmlns="4873beb7-5857-4685-be1f-d57550cc96cc" xsi:nil="true"/>
-    <HandoffToMSDN xmlns="4873beb7-5857-4685-be1f-d57550cc96cc" xsi:nil="true"/>
-    <ShowIn xmlns="4873beb7-5857-4685-be1f-d57550cc96cc">Show everywhere</ShowIn>
-    <ThumbnailAssetId xmlns="4873beb7-5857-4685-be1f-d57550cc96cc" xsi:nil="true"/>
-    <UALocComments xmlns="4873beb7-5857-4685-be1f-d57550cc96cc" xsi:nil="true"/>
-    <UALocRecommendation xmlns="4873beb7-5857-4685-be1f-d57550cc96cc">Localize</UALocRecommendation>
-    <LastModifiedDateTime xmlns="4873beb7-5857-4685-be1f-d57550cc96cc" xsi:nil="true"/>
-    <LegacyData xmlns="4873beb7-5857-4685-be1f-d57550cc96cc" xsi:nil="true"/>
-    <LocManualTestRequired xmlns="4873beb7-5857-4685-be1f-d57550cc96cc">false</LocManualTestRequired>
-    <LocMarketGroupTiers2 xmlns="4873beb7-5857-4685-be1f-d57550cc96cc" xsi:nil="true"/>
-    <ClipArtFilename xmlns="4873beb7-5857-4685-be1f-d57550cc96cc" xsi:nil="true"/>
-    <TPApplication xmlns="4873beb7-5857-4685-be1f-d57550cc96cc" xsi:nil="true"/>
-    <CSXHash xmlns="4873beb7-5857-4685-be1f-d57550cc96cc" xsi:nil="true"/>
-    <DirectSourceMarket xmlns="4873beb7-5857-4685-be1f-d57550cc96cc" xsi:nil="true"/>
-    <PrimaryImageGen xmlns="4873beb7-5857-4685-be1f-d57550cc96cc">true</PrimaryImageGen>
-    <PlannedPubDate xmlns="4873beb7-5857-4685-be1f-d57550cc96cc" xsi:nil="true"/>
-    <CSXSubmissionMarket xmlns="4873beb7-5857-4685-be1f-d57550cc96cc" xsi:nil="true"/>
-    <Downloads xmlns="4873beb7-5857-4685-be1f-d57550cc96cc">0</Downloads>
-    <ArtSampleDocs xmlns="4873beb7-5857-4685-be1f-d57550cc96cc" xsi:nil="true"/>
-    <TrustLevel xmlns="4873beb7-5857-4685-be1f-d57550cc96cc">1 Microsoft Managed Content</TrustLevel>
-    <BlockPublish xmlns="4873beb7-5857-4685-be1f-d57550cc96cc">false</BlockPublish>
-    <TPLaunchHelpLinkType xmlns="4873beb7-5857-4685-be1f-d57550cc96cc">Template</TPLaunchHelpLinkType>
-    <LocalizationTagsTaxHTField0 xmlns="4873beb7-5857-4685-be1f-d57550cc96cc">
-      <Terms xmlns="http://schemas.microsoft.com/office/infopath/2007/PartnerControls"/>
-    </LocalizationTagsTaxHTField0>
-    <BusinessGroup xmlns="4873beb7-5857-4685-be1f-d57550cc96cc" xsi:nil="true"/>
-    <Providers xmlns="4873beb7-5857-4685-be1f-d57550cc96cc" xsi:nil="true"/>
-    <TemplateTemplateType xmlns="4873beb7-5857-4685-be1f-d57550cc96cc">PowerPoint Presentation Template</TemplateTemplateType>
-    <TimesCloned xmlns="4873beb7-5857-4685-be1f-d57550cc96cc" xsi:nil="true"/>
-    <TPAppVersion xmlns="4873beb7-5857-4685-be1f-d57550cc96cc" xsi:nil="true"/>
-    <VoteCount xmlns="4873beb7-5857-4685-be1f-d57550cc96cc" xsi:nil="true"/>
-    <AverageRating xmlns="4873beb7-5857-4685-be1f-d57550cc96cc" xsi:nil="true"/>
-    <FeatureTagsTaxHTField0 xmlns="4873beb7-5857-4685-be1f-d57550cc96cc">
-      <Terms xmlns="http://schemas.microsoft.com/office/infopath/2007/PartnerControls"/>
-    </FeatureTagsTaxHTField0>
-    <Provider xmlns="4873beb7-5857-4685-be1f-d57550cc96cc" xsi:nil="true"/>
-    <UACurrentWords xmlns="4873beb7-5857-4685-be1f-d57550cc96cc" xsi:nil="true"/>
-    <AssetId xmlns="4873beb7-5857-4685-be1f-d57550cc96cc">TP103431361</AssetId>
-    <TPClientViewer xmlns="4873beb7-5857-4685-be1f-d57550cc96cc" xsi:nil="true"/>
-    <DSATActionTaken xmlns="4873beb7-5857-4685-be1f-d57550cc96cc" xsi:nil="true"/>
-    <APEditor xmlns="4873beb7-5857-4685-be1f-d57550cc96cc">
-      <UserInfo>
-        <DisplayName/>
-        <AccountId xsi:nil="true"/>
-        <AccountType/>
-      </UserInfo>
-    </APEditor>
-    <TPInstallLocation xmlns="4873beb7-5857-4685-be1f-d57550cc96cc" xsi:nil="true"/>
-    <OOCacheId xmlns="4873beb7-5857-4685-be1f-d57550cc96cc" xsi:nil="true"/>
-    <IsDeleted xmlns="4873beb7-5857-4685-be1f-d57550cc96cc">false</IsDeleted>
-    <PublishTargets xmlns="4873beb7-5857-4685-be1f-d57550cc96cc">OfficeOnlineVNext</PublishTargets>
-    <ApprovalLog xmlns="4873beb7-5857-4685-be1f-d57550cc96cc" xsi:nil="true"/>
-    <BugNumber xmlns="4873beb7-5857-4685-be1f-d57550cc96cc" xsi:nil="true"/>
-    <CrawlForDependencies xmlns="4873beb7-5857-4685-be1f-d57550cc96cc">false</CrawlForDependencies>
-    <InternalTagsTaxHTField0 xmlns="4873beb7-5857-4685-be1f-d57550cc96cc">
-      <Terms xmlns="http://schemas.microsoft.com/office/infopath/2007/PartnerControls"/>
-    </InternalTagsTaxHTField0>
-    <LastHandOff xmlns="4873beb7-5857-4685-be1f-d57550cc96cc" xsi:nil="true"/>
-    <Milestone xmlns="4873beb7-5857-4685-be1f-d57550cc96cc" xsi:nil="true"/>
-    <OriginalRelease xmlns="4873beb7-5857-4685-be1f-d57550cc96cc">15</OriginalRelease>
-    <RecommendationsModifier xmlns="4873beb7-5857-4685-be1f-d57550cc96cc" xsi:nil="true"/>
-    <ScenarioTagsTaxHTField0 xmlns="4873beb7-5857-4685-be1f-d57550cc96cc">
-      <Terms xmlns="http://schemas.microsoft.com/office/infopath/2007/PartnerControls"/>
-    </ScenarioTagsTaxHTField0>
-    <UANotes xmlns="4873beb7-5857-4685-be1f-d57550cc96cc" xsi:nil="true"/>
-  </documentManagement>
-</p:properties>
-</file>
-
-<file path=customXml/item3.xml><?xml version="1.0" encoding="utf-8"?>
 <ct:contentTypeSchema xmlns:ct="http://schemas.microsoft.com/office/2006/metadata/contentType" xmlns:ma="http://schemas.microsoft.com/office/2006/metadata/properties/metaAttributes" ct:_="" ma:_="" ma:contentTypeName="TemplateFile" ma:contentTypeID="0x0101006EDDDB5EE6D98C44930B742096920B300400F5B6D36B3EF94B4E9A635CDF2A18F5B8" ma:contentTypeVersion="72" ma:contentTypeDescription="Create a new document." ma:contentTypeScope="" ma:versionID="a23e56308344d904b51738559c3d67c9">
   <xsd:schema xmlns:xsd="http://www.w3.org/2001/XMLSchema" xmlns:xs="http://www.w3.org/2001/XMLSchema" xmlns:p="http://schemas.microsoft.com/office/2006/metadata/properties" xmlns:ns2="4873beb7-5857-4685-be1f-d57550cc96cc" targetNamespace="http://schemas.microsoft.com/office/2006/metadata/properties" ma:root="true" ma:fieldsID="cd0908cc4600e77bf5da051303e00c8d" ns2:_="">
     <xsd:import namespace="4873beb7-5857-4685-be1f-d57550cc96cc"/>
@@ -10309,6 +13326,132 @@
 </ct:contentTypeSchema>
 </file>
 
+<file path=customXml/item3.xml><?xml version="1.0" encoding="utf-8"?>
+<p:properties xmlns:p="http://schemas.microsoft.com/office/2006/metadata/properties" xmlns:xsi="http://www.w3.org/2001/XMLSchema-instance" xmlns:pc="http://schemas.microsoft.com/office/infopath/2007/PartnerControls">
+  <documentManagement>
+    <APDescription xmlns="4873beb7-5857-4685-be1f-d57550cc96cc" xsi:nil="true"/>
+    <AssetExpire xmlns="4873beb7-5857-4685-be1f-d57550cc96cc">2029-01-01T08:00:00+00:00</AssetExpire>
+    <CampaignTagsTaxHTField0 xmlns="4873beb7-5857-4685-be1f-d57550cc96cc">
+      <Terms xmlns="http://schemas.microsoft.com/office/infopath/2007/PartnerControls"/>
+    </CampaignTagsTaxHTField0>
+    <IntlLangReviewDate xmlns="4873beb7-5857-4685-be1f-d57550cc96cc" xsi:nil="true"/>
+    <TPFriendlyName xmlns="4873beb7-5857-4685-be1f-d57550cc96cc" xsi:nil="true"/>
+    <IntlLangReview xmlns="4873beb7-5857-4685-be1f-d57550cc96cc">false</IntlLangReview>
+    <LocLastLocAttemptVersionLookup xmlns="4873beb7-5857-4685-be1f-d57550cc96cc">855024</LocLastLocAttemptVersionLookup>
+    <PolicheckWords xmlns="4873beb7-5857-4685-be1f-d57550cc96cc" xsi:nil="true"/>
+    <SubmitterId xmlns="4873beb7-5857-4685-be1f-d57550cc96cc" xsi:nil="true"/>
+    <AcquiredFrom xmlns="4873beb7-5857-4685-be1f-d57550cc96cc">Internal MS</AcquiredFrom>
+    <EditorialStatus xmlns="4873beb7-5857-4685-be1f-d57550cc96cc">Complete</EditorialStatus>
+    <Markets xmlns="4873beb7-5857-4685-be1f-d57550cc96cc"/>
+    <OriginAsset xmlns="4873beb7-5857-4685-be1f-d57550cc96cc" xsi:nil="true"/>
+    <AssetStart xmlns="4873beb7-5857-4685-be1f-d57550cc96cc">2012-08-31T08:50:00+00:00</AssetStart>
+    <FriendlyTitle xmlns="4873beb7-5857-4685-be1f-d57550cc96cc" xsi:nil="true"/>
+    <MarketSpecific xmlns="4873beb7-5857-4685-be1f-d57550cc96cc">false</MarketSpecific>
+    <TPNamespace xmlns="4873beb7-5857-4685-be1f-d57550cc96cc" xsi:nil="true"/>
+    <PublishStatusLookup xmlns="4873beb7-5857-4685-be1f-d57550cc96cc">
+      <Value>1616423</Value>
+    </PublishStatusLookup>
+    <APAuthor xmlns="4873beb7-5857-4685-be1f-d57550cc96cc">
+      <UserInfo>
+        <DisplayName>REDMOND\kristaa</DisplayName>
+        <AccountId>136</AccountId>
+        <AccountType/>
+      </UserInfo>
+    </APAuthor>
+    <TPCommandLine xmlns="4873beb7-5857-4685-be1f-d57550cc96cc" xsi:nil="true"/>
+    <IntlLangReviewer xmlns="4873beb7-5857-4685-be1f-d57550cc96cc" xsi:nil="true"/>
+    <OpenTemplate xmlns="4873beb7-5857-4685-be1f-d57550cc96cc">true</OpenTemplate>
+    <CSXSubmissionDate xmlns="4873beb7-5857-4685-be1f-d57550cc96cc" xsi:nil="true"/>
+    <TaxCatchAll xmlns="4873beb7-5857-4685-be1f-d57550cc96cc"/>
+    <Manager xmlns="4873beb7-5857-4685-be1f-d57550cc96cc" xsi:nil="true"/>
+    <NumericId xmlns="4873beb7-5857-4685-be1f-d57550cc96cc" xsi:nil="true"/>
+    <ParentAssetId xmlns="4873beb7-5857-4685-be1f-d57550cc96cc" xsi:nil="true"/>
+    <OriginalSourceMarket xmlns="4873beb7-5857-4685-be1f-d57550cc96cc" xsi:nil="true"/>
+    <ApprovalStatus xmlns="4873beb7-5857-4685-be1f-d57550cc96cc">InProgress</ApprovalStatus>
+    <TPComponent xmlns="4873beb7-5857-4685-be1f-d57550cc96cc" xsi:nil="true"/>
+    <EditorialTags xmlns="4873beb7-5857-4685-be1f-d57550cc96cc" xsi:nil="true"/>
+    <TPExecutable xmlns="4873beb7-5857-4685-be1f-d57550cc96cc" xsi:nil="true"/>
+    <TPLaunchHelpLink xmlns="4873beb7-5857-4685-be1f-d57550cc96cc" xsi:nil="true"/>
+    <LocComments xmlns="4873beb7-5857-4685-be1f-d57550cc96cc" xsi:nil="true"/>
+    <LocRecommendedHandoff xmlns="4873beb7-5857-4685-be1f-d57550cc96cc" xsi:nil="true"/>
+    <SourceTitle xmlns="4873beb7-5857-4685-be1f-d57550cc96cc" xsi:nil="true"/>
+    <CSXUpdate xmlns="4873beb7-5857-4685-be1f-d57550cc96cc">false</CSXUpdate>
+    <IntlLocPriority xmlns="4873beb7-5857-4685-be1f-d57550cc96cc" xsi:nil="true"/>
+    <UAProjectedTotalWords xmlns="4873beb7-5857-4685-be1f-d57550cc96cc" xsi:nil="true"/>
+    <AssetType xmlns="4873beb7-5857-4685-be1f-d57550cc96cc">TP</AssetType>
+    <MachineTranslated xmlns="4873beb7-5857-4685-be1f-d57550cc96cc">false</MachineTranslated>
+    <OutputCachingOn xmlns="4873beb7-5857-4685-be1f-d57550cc96cc">false</OutputCachingOn>
+    <TemplateStatus xmlns="4873beb7-5857-4685-be1f-d57550cc96cc">Complete</TemplateStatus>
+    <IsSearchable xmlns="4873beb7-5857-4685-be1f-d57550cc96cc">true</IsSearchable>
+    <ContentItem xmlns="4873beb7-5857-4685-be1f-d57550cc96cc" xsi:nil="true"/>
+    <HandoffToMSDN xmlns="4873beb7-5857-4685-be1f-d57550cc96cc" xsi:nil="true"/>
+    <ShowIn xmlns="4873beb7-5857-4685-be1f-d57550cc96cc">Show everywhere</ShowIn>
+    <ThumbnailAssetId xmlns="4873beb7-5857-4685-be1f-d57550cc96cc" xsi:nil="true"/>
+    <UALocComments xmlns="4873beb7-5857-4685-be1f-d57550cc96cc" xsi:nil="true"/>
+    <UALocRecommendation xmlns="4873beb7-5857-4685-be1f-d57550cc96cc">Localize</UALocRecommendation>
+    <LastModifiedDateTime xmlns="4873beb7-5857-4685-be1f-d57550cc96cc" xsi:nil="true"/>
+    <LegacyData xmlns="4873beb7-5857-4685-be1f-d57550cc96cc" xsi:nil="true"/>
+    <LocManualTestRequired xmlns="4873beb7-5857-4685-be1f-d57550cc96cc">false</LocManualTestRequired>
+    <LocMarketGroupTiers2 xmlns="4873beb7-5857-4685-be1f-d57550cc96cc" xsi:nil="true"/>
+    <ClipArtFilename xmlns="4873beb7-5857-4685-be1f-d57550cc96cc" xsi:nil="true"/>
+    <TPApplication xmlns="4873beb7-5857-4685-be1f-d57550cc96cc" xsi:nil="true"/>
+    <CSXHash xmlns="4873beb7-5857-4685-be1f-d57550cc96cc" xsi:nil="true"/>
+    <DirectSourceMarket xmlns="4873beb7-5857-4685-be1f-d57550cc96cc" xsi:nil="true"/>
+    <PrimaryImageGen xmlns="4873beb7-5857-4685-be1f-d57550cc96cc">true</PrimaryImageGen>
+    <PlannedPubDate xmlns="4873beb7-5857-4685-be1f-d57550cc96cc" xsi:nil="true"/>
+    <CSXSubmissionMarket xmlns="4873beb7-5857-4685-be1f-d57550cc96cc" xsi:nil="true"/>
+    <Downloads xmlns="4873beb7-5857-4685-be1f-d57550cc96cc">0</Downloads>
+    <ArtSampleDocs xmlns="4873beb7-5857-4685-be1f-d57550cc96cc" xsi:nil="true"/>
+    <TrustLevel xmlns="4873beb7-5857-4685-be1f-d57550cc96cc">1 Microsoft Managed Content</TrustLevel>
+    <BlockPublish xmlns="4873beb7-5857-4685-be1f-d57550cc96cc">false</BlockPublish>
+    <TPLaunchHelpLinkType xmlns="4873beb7-5857-4685-be1f-d57550cc96cc">Template</TPLaunchHelpLinkType>
+    <LocalizationTagsTaxHTField0 xmlns="4873beb7-5857-4685-be1f-d57550cc96cc">
+      <Terms xmlns="http://schemas.microsoft.com/office/infopath/2007/PartnerControls"/>
+    </LocalizationTagsTaxHTField0>
+    <BusinessGroup xmlns="4873beb7-5857-4685-be1f-d57550cc96cc" xsi:nil="true"/>
+    <Providers xmlns="4873beb7-5857-4685-be1f-d57550cc96cc" xsi:nil="true"/>
+    <TemplateTemplateType xmlns="4873beb7-5857-4685-be1f-d57550cc96cc">PowerPoint Presentation Template</TemplateTemplateType>
+    <TimesCloned xmlns="4873beb7-5857-4685-be1f-d57550cc96cc" xsi:nil="true"/>
+    <TPAppVersion xmlns="4873beb7-5857-4685-be1f-d57550cc96cc" xsi:nil="true"/>
+    <VoteCount xmlns="4873beb7-5857-4685-be1f-d57550cc96cc" xsi:nil="true"/>
+    <AverageRating xmlns="4873beb7-5857-4685-be1f-d57550cc96cc" xsi:nil="true"/>
+    <FeatureTagsTaxHTField0 xmlns="4873beb7-5857-4685-be1f-d57550cc96cc">
+      <Terms xmlns="http://schemas.microsoft.com/office/infopath/2007/PartnerControls"/>
+    </FeatureTagsTaxHTField0>
+    <Provider xmlns="4873beb7-5857-4685-be1f-d57550cc96cc" xsi:nil="true"/>
+    <UACurrentWords xmlns="4873beb7-5857-4685-be1f-d57550cc96cc" xsi:nil="true"/>
+    <AssetId xmlns="4873beb7-5857-4685-be1f-d57550cc96cc">TP103431361</AssetId>
+    <TPClientViewer xmlns="4873beb7-5857-4685-be1f-d57550cc96cc" xsi:nil="true"/>
+    <DSATActionTaken xmlns="4873beb7-5857-4685-be1f-d57550cc96cc" xsi:nil="true"/>
+    <APEditor xmlns="4873beb7-5857-4685-be1f-d57550cc96cc">
+      <UserInfo>
+        <DisplayName/>
+        <AccountId xsi:nil="true"/>
+        <AccountType/>
+      </UserInfo>
+    </APEditor>
+    <TPInstallLocation xmlns="4873beb7-5857-4685-be1f-d57550cc96cc" xsi:nil="true"/>
+    <OOCacheId xmlns="4873beb7-5857-4685-be1f-d57550cc96cc" xsi:nil="true"/>
+    <IsDeleted xmlns="4873beb7-5857-4685-be1f-d57550cc96cc">false</IsDeleted>
+    <PublishTargets xmlns="4873beb7-5857-4685-be1f-d57550cc96cc">OfficeOnlineVNext</PublishTargets>
+    <ApprovalLog xmlns="4873beb7-5857-4685-be1f-d57550cc96cc" xsi:nil="true"/>
+    <BugNumber xmlns="4873beb7-5857-4685-be1f-d57550cc96cc" xsi:nil="true"/>
+    <CrawlForDependencies xmlns="4873beb7-5857-4685-be1f-d57550cc96cc">false</CrawlForDependencies>
+    <InternalTagsTaxHTField0 xmlns="4873beb7-5857-4685-be1f-d57550cc96cc">
+      <Terms xmlns="http://schemas.microsoft.com/office/infopath/2007/PartnerControls"/>
+    </InternalTagsTaxHTField0>
+    <LastHandOff xmlns="4873beb7-5857-4685-be1f-d57550cc96cc" xsi:nil="true"/>
+    <Milestone xmlns="4873beb7-5857-4685-be1f-d57550cc96cc" xsi:nil="true"/>
+    <OriginalRelease xmlns="4873beb7-5857-4685-be1f-d57550cc96cc">15</OriginalRelease>
+    <RecommendationsModifier xmlns="4873beb7-5857-4685-be1f-d57550cc96cc" xsi:nil="true"/>
+    <ScenarioTagsTaxHTField0 xmlns="4873beb7-5857-4685-be1f-d57550cc96cc">
+      <Terms xmlns="http://schemas.microsoft.com/office/infopath/2007/PartnerControls"/>
+    </ScenarioTagsTaxHTField0>
+    <UANotes xmlns="4873beb7-5857-4685-be1f-d57550cc96cc" xsi:nil="true"/>
+  </documentManagement>
+</p:properties>
+</file>
+
 <file path=customXml/itemProps1.xml><?xml version="1.0" encoding="utf-8"?>
 <ds:datastoreItem xmlns:ds="http://schemas.openxmlformats.org/officeDocument/2006/customXml" ds:itemID="{561E720F-F05D-4536-9C34-0CFCED65D3B7}">
   <ds:schemaRefs>
@@ -10318,22 +13461,6 @@
 </file>
 
 <file path=customXml/itemProps2.xml><?xml version="1.0" encoding="utf-8"?>
-<ds:datastoreItem xmlns:ds="http://schemas.openxmlformats.org/officeDocument/2006/customXml" ds:itemID="{8CDDBB83-77C1-4099-A0AA-289882E745E2}">
-  <ds:schemaRefs>
-    <ds:schemaRef ds:uri="http://www.w3.org/XML/1998/namespace"/>
-    <ds:schemaRef ds:uri="http://purl.org/dc/terms/"/>
-    <ds:schemaRef ds:uri="4873beb7-5857-4685-be1f-d57550cc96cc"/>
-    <ds:schemaRef ds:uri="http://purl.org/dc/elements/1.1/"/>
-    <ds:schemaRef ds:uri="http://schemas.microsoft.com/office/2006/metadata/properties"/>
-    <ds:schemaRef ds:uri="http://schemas.microsoft.com/office/2006/documentManagement/types"/>
-    <ds:schemaRef ds:uri="http://schemas.microsoft.com/office/infopath/2007/PartnerControls"/>
-    <ds:schemaRef ds:uri="http://schemas.openxmlformats.org/package/2006/metadata/core-properties"/>
-    <ds:schemaRef ds:uri="http://purl.org/dc/dcmitype/"/>
-  </ds:schemaRefs>
-</ds:datastoreItem>
-</file>
-
-<file path=customXml/itemProps3.xml><?xml version="1.0" encoding="utf-8"?>
 <ds:datastoreItem xmlns:ds="http://schemas.openxmlformats.org/officeDocument/2006/customXml" ds:itemID="{28C8B9CA-0273-4370-889A-FC05DA5C2FA5}">
   <ds:schemaRefs>
     <ds:schemaRef ds:uri="http://schemas.microsoft.com/office/2006/metadata/contentType"/>
@@ -10349,4 +13476,20 @@
     <ds:schemaRef ds:uri="http://schemas.microsoft.com/internal/obd"/>
   </ds:schemaRefs>
 </ds:datastoreItem>
+</file>
+
+<file path=customXml/itemProps3.xml><?xml version="1.0" encoding="utf-8"?>
+<ds:datastoreItem xmlns:ds="http://schemas.openxmlformats.org/officeDocument/2006/customXml" ds:itemID="{8CDDBB83-77C1-4099-A0AA-289882E745E2}">
+  <ds:schemaRefs>
+    <ds:schemaRef ds:uri="http://www.w3.org/XML/1998/namespace"/>
+    <ds:schemaRef ds:uri="http://purl.org/dc/terms/"/>
+    <ds:schemaRef ds:uri="4873beb7-5857-4685-be1f-d57550cc96cc"/>
+    <ds:schemaRef ds:uri="http://purl.org/dc/elements/1.1/"/>
+    <ds:schemaRef ds:uri="http://schemas.microsoft.com/office/2006/metadata/properties"/>
+    <ds:schemaRef ds:uri="http://schemas.microsoft.com/office/2006/documentManagement/types"/>
+    <ds:schemaRef ds:uri="http://schemas.microsoft.com/office/infopath/2007/PartnerControls"/>
+    <ds:schemaRef ds:uri="http://schemas.openxmlformats.org/package/2006/metadata/core-properties"/>
+    <ds:schemaRef ds:uri="http://purl.org/dc/dcmitype/"/>
+  </ds:schemaRefs>
+</ds:datastoreItem>
 </file>
</xml_diff>

<commit_message>
presentation: a more completion in implementation
</commit_message>
<xml_diff>
--- a/presentation/face-attendance-2018.pptx
+++ b/presentation/face-attendance-2018.pptx
@@ -5,10 +5,10 @@
     <p:sldMasterId id="2147483648" r:id="rId4"/>
   </p:sldMasterIdLst>
   <p:notesMasterIdLst>
-    <p:notesMasterId r:id="rId24"/>
+    <p:notesMasterId r:id="rId25"/>
   </p:notesMasterIdLst>
   <p:handoutMasterIdLst>
-    <p:handoutMasterId r:id="rId25"/>
+    <p:handoutMasterId r:id="rId26"/>
   </p:handoutMasterIdLst>
   <p:sldIdLst>
     <p:sldId id="256" r:id="rId5"/>
@@ -23,13 +23,14 @@
     <p:sldId id="297" r:id="rId14"/>
     <p:sldId id="295" r:id="rId15"/>
     <p:sldId id="299" r:id="rId16"/>
-    <p:sldId id="298" r:id="rId17"/>
-    <p:sldId id="300" r:id="rId18"/>
-    <p:sldId id="301" r:id="rId19"/>
-    <p:sldId id="287" r:id="rId20"/>
-    <p:sldId id="288" r:id="rId21"/>
-    <p:sldId id="290" r:id="rId22"/>
-    <p:sldId id="302" r:id="rId23"/>
+    <p:sldId id="303" r:id="rId17"/>
+    <p:sldId id="298" r:id="rId18"/>
+    <p:sldId id="300" r:id="rId19"/>
+    <p:sldId id="301" r:id="rId20"/>
+    <p:sldId id="287" r:id="rId21"/>
+    <p:sldId id="288" r:id="rId22"/>
+    <p:sldId id="290" r:id="rId23"/>
+    <p:sldId id="302" r:id="rId24"/>
   </p:sldIdLst>
   <p:sldSz cx="12192000" cy="6858000"/>
   <p:notesSz cx="6858000" cy="9144000"/>
@@ -161,6 +162,7 @@
             <p14:sldId id="297"/>
             <p14:sldId id="295"/>
             <p14:sldId id="299"/>
+            <p14:sldId id="303"/>
             <p14:sldId id="298"/>
             <p14:sldId id="300"/>
             <p14:sldId id="301"/>
@@ -1205,7 +1207,7 @@
     </p:spTree>
     <p:extLst>
       <p:ext uri="{BB962C8B-B14F-4D97-AF65-F5344CB8AC3E}">
-        <p14:creationId xmlns:p14="http://schemas.microsoft.com/office/powerpoint/2010/main" val="2292681600"/>
+        <p14:creationId xmlns:p14="http://schemas.microsoft.com/office/powerpoint/2010/main" val="201231444"/>
       </p:ext>
     </p:extLst>
   </p:cSld>
@@ -1290,7 +1292,7 @@
     </p:spTree>
     <p:extLst>
       <p:ext uri="{BB962C8B-B14F-4D97-AF65-F5344CB8AC3E}">
-        <p14:creationId xmlns:p14="http://schemas.microsoft.com/office/powerpoint/2010/main" val="1098162254"/>
+        <p14:creationId xmlns:p14="http://schemas.microsoft.com/office/powerpoint/2010/main" val="2292681600"/>
       </p:ext>
     </p:extLst>
   </p:cSld>
@@ -1375,7 +1377,7 @@
     </p:spTree>
     <p:extLst>
       <p:ext uri="{BB962C8B-B14F-4D97-AF65-F5344CB8AC3E}">
-        <p14:creationId xmlns:p14="http://schemas.microsoft.com/office/powerpoint/2010/main" val="2019976881"/>
+        <p14:creationId xmlns:p14="http://schemas.microsoft.com/office/powerpoint/2010/main" val="1098162254"/>
       </p:ext>
     </p:extLst>
   </p:cSld>
@@ -1460,7 +1462,7 @@
     </p:spTree>
     <p:extLst>
       <p:ext uri="{BB962C8B-B14F-4D97-AF65-F5344CB8AC3E}">
-        <p14:creationId xmlns:p14="http://schemas.microsoft.com/office/powerpoint/2010/main" val="1946839622"/>
+        <p14:creationId xmlns:p14="http://schemas.microsoft.com/office/powerpoint/2010/main" val="2019976881"/>
       </p:ext>
     </p:extLst>
   </p:cSld>
@@ -1545,7 +1547,7 @@
     </p:spTree>
     <p:extLst>
       <p:ext uri="{BB962C8B-B14F-4D97-AF65-F5344CB8AC3E}">
-        <p14:creationId xmlns:p14="http://schemas.microsoft.com/office/powerpoint/2010/main" val="4269383944"/>
+        <p14:creationId xmlns:p14="http://schemas.microsoft.com/office/powerpoint/2010/main" val="1946839622"/>
       </p:ext>
     </p:extLst>
   </p:cSld>
@@ -1630,7 +1632,7 @@
     </p:spTree>
     <p:extLst>
       <p:ext uri="{BB962C8B-B14F-4D97-AF65-F5344CB8AC3E}">
-        <p14:creationId xmlns:p14="http://schemas.microsoft.com/office/powerpoint/2010/main" val="3649123845"/>
+        <p14:creationId xmlns:p14="http://schemas.microsoft.com/office/powerpoint/2010/main" val="4269383944"/>
       </p:ext>
     </p:extLst>
   </p:cSld>
@@ -1715,7 +1717,7 @@
     </p:spTree>
     <p:extLst>
       <p:ext uri="{BB962C8B-B14F-4D97-AF65-F5344CB8AC3E}">
-        <p14:creationId xmlns:p14="http://schemas.microsoft.com/office/powerpoint/2010/main" val="1766807989"/>
+        <p14:creationId xmlns:p14="http://schemas.microsoft.com/office/powerpoint/2010/main" val="3649123845"/>
       </p:ext>
     </p:extLst>
   </p:cSld>
@@ -1801,6 +1803,91 @@
     <p:extLst>
       <p:ext uri="{BB962C8B-B14F-4D97-AF65-F5344CB8AC3E}">
         <p14:creationId xmlns:p14="http://schemas.microsoft.com/office/powerpoint/2010/main" val="1437519666"/>
+      </p:ext>
+    </p:extLst>
+  </p:cSld>
+  <p:clrMapOvr>
+    <a:masterClrMapping/>
+  </p:clrMapOvr>
+</p:notes>
+</file>
+
+<file path=ppt/notesSlides/notesSlide20.xml><?xml version="1.0" encoding="utf-8"?>
+<p:notes xmlns:a="http://schemas.openxmlformats.org/drawingml/2006/main" xmlns:r="http://schemas.openxmlformats.org/officeDocument/2006/relationships" xmlns:p="http://schemas.openxmlformats.org/presentationml/2006/main">
+  <p:cSld>
+    <p:spTree>
+      <p:nvGrpSpPr>
+        <p:cNvPr id="1" name=""/>
+        <p:cNvGrpSpPr/>
+        <p:nvPr/>
+      </p:nvGrpSpPr>
+      <p:grpSpPr>
+        <a:xfrm>
+          <a:off x="0" y="0"/>
+          <a:ext cx="0" cy="0"/>
+          <a:chOff x="0" y="0"/>
+          <a:chExt cx="0" cy="0"/>
+        </a:xfrm>
+      </p:grpSpPr>
+      <p:sp>
+        <p:nvSpPr>
+          <p:cNvPr id="2" name="Chỗ dành sẵn cho Hình ảnh của Bản chiếu 1"/>
+          <p:cNvSpPr>
+            <a:spLocks noGrp="1" noRot="1" noChangeAspect="1"/>
+          </p:cNvSpPr>
+          <p:nvPr>
+            <p:ph type="sldImg"/>
+          </p:nvPr>
+        </p:nvSpPr>
+        <p:spPr/>
+      </p:sp>
+      <p:sp>
+        <p:nvSpPr>
+          <p:cNvPr id="3" name="Chỗ dành sẵn cho Ghi chú 2"/>
+          <p:cNvSpPr>
+            <a:spLocks noGrp="1"/>
+          </p:cNvSpPr>
+          <p:nvPr>
+            <p:ph type="body" idx="1"/>
+          </p:nvPr>
+        </p:nvSpPr>
+        <p:spPr/>
+        <p:txBody>
+          <a:bodyPr/>
+          <a:lstStyle/>
+          <a:p>
+            <a:endParaRPr lang="en-US"/>
+          </a:p>
+        </p:txBody>
+      </p:sp>
+      <p:sp>
+        <p:nvSpPr>
+          <p:cNvPr id="4" name="Chỗ dành sẵn cho Số hiệu Bản chiếu 3"/>
+          <p:cNvSpPr>
+            <a:spLocks noGrp="1"/>
+          </p:cNvSpPr>
+          <p:nvPr>
+            <p:ph type="sldNum" sz="quarter" idx="10"/>
+          </p:nvPr>
+        </p:nvSpPr>
+        <p:spPr/>
+        <p:txBody>
+          <a:bodyPr/>
+          <a:lstStyle/>
+          <a:p>
+            <a:fld id="{0A3C37BE-C303-496D-B5CD-85F2937540FC}" type="slidenum">
+              <a:rPr lang="vi-VN" smtClean="0"/>
+              <a:pPr/>
+              <a:t>20</a:t>
+            </a:fld>
+            <a:endParaRPr lang="vi-VN" dirty="0"/>
+          </a:p>
+        </p:txBody>
+      </p:sp>
+    </p:spTree>
+    <p:extLst>
+      <p:ext uri="{BB962C8B-B14F-4D97-AF65-F5344CB8AC3E}">
+        <p14:creationId xmlns:p14="http://schemas.microsoft.com/office/powerpoint/2010/main" val="1766807989"/>
       </p:ext>
     </p:extLst>
   </p:cSld>
@@ -7121,14 +7208,7 @@
                 <a:latin typeface="Arial" panose="020B0604020202020204" pitchFamily="34" charset="0"/>
                 <a:cs typeface="Arial" panose="020B0604020202020204" pitchFamily="34" charset="0"/>
               </a:rPr>
-              <a:t>Face Attendance </a:t>
-            </a:r>
-            <a:r>
-              <a:rPr lang="en-US" sz="3500" b="1" dirty="0" smtClean="0">
-                <a:latin typeface="Arial" panose="020B0604020202020204" pitchFamily="34" charset="0"/>
-                <a:cs typeface="Arial" panose="020B0604020202020204" pitchFamily="34" charset="0"/>
-              </a:rPr>
-              <a:t>Checking</a:t>
+              <a:t>Face Attendance Checking</a:t>
             </a:r>
             <a:endParaRPr lang="en-US" sz="3500" b="1" dirty="0">
               <a:latin typeface="Arial" panose="020B0604020202020204" pitchFamily="34" charset="0"/>
@@ -7168,13 +7248,7 @@
               <a:rPr lang="en-US" sz="2200" dirty="0" smtClean="0">
                 <a:latin typeface="Arial" panose="020B0604020202020204" pitchFamily="34" charset="0"/>
               </a:rPr>
-              <a:t>Course: </a:t>
-            </a:r>
-            <a:r>
-              <a:rPr lang="en-US" sz="2200" dirty="0" smtClean="0">
-                <a:latin typeface="Arial" panose="020B0604020202020204" pitchFamily="34" charset="0"/>
-              </a:rPr>
-              <a:t>EE3063</a:t>
+              <a:t>Course: EE3063</a:t>
             </a:r>
             <a:r>
               <a:rPr lang="en-US" sz="2200" dirty="0">
@@ -7186,19 +7260,7 @@
               <a:rPr lang="en-US" sz="2200" dirty="0" smtClean="0">
                 <a:latin typeface="Arial" panose="020B0604020202020204" pitchFamily="34" charset="0"/>
               </a:rPr>
-              <a:t>- </a:t>
-            </a:r>
-            <a:r>
-              <a:rPr lang="en-US" sz="2200" dirty="0" smtClean="0">
-                <a:latin typeface="Arial" panose="020B0604020202020204" pitchFamily="34" charset="0"/>
-              </a:rPr>
-              <a:t>Dr. Pham </a:t>
-            </a:r>
-            <a:r>
-              <a:rPr lang="en-US" sz="2200" dirty="0" smtClean="0">
-                <a:latin typeface="Arial" panose="020B0604020202020204" pitchFamily="34" charset="0"/>
-              </a:rPr>
-              <a:t>Viet </a:t>
+              <a:t>- Dr. Pham Viet </a:t>
             </a:r>
             <a:r>
               <a:rPr lang="en-US" sz="2200" dirty="0" err="1" smtClean="0">
@@ -7970,6 +8032,145 @@
           </a:p>
         </p:txBody>
       </p:sp>
+      <p:pic>
+        <p:nvPicPr>
+          <p:cNvPr id="6" name="Picture 2" descr="https://cdn-images-1.medium.com/max/1600/1*AbEg31EgkbXSQehuNJBlWg.png"/>
+          <p:cNvPicPr>
+            <a:picLocks noChangeAspect="1" noChangeArrowheads="1"/>
+          </p:cNvPicPr>
+          <p:nvPr/>
+        </p:nvPicPr>
+        <p:blipFill>
+          <a:blip r:embed="rId3">
+            <a:extLst>
+              <a:ext uri="{28A0092B-C50C-407E-A947-70E740481C1C}">
+                <a14:useLocalDpi xmlns:a14="http://schemas.microsoft.com/office/drawing/2010/main"/>
+              </a:ext>
+            </a:extLst>
+          </a:blip>
+          <a:srcRect/>
+          <a:stretch>
+            <a:fillRect/>
+          </a:stretch>
+        </p:blipFill>
+        <p:spPr bwMode="auto">
+          <a:xfrm>
+            <a:off x="8244228" y="2149315"/>
+            <a:ext cx="2841354" cy="2704091"/>
+          </a:xfrm>
+          <a:prstGeom prst="rect">
+            <a:avLst/>
+          </a:prstGeom>
+          <a:noFill/>
+          <a:extLst>
+            <a:ext uri="{909E8E84-426E-40DD-AFC4-6F175D3DCCD1}">
+              <a14:hiddenFill xmlns:a14="http://schemas.microsoft.com/office/drawing/2010/main">
+                <a:solidFill>
+                  <a:srgbClr val="FFFFFF"/>
+                </a:solidFill>
+              </a14:hiddenFill>
+            </a:ext>
+          </a:extLst>
+        </p:spPr>
+      </p:pic>
+      <p:pic>
+        <p:nvPicPr>
+          <p:cNvPr id="2" name="Picture 1"/>
+          <p:cNvPicPr>
+            <a:picLocks noChangeAspect="1"/>
+          </p:cNvPicPr>
+          <p:nvPr/>
+        </p:nvPicPr>
+        <p:blipFill>
+          <a:blip r:embed="rId4">
+            <a:extLst>
+              <a:ext uri="{28A0092B-C50C-407E-A947-70E740481C1C}">
+                <a14:useLocalDpi xmlns:a14="http://schemas.microsoft.com/office/drawing/2010/main" val="0"/>
+              </a:ext>
+            </a:extLst>
+          </a:blip>
+          <a:stretch>
+            <a:fillRect/>
+          </a:stretch>
+        </p:blipFill>
+        <p:spPr>
+          <a:xfrm>
+            <a:off x="1207917" y="2149315"/>
+            <a:ext cx="2629297" cy="2704091"/>
+          </a:xfrm>
+          <a:prstGeom prst="rect">
+            <a:avLst/>
+          </a:prstGeom>
+        </p:spPr>
+      </p:pic>
+      <p:cxnSp>
+        <p:nvCxnSpPr>
+          <p:cNvPr id="4" name="Straight Arrow Connector 3"/>
+          <p:cNvCxnSpPr>
+            <a:endCxn id="6" idx="1"/>
+          </p:cNvCxnSpPr>
+          <p:nvPr/>
+        </p:nvCxnSpPr>
+        <p:spPr>
+          <a:xfrm>
+            <a:off x="3940233" y="3480623"/>
+            <a:ext cx="4303995" cy="20738"/>
+          </a:xfrm>
+          <a:prstGeom prst="straightConnector1">
+            <a:avLst/>
+          </a:prstGeom>
+          <a:ln>
+            <a:solidFill>
+              <a:schemeClr val="accent1"/>
+            </a:solidFill>
+            <a:tailEnd type="triangle"/>
+          </a:ln>
+        </p:spPr>
+        <p:style>
+          <a:lnRef idx="1">
+            <a:schemeClr val="accent1"/>
+          </a:lnRef>
+          <a:fillRef idx="0">
+            <a:schemeClr val="accent1"/>
+          </a:fillRef>
+          <a:effectRef idx="0">
+            <a:schemeClr val="accent1"/>
+          </a:effectRef>
+          <a:fontRef idx="minor">
+            <a:schemeClr val="tx1"/>
+          </a:fontRef>
+        </p:style>
+      </p:cxnSp>
+      <p:sp>
+        <p:nvSpPr>
+          <p:cNvPr id="10" name="TextBox 9"/>
+          <p:cNvSpPr txBox="1"/>
+          <p:nvPr/>
+        </p:nvSpPr>
+        <p:spPr>
+          <a:xfrm>
+            <a:off x="5321026" y="3480623"/>
+            <a:ext cx="1542410" cy="446276"/>
+          </a:xfrm>
+          <a:prstGeom prst="rect">
+            <a:avLst/>
+          </a:prstGeom>
+          <a:noFill/>
+        </p:spPr>
+        <p:txBody>
+          <a:bodyPr wrap="none" rtlCol="0">
+            <a:spAutoFit/>
+          </a:bodyPr>
+          <a:lstStyle/>
+          <a:p>
+            <a:r>
+              <a:rPr lang="en-US" sz="2300" dirty="0" err="1" smtClean="0"/>
+              <a:t>Regressor</a:t>
+            </a:r>
+            <a:endParaRPr lang="en-US" sz="2300" dirty="0"/>
+          </a:p>
+        </p:txBody>
+      </p:sp>
     </p:spTree>
     <p:extLst>
       <p:ext uri="{BB962C8B-B14F-4D97-AF65-F5344CB8AC3E}">
@@ -8034,6 +8235,531 @@
             <a:fld id="{0FF54DE5-C571-48E8-A5BC-B369434E2F44}" type="slidenum">
               <a:rPr lang="vi-VN" noProof="0" smtClean="0"/>
               <a:t>13</a:t>
+            </a:fld>
+            <a:endParaRPr lang="vi-VN" noProof="0" dirty="0"/>
+          </a:p>
+        </p:txBody>
+      </p:sp>
+      <p:sp>
+        <p:nvSpPr>
+          <p:cNvPr id="16" name="Tiêu đề 1"/>
+          <p:cNvSpPr>
+            <a:spLocks noGrp="1"/>
+          </p:cNvSpPr>
+          <p:nvPr>
+            <p:ph type="title"/>
+          </p:nvPr>
+        </p:nvSpPr>
+        <p:spPr>
+          <a:xfrm>
+            <a:off x="1104900" y="76200"/>
+            <a:ext cx="9980682" cy="1096962"/>
+          </a:xfrm>
+        </p:spPr>
+        <p:txBody>
+          <a:bodyPr rtlCol="0">
+            <a:normAutofit/>
+          </a:bodyPr>
+          <a:lstStyle/>
+          <a:p>
+            <a:pPr rtl="0"/>
+            <a:r>
+              <a:rPr lang="en-US" sz="4000" dirty="0" smtClean="0">
+                <a:latin typeface="Arial" panose="020B0604020202020204" pitchFamily="34" charset="0"/>
+                <a:cs typeface="Arial" panose="020B0604020202020204" pitchFamily="34" charset="0"/>
+              </a:rPr>
+              <a:t>Implementation</a:t>
+            </a:r>
+            <a:endParaRPr lang="vi-VN" sz="4000" dirty="0">
+              <a:latin typeface="Arial" panose="020B0604020202020204" pitchFamily="34" charset="0"/>
+              <a:cs typeface="Arial" panose="020B0604020202020204" pitchFamily="34" charset="0"/>
+            </a:endParaRPr>
+          </a:p>
+        </p:txBody>
+      </p:sp>
+      <p:sp>
+        <p:nvSpPr>
+          <p:cNvPr id="8" name="TextBox 7"/>
+          <p:cNvSpPr txBox="1"/>
+          <p:nvPr/>
+        </p:nvSpPr>
+        <p:spPr>
+          <a:xfrm>
+            <a:off x="1104900" y="1438101"/>
+            <a:ext cx="2835333" cy="446276"/>
+          </a:xfrm>
+          <a:prstGeom prst="rect">
+            <a:avLst/>
+          </a:prstGeom>
+          <a:noFill/>
+        </p:spPr>
+        <p:txBody>
+          <a:bodyPr wrap="square" rtlCol="0">
+            <a:spAutoFit/>
+          </a:bodyPr>
+          <a:lstStyle/>
+          <a:p>
+            <a:r>
+              <a:rPr lang="en-US" sz="2300" dirty="0" smtClean="0">
+                <a:solidFill>
+                  <a:schemeClr val="tx2"/>
+                </a:solidFill>
+              </a:rPr>
+              <a:t>Landmark detection</a:t>
+            </a:r>
+            <a:endParaRPr lang="en-US" sz="2300" dirty="0">
+              <a:solidFill>
+                <a:schemeClr val="tx2"/>
+              </a:solidFill>
+            </a:endParaRPr>
+          </a:p>
+        </p:txBody>
+      </p:sp>
+      <p:pic>
+        <p:nvPicPr>
+          <p:cNvPr id="6" name="Picture 2" descr="https://cdn-images-1.medium.com/max/1600/1*AbEg31EgkbXSQehuNJBlWg.png"/>
+          <p:cNvPicPr>
+            <a:picLocks noChangeAspect="1" noChangeArrowheads="1"/>
+          </p:cNvPicPr>
+          <p:nvPr/>
+        </p:nvPicPr>
+        <p:blipFill>
+          <a:blip r:embed="rId3">
+            <a:extLst>
+              <a:ext uri="{28A0092B-C50C-407E-A947-70E740481C1C}">
+                <a14:useLocalDpi xmlns:a14="http://schemas.microsoft.com/office/drawing/2010/main"/>
+              </a:ext>
+            </a:extLst>
+          </a:blip>
+          <a:srcRect/>
+          <a:stretch>
+            <a:fillRect/>
+          </a:stretch>
+        </p:blipFill>
+        <p:spPr bwMode="auto">
+          <a:xfrm>
+            <a:off x="8244228" y="2149315"/>
+            <a:ext cx="2841354" cy="2704091"/>
+          </a:xfrm>
+          <a:prstGeom prst="rect">
+            <a:avLst/>
+          </a:prstGeom>
+          <a:noFill/>
+          <a:extLst>
+            <a:ext uri="{909E8E84-426E-40DD-AFC4-6F175D3DCCD1}">
+              <a14:hiddenFill xmlns:a14="http://schemas.microsoft.com/office/drawing/2010/main">
+                <a:solidFill>
+                  <a:srgbClr val="FFFFFF"/>
+                </a:solidFill>
+              </a14:hiddenFill>
+            </a:ext>
+          </a:extLst>
+        </p:spPr>
+      </p:pic>
+      <p:pic>
+        <p:nvPicPr>
+          <p:cNvPr id="2" name="Picture 1"/>
+          <p:cNvPicPr>
+            <a:picLocks noChangeAspect="1"/>
+          </p:cNvPicPr>
+          <p:nvPr/>
+        </p:nvPicPr>
+        <p:blipFill>
+          <a:blip r:embed="rId4">
+            <a:extLst>
+              <a:ext uri="{28A0092B-C50C-407E-A947-70E740481C1C}">
+                <a14:useLocalDpi xmlns:a14="http://schemas.microsoft.com/office/drawing/2010/main" val="0"/>
+              </a:ext>
+            </a:extLst>
+          </a:blip>
+          <a:stretch>
+            <a:fillRect/>
+          </a:stretch>
+        </p:blipFill>
+        <p:spPr>
+          <a:xfrm>
+            <a:off x="1207917" y="2149315"/>
+            <a:ext cx="2629297" cy="2704091"/>
+          </a:xfrm>
+          <a:prstGeom prst="rect">
+            <a:avLst/>
+          </a:prstGeom>
+        </p:spPr>
+      </p:pic>
+      <p:cxnSp>
+        <p:nvCxnSpPr>
+          <p:cNvPr id="4" name="Straight Arrow Connector 3"/>
+          <p:cNvCxnSpPr>
+            <a:endCxn id="6" idx="1"/>
+          </p:cNvCxnSpPr>
+          <p:nvPr/>
+        </p:nvCxnSpPr>
+        <p:spPr>
+          <a:xfrm>
+            <a:off x="3940233" y="3480623"/>
+            <a:ext cx="4303995" cy="20738"/>
+          </a:xfrm>
+          <a:prstGeom prst="straightConnector1">
+            <a:avLst/>
+          </a:prstGeom>
+          <a:ln>
+            <a:solidFill>
+              <a:schemeClr val="accent1"/>
+            </a:solidFill>
+            <a:tailEnd type="triangle"/>
+          </a:ln>
+        </p:spPr>
+        <p:style>
+          <a:lnRef idx="1">
+            <a:schemeClr val="accent1"/>
+          </a:lnRef>
+          <a:fillRef idx="0">
+            <a:schemeClr val="accent1"/>
+          </a:fillRef>
+          <a:effectRef idx="0">
+            <a:schemeClr val="accent1"/>
+          </a:effectRef>
+          <a:fontRef idx="minor">
+            <a:schemeClr val="tx1"/>
+          </a:fontRef>
+        </p:style>
+      </p:cxnSp>
+      <p:sp>
+        <p:nvSpPr>
+          <p:cNvPr id="10" name="TextBox 9"/>
+          <p:cNvSpPr txBox="1"/>
+          <p:nvPr/>
+        </p:nvSpPr>
+        <p:spPr>
+          <a:xfrm>
+            <a:off x="4601279" y="3480623"/>
+            <a:ext cx="2981907" cy="446276"/>
+          </a:xfrm>
+          <a:prstGeom prst="rect">
+            <a:avLst/>
+          </a:prstGeom>
+          <a:noFill/>
+        </p:spPr>
+        <p:txBody>
+          <a:bodyPr wrap="none" rtlCol="0">
+            <a:spAutoFit/>
+          </a:bodyPr>
+          <a:lstStyle/>
+          <a:p>
+            <a:pPr algn="ctr"/>
+            <a:r>
+              <a:rPr lang="en-US" sz="2300" dirty="0" smtClean="0"/>
+              <a:t>Cascaded </a:t>
+            </a:r>
+            <a:r>
+              <a:rPr lang="en-US" sz="2300" dirty="0" err="1" smtClean="0"/>
+              <a:t>regressors</a:t>
+            </a:r>
+            <a:endParaRPr lang="en-US" sz="2300" dirty="0"/>
+          </a:p>
+        </p:txBody>
+      </p:sp>
+      <p:sp>
+        <p:nvSpPr>
+          <p:cNvPr id="11" name="TextBox 10"/>
+          <p:cNvSpPr txBox="1"/>
+          <p:nvPr/>
+        </p:nvSpPr>
+        <p:spPr>
+          <a:xfrm>
+            <a:off x="2602101" y="5651242"/>
+            <a:ext cx="1689886" cy="446276"/>
+          </a:xfrm>
+          <a:prstGeom prst="rect">
+            <a:avLst/>
+          </a:prstGeom>
+          <a:noFill/>
+        </p:spPr>
+        <p:txBody>
+          <a:bodyPr wrap="none" rtlCol="0">
+            <a:spAutoFit/>
+          </a:bodyPr>
+          <a:lstStyle/>
+          <a:p>
+            <a:r>
+              <a:rPr lang="en-US" sz="2300" dirty="0" smtClean="0"/>
+              <a:t>Regressor1</a:t>
+            </a:r>
+            <a:endParaRPr lang="en-US" sz="2300" dirty="0"/>
+          </a:p>
+        </p:txBody>
+      </p:sp>
+      <p:sp>
+        <p:nvSpPr>
+          <p:cNvPr id="12" name="TextBox 11"/>
+          <p:cNvSpPr txBox="1"/>
+          <p:nvPr/>
+        </p:nvSpPr>
+        <p:spPr>
+          <a:xfrm>
+            <a:off x="4496371" y="5653016"/>
+            <a:ext cx="1689886" cy="446276"/>
+          </a:xfrm>
+          <a:prstGeom prst="rect">
+            <a:avLst/>
+          </a:prstGeom>
+          <a:noFill/>
+        </p:spPr>
+        <p:txBody>
+          <a:bodyPr wrap="none" rtlCol="0">
+            <a:spAutoFit/>
+          </a:bodyPr>
+          <a:lstStyle/>
+          <a:p>
+            <a:r>
+              <a:rPr lang="en-US" sz="2300" dirty="0" smtClean="0"/>
+              <a:t>Regressor2</a:t>
+            </a:r>
+            <a:endParaRPr lang="en-US" sz="2300" dirty="0"/>
+          </a:p>
+        </p:txBody>
+      </p:sp>
+      <p:sp>
+        <p:nvSpPr>
+          <p:cNvPr id="13" name="TextBox 12"/>
+          <p:cNvSpPr txBox="1"/>
+          <p:nvPr/>
+        </p:nvSpPr>
+        <p:spPr>
+          <a:xfrm>
+            <a:off x="7483411" y="5651242"/>
+            <a:ext cx="1755609" cy="446276"/>
+          </a:xfrm>
+          <a:prstGeom prst="rect">
+            <a:avLst/>
+          </a:prstGeom>
+          <a:noFill/>
+        </p:spPr>
+        <p:txBody>
+          <a:bodyPr wrap="none" rtlCol="0">
+            <a:spAutoFit/>
+          </a:bodyPr>
+          <a:lstStyle/>
+          <a:p>
+            <a:r>
+              <a:rPr lang="en-US" sz="2300" dirty="0" err="1" smtClean="0"/>
+              <a:t>RegressorN</a:t>
+            </a:r>
+            <a:endParaRPr lang="en-US" sz="2300" dirty="0"/>
+          </a:p>
+        </p:txBody>
+      </p:sp>
+      <p:sp>
+        <p:nvSpPr>
+          <p:cNvPr id="14" name="TextBox 13"/>
+          <p:cNvSpPr txBox="1"/>
+          <p:nvPr/>
+        </p:nvSpPr>
+        <p:spPr>
+          <a:xfrm>
+            <a:off x="6595025" y="5651242"/>
+            <a:ext cx="479618" cy="446276"/>
+          </a:xfrm>
+          <a:prstGeom prst="rect">
+            <a:avLst/>
+          </a:prstGeom>
+          <a:noFill/>
+        </p:spPr>
+        <p:txBody>
+          <a:bodyPr wrap="none" rtlCol="0">
+            <a:spAutoFit/>
+          </a:bodyPr>
+          <a:lstStyle/>
+          <a:p>
+            <a:r>
+              <a:rPr lang="en-US" sz="2300" dirty="0" smtClean="0"/>
+              <a:t>…</a:t>
+            </a:r>
+            <a:endParaRPr lang="en-US" sz="2300" dirty="0"/>
+          </a:p>
+        </p:txBody>
+      </p:sp>
+      <p:cxnSp>
+        <p:nvCxnSpPr>
+          <p:cNvPr id="15" name="Straight Arrow Connector 14"/>
+          <p:cNvCxnSpPr>
+            <a:stCxn id="10" idx="2"/>
+            <a:endCxn id="11" idx="0"/>
+          </p:cNvCxnSpPr>
+          <p:nvPr/>
+        </p:nvCxnSpPr>
+        <p:spPr>
+          <a:xfrm flipH="1">
+            <a:off x="3447044" y="3926899"/>
+            <a:ext cx="2645189" cy="1724343"/>
+          </a:xfrm>
+          <a:prstGeom prst="straightConnector1">
+            <a:avLst/>
+          </a:prstGeom>
+          <a:ln>
+            <a:solidFill>
+              <a:schemeClr val="accent1"/>
+            </a:solidFill>
+            <a:tailEnd type="triangle"/>
+          </a:ln>
+        </p:spPr>
+        <p:style>
+          <a:lnRef idx="1">
+            <a:schemeClr val="accent1"/>
+          </a:lnRef>
+          <a:fillRef idx="0">
+            <a:schemeClr val="accent1"/>
+          </a:fillRef>
+          <a:effectRef idx="0">
+            <a:schemeClr val="accent1"/>
+          </a:effectRef>
+          <a:fontRef idx="minor">
+            <a:schemeClr val="tx1"/>
+          </a:fontRef>
+        </p:style>
+      </p:cxnSp>
+      <p:cxnSp>
+        <p:nvCxnSpPr>
+          <p:cNvPr id="18" name="Straight Arrow Connector 17"/>
+          <p:cNvCxnSpPr>
+            <a:stCxn id="10" idx="2"/>
+            <a:endCxn id="12" idx="0"/>
+          </p:cNvCxnSpPr>
+          <p:nvPr/>
+        </p:nvCxnSpPr>
+        <p:spPr>
+          <a:xfrm flipH="1">
+            <a:off x="5341314" y="3926899"/>
+            <a:ext cx="750919" cy="1726117"/>
+          </a:xfrm>
+          <a:prstGeom prst="straightConnector1">
+            <a:avLst/>
+          </a:prstGeom>
+          <a:ln>
+            <a:solidFill>
+              <a:schemeClr val="accent1"/>
+            </a:solidFill>
+            <a:tailEnd type="triangle"/>
+          </a:ln>
+        </p:spPr>
+        <p:style>
+          <a:lnRef idx="1">
+            <a:schemeClr val="accent1"/>
+          </a:lnRef>
+          <a:fillRef idx="0">
+            <a:schemeClr val="accent1"/>
+          </a:fillRef>
+          <a:effectRef idx="0">
+            <a:schemeClr val="accent1"/>
+          </a:effectRef>
+          <a:fontRef idx="minor">
+            <a:schemeClr val="tx1"/>
+          </a:fontRef>
+        </p:style>
+      </p:cxnSp>
+      <p:cxnSp>
+        <p:nvCxnSpPr>
+          <p:cNvPr id="20" name="Straight Arrow Connector 19"/>
+          <p:cNvCxnSpPr>
+            <a:stCxn id="10" idx="2"/>
+            <a:endCxn id="13" idx="0"/>
+          </p:cNvCxnSpPr>
+          <p:nvPr/>
+        </p:nvCxnSpPr>
+        <p:spPr>
+          <a:xfrm>
+            <a:off x="6092233" y="3926899"/>
+            <a:ext cx="2268983" cy="1724343"/>
+          </a:xfrm>
+          <a:prstGeom prst="straightConnector1">
+            <a:avLst/>
+          </a:prstGeom>
+          <a:ln>
+            <a:solidFill>
+              <a:schemeClr val="accent1"/>
+            </a:solidFill>
+            <a:tailEnd type="triangle"/>
+          </a:ln>
+        </p:spPr>
+        <p:style>
+          <a:lnRef idx="1">
+            <a:schemeClr val="accent1"/>
+          </a:lnRef>
+          <a:fillRef idx="0">
+            <a:schemeClr val="accent1"/>
+          </a:fillRef>
+          <a:effectRef idx="0">
+            <a:schemeClr val="accent1"/>
+          </a:effectRef>
+          <a:fontRef idx="minor">
+            <a:schemeClr val="tx1"/>
+          </a:fontRef>
+        </p:style>
+      </p:cxnSp>
+    </p:spTree>
+    <p:extLst>
+      <p:ext uri="{BB962C8B-B14F-4D97-AF65-F5344CB8AC3E}">
+        <p14:creationId xmlns:p14="http://schemas.microsoft.com/office/powerpoint/2010/main" val="4249463880"/>
+      </p:ext>
+    </p:extLst>
+  </p:cSld>
+  <p:clrMapOvr>
+    <a:masterClrMapping/>
+  </p:clrMapOvr>
+  <mc:AlternateContent xmlns:mc="http://schemas.openxmlformats.org/markup-compatibility/2006" xmlns:p14="http://schemas.microsoft.com/office/powerpoint/2010/main">
+    <mc:Choice Requires="p14">
+      <p:transition p14:dur="0"/>
+    </mc:Choice>
+    <mc:Fallback xmlns="">
+      <p:transition/>
+    </mc:Fallback>
+  </mc:AlternateContent>
+  <p:timing>
+    <p:tnLst>
+      <p:par>
+        <p:cTn id="1" dur="indefinite" restart="never" nodeType="tmRoot"/>
+      </p:par>
+    </p:tnLst>
+  </p:timing>
+</p:sld>
+</file>
+
+<file path=ppt/slides/slide14.xml><?xml version="1.0" encoding="utf-8"?>
+<p:sld xmlns:a="http://schemas.openxmlformats.org/drawingml/2006/main" xmlns:r="http://schemas.openxmlformats.org/officeDocument/2006/relationships" xmlns:p="http://schemas.openxmlformats.org/presentationml/2006/main">
+  <p:cSld>
+    <p:spTree>
+      <p:nvGrpSpPr>
+        <p:cNvPr id="1" name=""/>
+        <p:cNvGrpSpPr/>
+        <p:nvPr/>
+      </p:nvGrpSpPr>
+      <p:grpSpPr>
+        <a:xfrm>
+          <a:off x="0" y="0"/>
+          <a:ext cx="0" cy="0"/>
+          <a:chOff x="0" y="0"/>
+          <a:chExt cx="0" cy="0"/>
+        </a:xfrm>
+      </p:grpSpPr>
+      <p:sp>
+        <p:nvSpPr>
+          <p:cNvPr id="7" name="Slide Number Placeholder 6"/>
+          <p:cNvSpPr>
+            <a:spLocks noGrp="1"/>
+          </p:cNvSpPr>
+          <p:nvPr>
+            <p:ph type="sldNum" sz="quarter" idx="12"/>
+          </p:nvPr>
+        </p:nvSpPr>
+        <p:spPr/>
+        <p:txBody>
+          <a:bodyPr/>
+          <a:lstStyle/>
+          <a:p>
+            <a:pPr rtl="0"/>
+            <a:fld id="{0FF54DE5-C571-48E8-A5BC-B369434E2F44}" type="slidenum">
+              <a:rPr lang="vi-VN" noProof="0" smtClean="0"/>
+              <a:t>14</a:t>
             </a:fld>
             <a:endParaRPr lang="vi-VN" noProof="0" dirty="0"/>
           </a:p>
@@ -8454,7 +9180,7 @@
 </p:sld>
 </file>
 
-<file path=ppt/slides/slide14.xml><?xml version="1.0" encoding="utf-8"?>
+<file path=ppt/slides/slide15.xml><?xml version="1.0" encoding="utf-8"?>
 <p:sld xmlns:a="http://schemas.openxmlformats.org/drawingml/2006/main" xmlns:r="http://schemas.openxmlformats.org/officeDocument/2006/relationships" xmlns:p="http://schemas.openxmlformats.org/presentationml/2006/main">
   <p:cSld>
     <p:spTree>
@@ -8489,7 +9215,7 @@
             <a:pPr rtl="0"/>
             <a:fld id="{0FF54DE5-C571-48E8-A5BC-B369434E2F44}" type="slidenum">
               <a:rPr lang="vi-VN" noProof="0" smtClean="0"/>
-              <a:t>14</a:t>
+              <a:t>15</a:t>
             </a:fld>
             <a:endParaRPr lang="vi-VN" noProof="0" dirty="0"/>
           </a:p>
@@ -8678,7 +9404,7 @@
 </p:sld>
 </file>
 
-<file path=ppt/slides/slide15.xml><?xml version="1.0" encoding="utf-8"?>
+<file path=ppt/slides/slide16.xml><?xml version="1.0" encoding="utf-8"?>
 <p:sld xmlns:a="http://schemas.openxmlformats.org/drawingml/2006/main" xmlns:r="http://schemas.openxmlformats.org/officeDocument/2006/relationships" xmlns:p="http://schemas.openxmlformats.org/presentationml/2006/main">
   <p:cSld>
     <p:spTree>
@@ -8713,7 +9439,7 @@
             <a:pPr rtl="0"/>
             <a:fld id="{0FF54DE5-C571-48E8-A5BC-B369434E2F44}" type="slidenum">
               <a:rPr lang="vi-VN" noProof="0" smtClean="0"/>
-              <a:t>15</a:t>
+              <a:t>16</a:t>
             </a:fld>
             <a:endParaRPr lang="vi-VN" noProof="0" dirty="0"/>
           </a:p>
@@ -8971,112 +9697,6 @@
 </p:sld>
 </file>
 
-<file path=ppt/slides/slide16.xml><?xml version="1.0" encoding="utf-8"?>
-<p:sld xmlns:a="http://schemas.openxmlformats.org/drawingml/2006/main" xmlns:r="http://schemas.openxmlformats.org/officeDocument/2006/relationships" xmlns:p="http://schemas.openxmlformats.org/presentationml/2006/main">
-  <p:cSld>
-    <p:spTree>
-      <p:nvGrpSpPr>
-        <p:cNvPr id="1" name=""/>
-        <p:cNvGrpSpPr/>
-        <p:nvPr/>
-      </p:nvGrpSpPr>
-      <p:grpSpPr>
-        <a:xfrm>
-          <a:off x="0" y="0"/>
-          <a:ext cx="0" cy="0"/>
-          <a:chOff x="0" y="0"/>
-          <a:chExt cx="0" cy="0"/>
-        </a:xfrm>
-      </p:grpSpPr>
-      <p:sp>
-        <p:nvSpPr>
-          <p:cNvPr id="7" name="Slide Number Placeholder 6"/>
-          <p:cNvSpPr>
-            <a:spLocks noGrp="1"/>
-          </p:cNvSpPr>
-          <p:nvPr>
-            <p:ph type="sldNum" sz="quarter" idx="12"/>
-          </p:nvPr>
-        </p:nvSpPr>
-        <p:spPr/>
-        <p:txBody>
-          <a:bodyPr/>
-          <a:lstStyle/>
-          <a:p>
-            <a:pPr rtl="0"/>
-            <a:fld id="{0FF54DE5-C571-48E8-A5BC-B369434E2F44}" type="slidenum">
-              <a:rPr lang="vi-VN" noProof="0" smtClean="0"/>
-              <a:t>16</a:t>
-            </a:fld>
-            <a:endParaRPr lang="vi-VN" noProof="0" dirty="0"/>
-          </a:p>
-        </p:txBody>
-      </p:sp>
-      <p:sp>
-        <p:nvSpPr>
-          <p:cNvPr id="16" name="Tiêu đề 1"/>
-          <p:cNvSpPr>
-            <a:spLocks noGrp="1"/>
-          </p:cNvSpPr>
-          <p:nvPr>
-            <p:ph type="title"/>
-          </p:nvPr>
-        </p:nvSpPr>
-        <p:spPr>
-          <a:xfrm>
-            <a:off x="1104900" y="76200"/>
-            <a:ext cx="9980682" cy="1096962"/>
-          </a:xfrm>
-        </p:spPr>
-        <p:txBody>
-          <a:bodyPr rtlCol="0">
-            <a:normAutofit/>
-          </a:bodyPr>
-          <a:lstStyle/>
-          <a:p>
-            <a:pPr rtl="0"/>
-            <a:r>
-              <a:rPr lang="en-US" sz="4000" dirty="0" smtClean="0">
-                <a:latin typeface="Arial" panose="020B0604020202020204" pitchFamily="34" charset="0"/>
-                <a:cs typeface="Arial" panose="020B0604020202020204" pitchFamily="34" charset="0"/>
-              </a:rPr>
-              <a:t>Experimental results</a:t>
-            </a:r>
-            <a:endParaRPr lang="vi-VN" sz="4000" dirty="0">
-              <a:latin typeface="Arial" panose="020B0604020202020204" pitchFamily="34" charset="0"/>
-              <a:cs typeface="Arial" panose="020B0604020202020204" pitchFamily="34" charset="0"/>
-            </a:endParaRPr>
-          </a:p>
-        </p:txBody>
-      </p:sp>
-    </p:spTree>
-    <p:extLst>
-      <p:ext uri="{BB962C8B-B14F-4D97-AF65-F5344CB8AC3E}">
-        <p14:creationId xmlns:p14="http://schemas.microsoft.com/office/powerpoint/2010/main" val="3760579364"/>
-      </p:ext>
-    </p:extLst>
-  </p:cSld>
-  <p:clrMapOvr>
-    <a:masterClrMapping/>
-  </p:clrMapOvr>
-  <mc:AlternateContent xmlns:mc="http://schemas.openxmlformats.org/markup-compatibility/2006" xmlns:p14="http://schemas.microsoft.com/office/powerpoint/2010/main">
-    <mc:Choice Requires="p14">
-      <p:transition p14:dur="0"/>
-    </mc:Choice>
-    <mc:Fallback xmlns="">
-      <p:transition/>
-    </mc:Fallback>
-  </mc:AlternateContent>
-  <p:timing>
-    <p:tnLst>
-      <p:par>
-        <p:cTn id="1" dur="indefinite" restart="never" nodeType="tmRoot"/>
-      </p:par>
-    </p:tnLst>
-  </p:timing>
-</p:sld>
-</file>
-
 <file path=ppt/slides/slide17.xml><?xml version="1.0" encoding="utf-8"?>
 <p:sld xmlns:a="http://schemas.openxmlformats.org/drawingml/2006/main" xmlns:r="http://schemas.openxmlformats.org/officeDocument/2006/relationships" xmlns:p="http://schemas.openxmlformats.org/presentationml/2006/main">
   <p:cSld>
@@ -9146,7 +9766,7 @@
                 <a:latin typeface="Arial" panose="020B0604020202020204" pitchFamily="34" charset="0"/>
                 <a:cs typeface="Arial" panose="020B0604020202020204" pitchFamily="34" charset="0"/>
               </a:rPr>
-              <a:t>Demo</a:t>
+              <a:t>Experimental results</a:t>
             </a:r>
             <a:endParaRPr lang="vi-VN" sz="4000" dirty="0">
               <a:latin typeface="Arial" panose="020B0604020202020204" pitchFamily="34" charset="0"/>
@@ -9158,7 +9778,7 @@
     </p:spTree>
     <p:extLst>
       <p:ext uri="{BB962C8B-B14F-4D97-AF65-F5344CB8AC3E}">
-        <p14:creationId xmlns:p14="http://schemas.microsoft.com/office/powerpoint/2010/main" val="1115007891"/>
+        <p14:creationId xmlns:p14="http://schemas.microsoft.com/office/powerpoint/2010/main" val="3760579364"/>
       </p:ext>
     </p:extLst>
   </p:cSld>
@@ -9252,7 +9872,7 @@
                 <a:latin typeface="Arial" panose="020B0604020202020204" pitchFamily="34" charset="0"/>
                 <a:cs typeface="Arial" panose="020B0604020202020204" pitchFamily="34" charset="0"/>
               </a:rPr>
-              <a:t>Conclusion</a:t>
+              <a:t>Demo</a:t>
             </a:r>
             <a:endParaRPr lang="vi-VN" sz="4000" dirty="0">
               <a:latin typeface="Arial" panose="020B0604020202020204" pitchFamily="34" charset="0"/>
@@ -9261,209 +9881,10 @@
           </a:p>
         </p:txBody>
       </p:sp>
-      <p:sp>
-        <p:nvSpPr>
-          <p:cNvPr id="3" name="TextBox 2"/>
-          <p:cNvSpPr txBox="1"/>
-          <p:nvPr/>
-        </p:nvSpPr>
-        <p:spPr>
-          <a:xfrm>
-            <a:off x="1104900" y="1619072"/>
-            <a:ext cx="4414751" cy="4401205"/>
-          </a:xfrm>
-          <a:prstGeom prst="rect">
-            <a:avLst/>
-          </a:prstGeom>
-          <a:noFill/>
-        </p:spPr>
-        <p:txBody>
-          <a:bodyPr wrap="square" rtlCol="0">
-            <a:spAutoFit/>
-          </a:bodyPr>
-          <a:lstStyle/>
-          <a:p>
-            <a:pPr>
-              <a:lnSpc>
-                <a:spcPct val="200000"/>
-              </a:lnSpc>
-            </a:pPr>
-            <a:r>
-              <a:rPr lang="en-US" sz="2500" b="1" u="sng" dirty="0" smtClean="0"/>
-              <a:t>Hard:</a:t>
-            </a:r>
-          </a:p>
-          <a:p>
-            <a:pPr marL="342900" indent="-342900">
-              <a:lnSpc>
-                <a:spcPct val="200000"/>
-              </a:lnSpc>
-              <a:buFont typeface="Arial" panose="020B0604020202020204" pitchFamily="34" charset="0"/>
-              <a:buChar char="•"/>
-            </a:pPr>
-            <a:r>
-              <a:rPr lang="en-US" sz="2300" dirty="0" smtClean="0"/>
-              <a:t>Face Attendance Checking</a:t>
-            </a:r>
-          </a:p>
-          <a:p>
-            <a:pPr marL="342900" indent="-342900">
-              <a:lnSpc>
-                <a:spcPct val="200000"/>
-              </a:lnSpc>
-              <a:buFont typeface="Arial" panose="020B0604020202020204" pitchFamily="34" charset="0"/>
-              <a:buChar char="•"/>
-            </a:pPr>
-            <a:r>
-              <a:rPr lang="en-US" sz="2300" dirty="0" smtClean="0"/>
-              <a:t>Deep-learning based</a:t>
-            </a:r>
-          </a:p>
-          <a:p>
-            <a:pPr marL="342900" indent="-342900">
-              <a:lnSpc>
-                <a:spcPct val="200000"/>
-              </a:lnSpc>
-              <a:buFont typeface="Arial" panose="020B0604020202020204" pitchFamily="34" charset="0"/>
-              <a:buChar char="•"/>
-            </a:pPr>
-            <a:r>
-              <a:rPr lang="en-US" sz="2300" dirty="0" smtClean="0"/>
-              <a:t>Standard hardware</a:t>
-            </a:r>
-          </a:p>
-          <a:p>
-            <a:pPr marL="342900" indent="-342900">
-              <a:lnSpc>
-                <a:spcPct val="200000"/>
-              </a:lnSpc>
-              <a:buFont typeface="Arial" panose="020B0604020202020204" pitchFamily="34" charset="0"/>
-              <a:buChar char="•"/>
-            </a:pPr>
-            <a:r>
-              <a:rPr lang="en-US" sz="2300" dirty="0" smtClean="0"/>
-              <a:t>High accuracy</a:t>
-            </a:r>
-          </a:p>
-          <a:p>
-            <a:pPr marL="342900" indent="-342900">
-              <a:lnSpc>
-                <a:spcPct val="200000"/>
-              </a:lnSpc>
-              <a:buFont typeface="Arial" panose="020B0604020202020204" pitchFamily="34" charset="0"/>
-              <a:buChar char="•"/>
-            </a:pPr>
-            <a:r>
-              <a:rPr lang="en-US" sz="2300" dirty="0" smtClean="0"/>
-              <a:t>Easy-use GUI</a:t>
-            </a:r>
-            <a:endParaRPr lang="en-US" sz="2300" dirty="0"/>
-          </a:p>
-        </p:txBody>
-      </p:sp>
-      <p:sp>
-        <p:nvSpPr>
-          <p:cNvPr id="6" name="TextBox 5"/>
-          <p:cNvSpPr txBox="1"/>
-          <p:nvPr/>
-        </p:nvSpPr>
-        <p:spPr>
-          <a:xfrm>
-            <a:off x="6325985" y="1619072"/>
-            <a:ext cx="4759597" cy="4401205"/>
-          </a:xfrm>
-          <a:prstGeom prst="rect">
-            <a:avLst/>
-          </a:prstGeom>
-          <a:noFill/>
-        </p:spPr>
-        <p:txBody>
-          <a:bodyPr wrap="square" rtlCol="0">
-            <a:spAutoFit/>
-          </a:bodyPr>
-          <a:lstStyle/>
-          <a:p>
-            <a:pPr>
-              <a:lnSpc>
-                <a:spcPct val="200000"/>
-              </a:lnSpc>
-            </a:pPr>
-            <a:r>
-              <a:rPr lang="en-US" sz="2500" b="1" u="sng" dirty="0" smtClean="0"/>
-              <a:t>Soft:</a:t>
-            </a:r>
-          </a:p>
-          <a:p>
-            <a:pPr marL="342900" indent="-342900">
-              <a:lnSpc>
-                <a:spcPct val="200000"/>
-              </a:lnSpc>
-              <a:buFont typeface="Arial" panose="020B0604020202020204" pitchFamily="34" charset="0"/>
-              <a:buChar char="•"/>
-            </a:pPr>
-            <a:r>
-              <a:rPr lang="en-US" sz="2300" dirty="0" smtClean="0"/>
-              <a:t>Specialized-task assignment</a:t>
-            </a:r>
-          </a:p>
-          <a:p>
-            <a:pPr marL="342900" indent="-342900">
-              <a:lnSpc>
-                <a:spcPct val="200000"/>
-              </a:lnSpc>
-              <a:buFont typeface="Arial" panose="020B0604020202020204" pitchFamily="34" charset="0"/>
-              <a:buChar char="•"/>
-            </a:pPr>
-            <a:r>
-              <a:rPr lang="en-US" sz="2300" dirty="0" smtClean="0"/>
-              <a:t>GitHub: store, collaborate, refer</a:t>
-            </a:r>
-          </a:p>
-          <a:p>
-            <a:pPr marL="342900" indent="-342900">
-              <a:lnSpc>
-                <a:spcPct val="200000"/>
-              </a:lnSpc>
-              <a:buFont typeface="Arial" panose="020B0604020202020204" pitchFamily="34" charset="0"/>
-              <a:buChar char="•"/>
-            </a:pPr>
-            <a:r>
-              <a:rPr lang="en-US" sz="2300" dirty="0" smtClean="0"/>
-              <a:t>Open-source: MIT license</a:t>
-            </a:r>
-          </a:p>
-          <a:p>
-            <a:pPr marL="342900" indent="-342900">
-              <a:lnSpc>
-                <a:spcPct val="200000"/>
-              </a:lnSpc>
-              <a:buFont typeface="Arial" panose="020B0604020202020204" pitchFamily="34" charset="0"/>
-              <a:buChar char="•"/>
-            </a:pPr>
-            <a:r>
-              <a:rPr lang="en-US" sz="2300" dirty="0" smtClean="0"/>
-              <a:t>Scientific-form paper report</a:t>
-            </a:r>
-          </a:p>
-          <a:p>
-            <a:pPr marL="342900" indent="-342900">
-              <a:lnSpc>
-                <a:spcPct val="200000"/>
-              </a:lnSpc>
-              <a:buFont typeface="Arial" panose="020B0604020202020204" pitchFamily="34" charset="0"/>
-              <a:buChar char="•"/>
-            </a:pPr>
-            <a:r>
-              <a:rPr lang="en-US" sz="2300" dirty="0" smtClean="0"/>
-              <a:t>Unity</a:t>
-            </a:r>
-          </a:p>
-        </p:txBody>
-      </p:sp>
     </p:spTree>
     <p:extLst>
       <p:ext uri="{BB962C8B-B14F-4D97-AF65-F5344CB8AC3E}">
-        <p14:creationId xmlns:p14="http://schemas.microsoft.com/office/powerpoint/2010/main" val="1938821521"/>
+        <p14:creationId xmlns:p14="http://schemas.microsoft.com/office/powerpoint/2010/main" val="1115007891"/>
       </p:ext>
     </p:extLst>
   </p:cSld>
@@ -9557,7 +9978,7 @@
                 <a:latin typeface="Arial" panose="020B0604020202020204" pitchFamily="34" charset="0"/>
                 <a:cs typeface="Arial" panose="020B0604020202020204" pitchFamily="34" charset="0"/>
               </a:rPr>
-              <a:t>Acknowledge</a:t>
+              <a:t>Conclusion</a:t>
             </a:r>
             <a:endParaRPr lang="vi-VN" sz="4000" dirty="0">
               <a:latin typeface="Arial" panose="020B0604020202020204" pitchFamily="34" charset="0"/>
@@ -9568,14 +9989,14 @@
       </p:sp>
       <p:sp>
         <p:nvSpPr>
-          <p:cNvPr id="2" name="TextBox 1"/>
+          <p:cNvPr id="3" name="TextBox 2"/>
           <p:cNvSpPr txBox="1"/>
           <p:nvPr/>
         </p:nvSpPr>
         <p:spPr>
           <a:xfrm>
-            <a:off x="1546167" y="1825764"/>
-            <a:ext cx="8146473" cy="1938992"/>
+            <a:off x="1104900" y="1619072"/>
+            <a:ext cx="4414751" cy="4401205"/>
           </a:xfrm>
           <a:prstGeom prst="rect">
             <a:avLst/>
@@ -9588,7 +10009,18 @@
           </a:bodyPr>
           <a:lstStyle/>
           <a:p>
-            <a:pPr marL="285750" indent="-285750">
+            <a:pPr>
+              <a:lnSpc>
+                <a:spcPct val="200000"/>
+              </a:lnSpc>
+            </a:pPr>
+            <a:r>
+              <a:rPr lang="en-US" sz="2500" b="1" u="sng" dirty="0" smtClean="0"/>
+              <a:t>Hard:</a:t>
+            </a:r>
+          </a:p>
+          <a:p>
+            <a:pPr marL="342900" indent="-342900">
               <a:lnSpc>
                 <a:spcPct val="200000"/>
               </a:lnSpc>
@@ -9596,20 +10028,12 @@
               <a:buChar char="•"/>
             </a:pPr>
             <a:r>
-              <a:rPr lang="en-US" sz="3000" dirty="0" smtClean="0"/>
-              <a:t>Dr. Pham Viet </a:t>
-            </a:r>
-            <a:r>
-              <a:rPr lang="en-US" sz="3000" dirty="0" err="1" smtClean="0"/>
-              <a:t>Cuong</a:t>
-            </a:r>
-            <a:r>
-              <a:rPr lang="en-US" sz="3000" dirty="0" smtClean="0"/>
-              <a:t>: promote a chance.</a:t>
-            </a:r>
-          </a:p>
-          <a:p>
-            <a:pPr marL="285750" indent="-285750">
+              <a:rPr lang="en-US" sz="2300" dirty="0" smtClean="0"/>
+              <a:t>Face Attendance Checking</a:t>
+            </a:r>
+          </a:p>
+          <a:p>
+            <a:pPr marL="342900" indent="-342900">
               <a:lnSpc>
                 <a:spcPct val="200000"/>
               </a:lnSpc>
@@ -9617,17 +10041,155 @@
               <a:buChar char="•"/>
             </a:pPr>
             <a:r>
-              <a:rPr lang="en-US" sz="3000" dirty="0" smtClean="0"/>
-              <a:t>Course-EE3063 students: donate data.</a:t>
-            </a:r>
-            <a:endParaRPr lang="en-US" sz="3000" dirty="0"/>
+              <a:rPr lang="en-US" sz="2300" dirty="0" smtClean="0"/>
+              <a:t>Deep-learning based</a:t>
+            </a:r>
+          </a:p>
+          <a:p>
+            <a:pPr marL="342900" indent="-342900">
+              <a:lnSpc>
+                <a:spcPct val="200000"/>
+              </a:lnSpc>
+              <a:buFont typeface="Arial" panose="020B0604020202020204" pitchFamily="34" charset="0"/>
+              <a:buChar char="•"/>
+            </a:pPr>
+            <a:r>
+              <a:rPr lang="en-US" sz="2300" dirty="0" smtClean="0"/>
+              <a:t>Standard hardware</a:t>
+            </a:r>
+          </a:p>
+          <a:p>
+            <a:pPr marL="342900" indent="-342900">
+              <a:lnSpc>
+                <a:spcPct val="200000"/>
+              </a:lnSpc>
+              <a:buFont typeface="Arial" panose="020B0604020202020204" pitchFamily="34" charset="0"/>
+              <a:buChar char="•"/>
+            </a:pPr>
+            <a:r>
+              <a:rPr lang="en-US" sz="2300" dirty="0" smtClean="0"/>
+              <a:t>High accuracy</a:t>
+            </a:r>
+          </a:p>
+          <a:p>
+            <a:pPr marL="342900" indent="-342900">
+              <a:lnSpc>
+                <a:spcPct val="200000"/>
+              </a:lnSpc>
+              <a:buFont typeface="Arial" panose="020B0604020202020204" pitchFamily="34" charset="0"/>
+              <a:buChar char="•"/>
+            </a:pPr>
+            <a:r>
+              <a:rPr lang="en-US" sz="2300" dirty="0" smtClean="0"/>
+              <a:t>Easy-use GUI</a:t>
+            </a:r>
+            <a:endParaRPr lang="en-US" sz="2300" dirty="0"/>
+          </a:p>
+        </p:txBody>
+      </p:sp>
+      <p:sp>
+        <p:nvSpPr>
+          <p:cNvPr id="6" name="TextBox 5"/>
+          <p:cNvSpPr txBox="1"/>
+          <p:nvPr/>
+        </p:nvSpPr>
+        <p:spPr>
+          <a:xfrm>
+            <a:off x="6325985" y="1619072"/>
+            <a:ext cx="4759597" cy="4401205"/>
+          </a:xfrm>
+          <a:prstGeom prst="rect">
+            <a:avLst/>
+          </a:prstGeom>
+          <a:noFill/>
+        </p:spPr>
+        <p:txBody>
+          <a:bodyPr wrap="square" rtlCol="0">
+            <a:spAutoFit/>
+          </a:bodyPr>
+          <a:lstStyle/>
+          <a:p>
+            <a:pPr>
+              <a:lnSpc>
+                <a:spcPct val="200000"/>
+              </a:lnSpc>
+            </a:pPr>
+            <a:r>
+              <a:rPr lang="en-US" sz="2500" b="1" u="sng" dirty="0" smtClean="0"/>
+              <a:t>Soft:</a:t>
+            </a:r>
+          </a:p>
+          <a:p>
+            <a:pPr marL="342900" indent="-342900">
+              <a:lnSpc>
+                <a:spcPct val="200000"/>
+              </a:lnSpc>
+              <a:buFont typeface="Arial" panose="020B0604020202020204" pitchFamily="34" charset="0"/>
+              <a:buChar char="•"/>
+            </a:pPr>
+            <a:r>
+              <a:rPr lang="en-US" sz="2300" dirty="0" smtClean="0"/>
+              <a:t>Specialized-task assignment</a:t>
+            </a:r>
+          </a:p>
+          <a:p>
+            <a:pPr marL="342900" indent="-342900">
+              <a:lnSpc>
+                <a:spcPct val="200000"/>
+              </a:lnSpc>
+              <a:buFont typeface="Arial" panose="020B0604020202020204" pitchFamily="34" charset="0"/>
+              <a:buChar char="•"/>
+            </a:pPr>
+            <a:r>
+              <a:rPr lang="en-US" sz="2300" dirty="0" smtClean="0"/>
+              <a:t>GitHub: store, collaborate, refer</a:t>
+            </a:r>
+          </a:p>
+          <a:p>
+            <a:pPr marL="342900" indent="-342900">
+              <a:lnSpc>
+                <a:spcPct val="200000"/>
+              </a:lnSpc>
+              <a:buFont typeface="Arial" panose="020B0604020202020204" pitchFamily="34" charset="0"/>
+              <a:buChar char="•"/>
+            </a:pPr>
+            <a:r>
+              <a:rPr lang="en-US" sz="2300" dirty="0" smtClean="0"/>
+              <a:t>Open-source: MIT license</a:t>
+            </a:r>
+          </a:p>
+          <a:p>
+            <a:pPr marL="342900" indent="-342900">
+              <a:lnSpc>
+                <a:spcPct val="200000"/>
+              </a:lnSpc>
+              <a:buFont typeface="Arial" panose="020B0604020202020204" pitchFamily="34" charset="0"/>
+              <a:buChar char="•"/>
+            </a:pPr>
+            <a:r>
+              <a:rPr lang="en-US" sz="2300" dirty="0" smtClean="0"/>
+              <a:t>Scientific-form paper report</a:t>
+            </a:r>
+          </a:p>
+          <a:p>
+            <a:pPr marL="342900" indent="-342900">
+              <a:lnSpc>
+                <a:spcPct val="200000"/>
+              </a:lnSpc>
+              <a:buFont typeface="Arial" panose="020B0604020202020204" pitchFamily="34" charset="0"/>
+              <a:buChar char="•"/>
+            </a:pPr>
+            <a:r>
+              <a:rPr lang="en-US" sz="2300" dirty="0" smtClean="0"/>
+              <a:t>Unity</a:t>
+            </a:r>
           </a:p>
         </p:txBody>
       </p:sp>
     </p:spTree>
     <p:extLst>
       <p:ext uri="{BB962C8B-B14F-4D97-AF65-F5344CB8AC3E}">
-        <p14:creationId xmlns:p14="http://schemas.microsoft.com/office/powerpoint/2010/main" val="204413065"/>
+        <p14:creationId xmlns:p14="http://schemas.microsoft.com/office/powerpoint/2010/main" val="1938821521"/>
       </p:ext>
     </p:extLst>
   </p:cSld>
@@ -9636,7 +10198,7 @@
   </p:clrMapOvr>
   <mc:AlternateContent xmlns:mc="http://schemas.openxmlformats.org/markup-compatibility/2006" xmlns:p14="http://schemas.microsoft.com/office/powerpoint/2010/main">
     <mc:Choice Requires="p14">
-      <p:transition p14:dur="10"/>
+      <p:transition p14:dur="0"/>
     </mc:Choice>
     <mc:Fallback xmlns="">
       <p:transition/>
@@ -9832,6 +10394,170 @@
   <mc:AlternateContent xmlns:mc="http://schemas.openxmlformats.org/markup-compatibility/2006" xmlns:p14="http://schemas.microsoft.com/office/powerpoint/2010/main">
     <mc:Choice Requires="p14">
       <p:transition p14:dur="0"/>
+    </mc:Choice>
+    <mc:Fallback xmlns="">
+      <p:transition/>
+    </mc:Fallback>
+  </mc:AlternateContent>
+  <p:timing>
+    <p:tnLst>
+      <p:par>
+        <p:cTn id="1" dur="indefinite" restart="never" nodeType="tmRoot"/>
+      </p:par>
+    </p:tnLst>
+  </p:timing>
+</p:sld>
+</file>
+
+<file path=ppt/slides/slide20.xml><?xml version="1.0" encoding="utf-8"?>
+<p:sld xmlns:a="http://schemas.openxmlformats.org/drawingml/2006/main" xmlns:r="http://schemas.openxmlformats.org/officeDocument/2006/relationships" xmlns:p="http://schemas.openxmlformats.org/presentationml/2006/main">
+  <p:cSld>
+    <p:spTree>
+      <p:nvGrpSpPr>
+        <p:cNvPr id="1" name=""/>
+        <p:cNvGrpSpPr/>
+        <p:nvPr/>
+      </p:nvGrpSpPr>
+      <p:grpSpPr>
+        <a:xfrm>
+          <a:off x="0" y="0"/>
+          <a:ext cx="0" cy="0"/>
+          <a:chOff x="0" y="0"/>
+          <a:chExt cx="0" cy="0"/>
+        </a:xfrm>
+      </p:grpSpPr>
+      <p:sp>
+        <p:nvSpPr>
+          <p:cNvPr id="7" name="Slide Number Placeholder 6"/>
+          <p:cNvSpPr>
+            <a:spLocks noGrp="1"/>
+          </p:cNvSpPr>
+          <p:nvPr>
+            <p:ph type="sldNum" sz="quarter" idx="12"/>
+          </p:nvPr>
+        </p:nvSpPr>
+        <p:spPr/>
+        <p:txBody>
+          <a:bodyPr/>
+          <a:lstStyle/>
+          <a:p>
+            <a:pPr rtl="0"/>
+            <a:fld id="{0FF54DE5-C571-48E8-A5BC-B369434E2F44}" type="slidenum">
+              <a:rPr lang="vi-VN" noProof="0" smtClean="0"/>
+              <a:t>20</a:t>
+            </a:fld>
+            <a:endParaRPr lang="vi-VN" noProof="0" dirty="0"/>
+          </a:p>
+        </p:txBody>
+      </p:sp>
+      <p:sp>
+        <p:nvSpPr>
+          <p:cNvPr id="16" name="Tiêu đề 1"/>
+          <p:cNvSpPr>
+            <a:spLocks noGrp="1"/>
+          </p:cNvSpPr>
+          <p:nvPr>
+            <p:ph type="title"/>
+          </p:nvPr>
+        </p:nvSpPr>
+        <p:spPr>
+          <a:xfrm>
+            <a:off x="1104900" y="76200"/>
+            <a:ext cx="9980682" cy="1096962"/>
+          </a:xfrm>
+        </p:spPr>
+        <p:txBody>
+          <a:bodyPr rtlCol="0">
+            <a:normAutofit/>
+          </a:bodyPr>
+          <a:lstStyle/>
+          <a:p>
+            <a:pPr rtl="0"/>
+            <a:r>
+              <a:rPr lang="en-US" sz="4000" dirty="0" smtClean="0">
+                <a:latin typeface="Arial" panose="020B0604020202020204" pitchFamily="34" charset="0"/>
+                <a:cs typeface="Arial" panose="020B0604020202020204" pitchFamily="34" charset="0"/>
+              </a:rPr>
+              <a:t>Acknowledge</a:t>
+            </a:r>
+            <a:endParaRPr lang="vi-VN" sz="4000" dirty="0">
+              <a:latin typeface="Arial" panose="020B0604020202020204" pitchFamily="34" charset="0"/>
+              <a:cs typeface="Arial" panose="020B0604020202020204" pitchFamily="34" charset="0"/>
+            </a:endParaRPr>
+          </a:p>
+        </p:txBody>
+      </p:sp>
+      <p:sp>
+        <p:nvSpPr>
+          <p:cNvPr id="2" name="TextBox 1"/>
+          <p:cNvSpPr txBox="1"/>
+          <p:nvPr/>
+        </p:nvSpPr>
+        <p:spPr>
+          <a:xfrm>
+            <a:off x="1546167" y="1825764"/>
+            <a:ext cx="8146473" cy="1938992"/>
+          </a:xfrm>
+          <a:prstGeom prst="rect">
+            <a:avLst/>
+          </a:prstGeom>
+          <a:noFill/>
+        </p:spPr>
+        <p:txBody>
+          <a:bodyPr wrap="square" rtlCol="0">
+            <a:spAutoFit/>
+          </a:bodyPr>
+          <a:lstStyle/>
+          <a:p>
+            <a:pPr marL="285750" indent="-285750">
+              <a:lnSpc>
+                <a:spcPct val="200000"/>
+              </a:lnSpc>
+              <a:buFont typeface="Arial" panose="020B0604020202020204" pitchFamily="34" charset="0"/>
+              <a:buChar char="•"/>
+            </a:pPr>
+            <a:r>
+              <a:rPr lang="en-US" sz="3000" dirty="0" smtClean="0"/>
+              <a:t>Dr. Pham Viet </a:t>
+            </a:r>
+            <a:r>
+              <a:rPr lang="en-US" sz="3000" dirty="0" err="1" smtClean="0"/>
+              <a:t>Cuong</a:t>
+            </a:r>
+            <a:r>
+              <a:rPr lang="en-US" sz="3000" dirty="0" smtClean="0"/>
+              <a:t>: promote a chance.</a:t>
+            </a:r>
+          </a:p>
+          <a:p>
+            <a:pPr marL="285750" indent="-285750">
+              <a:lnSpc>
+                <a:spcPct val="200000"/>
+              </a:lnSpc>
+              <a:buFont typeface="Arial" panose="020B0604020202020204" pitchFamily="34" charset="0"/>
+              <a:buChar char="•"/>
+            </a:pPr>
+            <a:r>
+              <a:rPr lang="en-US" sz="3000" dirty="0" smtClean="0"/>
+              <a:t>Course-EE3063 students: donate data.</a:t>
+            </a:r>
+            <a:endParaRPr lang="en-US" sz="3000" dirty="0"/>
+          </a:p>
+        </p:txBody>
+      </p:sp>
+    </p:spTree>
+    <p:extLst>
+      <p:ext uri="{BB962C8B-B14F-4D97-AF65-F5344CB8AC3E}">
+        <p14:creationId xmlns:p14="http://schemas.microsoft.com/office/powerpoint/2010/main" val="204413065"/>
+      </p:ext>
+    </p:extLst>
+  </p:cSld>
+  <p:clrMapOvr>
+    <a:masterClrMapping/>
+  </p:clrMapOvr>
+  <mc:AlternateContent xmlns:mc="http://schemas.openxmlformats.org/markup-compatibility/2006" xmlns:p14="http://schemas.microsoft.com/office/powerpoint/2010/main">
+    <mc:Choice Requires="p14">
+      <p:transition p14:dur="10"/>
     </mc:Choice>
     <mc:Fallback xmlns="">
       <p:transition/>
@@ -10737,8 +11463,8 @@
         </p:blipFill>
         <p:spPr bwMode="auto">
           <a:xfrm>
-            <a:off x="2047116" y="2228446"/>
-            <a:ext cx="8096250" cy="2667000"/>
+            <a:off x="1357159" y="2170257"/>
+            <a:ext cx="9133165" cy="3008572"/>
           </a:xfrm>
           <a:prstGeom prst="rect">
             <a:avLst/>
@@ -12278,15 +13004,6 @@
 </file>
 
 <file path=customXml/item1.xml><?xml version="1.0" encoding="utf-8"?>
-<?mso-contentType ?>
-<FormTemplates xmlns="http://schemas.microsoft.com/sharepoint/v3/contenttype/forms">
-  <Display>DocumentLibraryForm</Display>
-  <Edit>AssetEditForm</Edit>
-  <New>DocumentLibraryForm</New>
-</FormTemplates>
-</file>
-
-<file path=customXml/item2.xml><?xml version="1.0" encoding="utf-8"?>
 <ct:contentTypeSchema xmlns:ct="http://schemas.microsoft.com/office/2006/metadata/contentType" xmlns:ma="http://schemas.microsoft.com/office/2006/metadata/properties/metaAttributes" ct:_="" ma:_="" ma:contentTypeName="TemplateFile" ma:contentTypeID="0x0101006EDDDB5EE6D98C44930B742096920B300400F5B6D36B3EF94B4E9A635CDF2A18F5B8" ma:contentTypeVersion="72" ma:contentTypeDescription="Create a new document." ma:contentTypeScope="" ma:versionID="a23e56308344d904b51738559c3d67c9">
   <xsd:schema xmlns:xsd="http://www.w3.org/2001/XMLSchema" xmlns:xs="http://www.w3.org/2001/XMLSchema" xmlns:p="http://schemas.microsoft.com/office/2006/metadata/properties" xmlns:ns2="4873beb7-5857-4685-be1f-d57550cc96cc" targetNamespace="http://schemas.microsoft.com/office/2006/metadata/properties" ma:root="true" ma:fieldsID="cd0908cc4600e77bf5da051303e00c8d" ns2:_="">
     <xsd:import namespace="4873beb7-5857-4685-be1f-d57550cc96cc"/>
@@ -13326,6 +14043,15 @@
 </ct:contentTypeSchema>
 </file>
 
+<file path=customXml/item2.xml><?xml version="1.0" encoding="utf-8"?>
+<?mso-contentType ?>
+<FormTemplates xmlns="http://schemas.microsoft.com/sharepoint/v3/contenttype/forms">
+  <Display>DocumentLibraryForm</Display>
+  <Edit>AssetEditForm</Edit>
+  <New>DocumentLibraryForm</New>
+</FormTemplates>
+</file>
+
 <file path=customXml/item3.xml><?xml version="1.0" encoding="utf-8"?>
 <p:properties xmlns:p="http://schemas.microsoft.com/office/2006/metadata/properties" xmlns:xsi="http://www.w3.org/2001/XMLSchema-instance" xmlns:pc="http://schemas.microsoft.com/office/infopath/2007/PartnerControls">
   <documentManagement>
@@ -13453,14 +14179,6 @@
 </file>
 
 <file path=customXml/itemProps1.xml><?xml version="1.0" encoding="utf-8"?>
-<ds:datastoreItem xmlns:ds="http://schemas.openxmlformats.org/officeDocument/2006/customXml" ds:itemID="{561E720F-F05D-4536-9C34-0CFCED65D3B7}">
-  <ds:schemaRefs>
-    <ds:schemaRef ds:uri="http://schemas.microsoft.com/sharepoint/v3/contenttype/forms"/>
-  </ds:schemaRefs>
-</ds:datastoreItem>
-</file>
-
-<file path=customXml/itemProps2.xml><?xml version="1.0" encoding="utf-8"?>
 <ds:datastoreItem xmlns:ds="http://schemas.openxmlformats.org/officeDocument/2006/customXml" ds:itemID="{28C8B9CA-0273-4370-889A-FC05DA5C2FA5}">
   <ds:schemaRefs>
     <ds:schemaRef ds:uri="http://schemas.microsoft.com/office/2006/metadata/contentType"/>
@@ -13474,6 +14192,14 @@
     <ds:schemaRef ds:uri="http://purl.org/dc/elements/1.1/"/>
     <ds:schemaRef ds:uri="http://purl.org/dc/terms/"/>
     <ds:schemaRef ds:uri="http://schemas.microsoft.com/internal/obd"/>
+  </ds:schemaRefs>
+</ds:datastoreItem>
+</file>
+
+<file path=customXml/itemProps2.xml><?xml version="1.0" encoding="utf-8"?>
+<ds:datastoreItem xmlns:ds="http://schemas.openxmlformats.org/officeDocument/2006/customXml" ds:itemID="{561E720F-F05D-4536-9C34-0CFCED65D3B7}">
+  <ds:schemaRefs>
+    <ds:schemaRef ds:uri="http://schemas.microsoft.com/sharepoint/v3/contenttype/forms"/>
   </ds:schemaRefs>
 </ds:datastoreItem>
 </file>

</xml_diff>